<commit_message>
Improved the diagram for workflow and dataflow between main chapters
</commit_message>
<xml_diff>
--- a/chapter_03/figures/workflow_dataflow.pptx
+++ b/chapter_03/figures/workflow_dataflow.pptx
@@ -2,7 +2,7 @@
 <file path=ppt/presentation.xml><?xml version="1.0" encoding="utf-8"?>
 <p:presentation xmlns:a="http://schemas.openxmlformats.org/drawingml/2006/main" xmlns:r="http://schemas.openxmlformats.org/officeDocument/2006/relationships" xmlns:p="http://schemas.openxmlformats.org/presentationml/2006/main" saveSubsetFonts="1">
   <p:sldMasterIdLst>
-    <p:sldMasterId id="2147483672" r:id="rId1"/>
+    <p:sldMasterId id="2147483684" r:id="rId1"/>
   </p:sldMasterIdLst>
   <p:notesMasterIdLst>
     <p:notesMasterId r:id="rId3"/>
@@ -10,7 +10,7 @@
   <p:sldIdLst>
     <p:sldId id="256" r:id="rId2"/>
   </p:sldIdLst>
-  <p:sldSz cx="4319588" cy="7199313"/>
+  <p:sldSz cx="4319588" cy="4751388"/>
   <p:notesSz cx="6858000" cy="9144000"/>
   <p:defaultTextStyle>
     <a:defPPr>
@@ -118,7 +118,7 @@
 <file path=ppt/revisionInfo.xml><?xml version="1.0" encoding="utf-8"?>
 <p1510:revInfo xmlns:a="http://schemas.openxmlformats.org/drawingml/2006/main" xmlns:r="http://schemas.openxmlformats.org/officeDocument/2006/relationships" xmlns:p1510="http://schemas.microsoft.com/office/powerpoint/2015/10/main">
   <p1510:revLst>
-    <p1510:client id="{4CF53376-DC37-4DC9-B6B7-0D04940C2381}" v="4" dt="2025-04-07T20:59:47.222"/>
+    <p1510:client id="{E45A9BF4-C197-4918-8A99-49F61B604D71}" v="2" dt="2025-06-11T15:07:01.601"/>
   </p1510:revLst>
 </p1510:revInfo>
 </file>
@@ -344,6 +344,422 @@
             <pc:docMk/>
             <pc:sldMk cId="2412790101" sldId="256"/>
             <ac:cxnSpMk id="31" creationId="{C9AC5F94-183A-D73F-A1C9-6E9F101B5E62}"/>
+          </ac:cxnSpMkLst>
+        </pc:cxnChg>
+      </pc:sldChg>
+    </pc:docChg>
+  </pc:docChgLst>
+  <pc:docChgLst>
+    <pc:chgData name="Fatima Pillosu" userId="a6295d4dc9e22643" providerId="LiveId" clId="{E45A9BF4-C197-4918-8A99-49F61B604D71}"/>
+    <pc:docChg chg="undo custSel modSld">
+      <pc:chgData name="Fatima Pillosu" userId="a6295d4dc9e22643" providerId="LiveId" clId="{E45A9BF4-C197-4918-8A99-49F61B604D71}" dt="2025-06-11T15:07:01.601" v="678"/>
+      <pc:docMkLst>
+        <pc:docMk/>
+      </pc:docMkLst>
+      <pc:sldChg chg="addSp delSp modSp mod">
+        <pc:chgData name="Fatima Pillosu" userId="a6295d4dc9e22643" providerId="LiveId" clId="{E45A9BF4-C197-4918-8A99-49F61B604D71}" dt="2025-06-11T15:07:01.601" v="678"/>
+        <pc:sldMkLst>
+          <pc:docMk/>
+          <pc:sldMk cId="2412790101" sldId="256"/>
+        </pc:sldMkLst>
+        <pc:spChg chg="del mod">
+          <ac:chgData name="Fatima Pillosu" userId="a6295d4dc9e22643" providerId="LiveId" clId="{E45A9BF4-C197-4918-8A99-49F61B604D71}" dt="2025-06-11T15:06:44.758" v="677" actId="21"/>
+          <ac:spMkLst>
+            <pc:docMk/>
+            <pc:sldMk cId="2412790101" sldId="256"/>
+            <ac:spMk id="2" creationId="{761A0E4A-D491-74D5-90F0-C519DB1C25DC}"/>
+          </ac:spMkLst>
+        </pc:spChg>
+        <pc:spChg chg="add del">
+          <ac:chgData name="Fatima Pillosu" userId="a6295d4dc9e22643" providerId="LiveId" clId="{E45A9BF4-C197-4918-8A99-49F61B604D71}" dt="2025-06-11T15:06:43.292" v="676" actId="478"/>
+          <ac:spMkLst>
+            <pc:docMk/>
+            <pc:sldMk cId="2412790101" sldId="256"/>
+            <ac:spMk id="3" creationId="{36223C63-81A0-4638-D176-3FE7B72E439F}"/>
+          </ac:spMkLst>
+        </pc:spChg>
+        <pc:spChg chg="add mod">
+          <ac:chgData name="Fatima Pillosu" userId="a6295d4dc9e22643" providerId="LiveId" clId="{E45A9BF4-C197-4918-8A99-49F61B604D71}" dt="2025-06-11T15:07:01.601" v="678"/>
+          <ac:spMkLst>
+            <pc:docMk/>
+            <pc:sldMk cId="2412790101" sldId="256"/>
+            <ac:spMk id="4" creationId="{E38ABB4D-863F-E734-71F8-6A361F5E1DE3}"/>
+          </ac:spMkLst>
+        </pc:spChg>
+        <pc:spChg chg="add mod">
+          <ac:chgData name="Fatima Pillosu" userId="a6295d4dc9e22643" providerId="LiveId" clId="{E45A9BF4-C197-4918-8A99-49F61B604D71}" dt="2025-06-11T15:07:01.601" v="678"/>
+          <ac:spMkLst>
+            <pc:docMk/>
+            <pc:sldMk cId="2412790101" sldId="256"/>
+            <ac:spMk id="5" creationId="{887FF438-27CB-7933-3FF0-750C83E136A4}"/>
+          </ac:spMkLst>
+        </pc:spChg>
+        <pc:spChg chg="del mod">
+          <ac:chgData name="Fatima Pillosu" userId="a6295d4dc9e22643" providerId="LiveId" clId="{E45A9BF4-C197-4918-8A99-49F61B604D71}" dt="2025-06-11T15:06:44.758" v="677" actId="21"/>
+          <ac:spMkLst>
+            <pc:docMk/>
+            <pc:sldMk cId="2412790101" sldId="256"/>
+            <ac:spMk id="6" creationId="{E38ABB4D-863F-E734-71F8-6A361F5E1DE3}"/>
+          </ac:spMkLst>
+        </pc:spChg>
+        <pc:spChg chg="del">
+          <ac:chgData name="Fatima Pillosu" userId="a6295d4dc9e22643" providerId="LiveId" clId="{E45A9BF4-C197-4918-8A99-49F61B604D71}" dt="2025-06-11T14:40:38.191" v="0" actId="478"/>
+          <ac:spMkLst>
+            <pc:docMk/>
+            <pc:sldMk cId="2412790101" sldId="256"/>
+            <ac:spMk id="7" creationId="{5F9C8026-4C6B-D6F9-CA2C-A59B5ECF5D00}"/>
+          </ac:spMkLst>
+        </pc:spChg>
+        <pc:spChg chg="del">
+          <ac:chgData name="Fatima Pillosu" userId="a6295d4dc9e22643" providerId="LiveId" clId="{E45A9BF4-C197-4918-8A99-49F61B604D71}" dt="2025-06-11T14:40:38.191" v="0" actId="478"/>
+          <ac:spMkLst>
+            <pc:docMk/>
+            <pc:sldMk cId="2412790101" sldId="256"/>
+            <ac:spMk id="8" creationId="{31C95DF1-1021-B801-DF6E-518471057358}"/>
+          </ac:spMkLst>
+        </pc:spChg>
+        <pc:spChg chg="del">
+          <ac:chgData name="Fatima Pillosu" userId="a6295d4dc9e22643" providerId="LiveId" clId="{E45A9BF4-C197-4918-8A99-49F61B604D71}" dt="2025-06-11T14:40:38.191" v="0" actId="478"/>
+          <ac:spMkLst>
+            <pc:docMk/>
+            <pc:sldMk cId="2412790101" sldId="256"/>
+            <ac:spMk id="9" creationId="{26DAFA34-6888-C3F6-07E1-0C3D78F45867}"/>
+          </ac:spMkLst>
+        </pc:spChg>
+        <pc:spChg chg="add mod">
+          <ac:chgData name="Fatima Pillosu" userId="a6295d4dc9e22643" providerId="LiveId" clId="{E45A9BF4-C197-4918-8A99-49F61B604D71}" dt="2025-06-11T15:07:01.601" v="678"/>
+          <ac:spMkLst>
+            <pc:docMk/>
+            <pc:sldMk cId="2412790101" sldId="256"/>
+            <ac:spMk id="10" creationId="{94699DC0-F296-4F13-1267-BB22E3869038}"/>
+          </ac:spMkLst>
+        </pc:spChg>
+        <pc:spChg chg="add mod">
+          <ac:chgData name="Fatima Pillosu" userId="a6295d4dc9e22643" providerId="LiveId" clId="{E45A9BF4-C197-4918-8A99-49F61B604D71}" dt="2025-06-11T15:07:01.601" v="678"/>
+          <ac:spMkLst>
+            <pc:docMk/>
+            <pc:sldMk cId="2412790101" sldId="256"/>
+            <ac:spMk id="11" creationId="{B70B7DAE-BBF8-26B9-F316-694D75EF55A1}"/>
+          </ac:spMkLst>
+        </pc:spChg>
+        <pc:spChg chg="del mod">
+          <ac:chgData name="Fatima Pillosu" userId="a6295d4dc9e22643" providerId="LiveId" clId="{E45A9BF4-C197-4918-8A99-49F61B604D71}" dt="2025-06-11T15:06:44.758" v="677" actId="21"/>
+          <ac:spMkLst>
+            <pc:docMk/>
+            <pc:sldMk cId="2412790101" sldId="256"/>
+            <ac:spMk id="12" creationId="{887FF438-27CB-7933-3FF0-750C83E136A4}"/>
+          </ac:spMkLst>
+        </pc:spChg>
+        <pc:spChg chg="del mod">
+          <ac:chgData name="Fatima Pillosu" userId="a6295d4dc9e22643" providerId="LiveId" clId="{E45A9BF4-C197-4918-8A99-49F61B604D71}" dt="2025-06-11T15:06:44.758" v="677" actId="21"/>
+          <ac:spMkLst>
+            <pc:docMk/>
+            <pc:sldMk cId="2412790101" sldId="256"/>
+            <ac:spMk id="13" creationId="{94699DC0-F296-4F13-1267-BB22E3869038}"/>
+          </ac:spMkLst>
+        </pc:spChg>
+        <pc:spChg chg="del mod">
+          <ac:chgData name="Fatima Pillosu" userId="a6295d4dc9e22643" providerId="LiveId" clId="{E45A9BF4-C197-4918-8A99-49F61B604D71}" dt="2025-06-11T15:06:44.758" v="677" actId="21"/>
+          <ac:spMkLst>
+            <pc:docMk/>
+            <pc:sldMk cId="2412790101" sldId="256"/>
+            <ac:spMk id="14" creationId="{B70B7DAE-BBF8-26B9-F316-694D75EF55A1}"/>
+          </ac:spMkLst>
+        </pc:spChg>
+        <pc:spChg chg="del mod">
+          <ac:chgData name="Fatima Pillosu" userId="a6295d4dc9e22643" providerId="LiveId" clId="{E45A9BF4-C197-4918-8A99-49F61B604D71}" dt="2025-06-11T15:06:44.758" v="677" actId="21"/>
+          <ac:spMkLst>
+            <pc:docMk/>
+            <pc:sldMk cId="2412790101" sldId="256"/>
+            <ac:spMk id="15" creationId="{DA0A3A3F-6F21-9FFB-DFE8-C73B8123777A}"/>
+          </ac:spMkLst>
+        </pc:spChg>
+        <pc:spChg chg="del mod">
+          <ac:chgData name="Fatima Pillosu" userId="a6295d4dc9e22643" providerId="LiveId" clId="{E45A9BF4-C197-4918-8A99-49F61B604D71}" dt="2025-06-11T15:06:44.758" v="677" actId="21"/>
+          <ac:spMkLst>
+            <pc:docMk/>
+            <pc:sldMk cId="2412790101" sldId="256"/>
+            <ac:spMk id="16" creationId="{DB5FE5E2-2AF1-E6C3-A893-A13186B11D78}"/>
+          </ac:spMkLst>
+        </pc:spChg>
+        <pc:spChg chg="del mod">
+          <ac:chgData name="Fatima Pillosu" userId="a6295d4dc9e22643" providerId="LiveId" clId="{E45A9BF4-C197-4918-8A99-49F61B604D71}" dt="2025-06-11T15:06:44.758" v="677" actId="21"/>
+          <ac:spMkLst>
+            <pc:docMk/>
+            <pc:sldMk cId="2412790101" sldId="256"/>
+            <ac:spMk id="17" creationId="{C697B761-747A-2315-B6B9-C750C47D99DC}"/>
+          </ac:spMkLst>
+        </pc:spChg>
+        <pc:spChg chg="add mod">
+          <ac:chgData name="Fatima Pillosu" userId="a6295d4dc9e22643" providerId="LiveId" clId="{E45A9BF4-C197-4918-8A99-49F61B604D71}" dt="2025-06-11T15:07:01.601" v="678"/>
+          <ac:spMkLst>
+            <pc:docMk/>
+            <pc:sldMk cId="2412790101" sldId="256"/>
+            <ac:spMk id="18" creationId="{DA0A3A3F-6F21-9FFB-DFE8-C73B8123777A}"/>
+          </ac:spMkLst>
+        </pc:spChg>
+        <pc:spChg chg="add mod">
+          <ac:chgData name="Fatima Pillosu" userId="a6295d4dc9e22643" providerId="LiveId" clId="{E45A9BF4-C197-4918-8A99-49F61B604D71}" dt="2025-06-11T15:07:01.601" v="678"/>
+          <ac:spMkLst>
+            <pc:docMk/>
+            <pc:sldMk cId="2412790101" sldId="256"/>
+            <ac:spMk id="19" creationId="{DB5FE5E2-2AF1-E6C3-A893-A13186B11D78}"/>
+          </ac:spMkLst>
+        </pc:spChg>
+        <pc:spChg chg="del">
+          <ac:chgData name="Fatima Pillosu" userId="a6295d4dc9e22643" providerId="LiveId" clId="{E45A9BF4-C197-4918-8A99-49F61B604D71}" dt="2025-06-11T14:40:38.191" v="0" actId="478"/>
+          <ac:spMkLst>
+            <pc:docMk/>
+            <pc:sldMk cId="2412790101" sldId="256"/>
+            <ac:spMk id="20" creationId="{4245987F-BE81-E206-9BA2-6D40FB210E59}"/>
+          </ac:spMkLst>
+        </pc:spChg>
+        <pc:spChg chg="del">
+          <ac:chgData name="Fatima Pillosu" userId="a6295d4dc9e22643" providerId="LiveId" clId="{E45A9BF4-C197-4918-8A99-49F61B604D71}" dt="2025-06-11T14:40:38.191" v="0" actId="478"/>
+          <ac:spMkLst>
+            <pc:docMk/>
+            <pc:sldMk cId="2412790101" sldId="256"/>
+            <ac:spMk id="21" creationId="{E88CAF47-5440-73C9-1B42-B3885629252B}"/>
+          </ac:spMkLst>
+        </pc:spChg>
+        <pc:spChg chg="del">
+          <ac:chgData name="Fatima Pillosu" userId="a6295d4dc9e22643" providerId="LiveId" clId="{E45A9BF4-C197-4918-8A99-49F61B604D71}" dt="2025-06-11T14:40:38.191" v="0" actId="478"/>
+          <ac:spMkLst>
+            <pc:docMk/>
+            <pc:sldMk cId="2412790101" sldId="256"/>
+            <ac:spMk id="22" creationId="{F0379129-0B4C-9E6E-3C06-018694AD7810}"/>
+          </ac:spMkLst>
+        </pc:spChg>
+        <pc:spChg chg="del">
+          <ac:chgData name="Fatima Pillosu" userId="a6295d4dc9e22643" providerId="LiveId" clId="{E45A9BF4-C197-4918-8A99-49F61B604D71}" dt="2025-06-11T14:40:38.191" v="0" actId="478"/>
+          <ac:spMkLst>
+            <pc:docMk/>
+            <pc:sldMk cId="2412790101" sldId="256"/>
+            <ac:spMk id="23" creationId="{ED3F179D-B885-7D31-FEC9-958FC08D0EE6}"/>
+          </ac:spMkLst>
+        </pc:spChg>
+        <pc:spChg chg="add mod">
+          <ac:chgData name="Fatima Pillosu" userId="a6295d4dc9e22643" providerId="LiveId" clId="{E45A9BF4-C197-4918-8A99-49F61B604D71}" dt="2025-06-11T15:07:01.601" v="678"/>
+          <ac:spMkLst>
+            <pc:docMk/>
+            <pc:sldMk cId="2412790101" sldId="256"/>
+            <ac:spMk id="24" creationId="{C697B761-747A-2315-B6B9-C750C47D99DC}"/>
+          </ac:spMkLst>
+        </pc:spChg>
+        <pc:spChg chg="add mod">
+          <ac:chgData name="Fatima Pillosu" userId="a6295d4dc9e22643" providerId="LiveId" clId="{E45A9BF4-C197-4918-8A99-49F61B604D71}" dt="2025-06-11T15:07:01.601" v="678"/>
+          <ac:spMkLst>
+            <pc:docMk/>
+            <pc:sldMk cId="2412790101" sldId="256"/>
+            <ac:spMk id="28" creationId="{3FA77F1B-56D8-FF8C-7ECE-F7D395C2B6A3}"/>
+          </ac:spMkLst>
+        </pc:spChg>
+        <pc:spChg chg="del">
+          <ac:chgData name="Fatima Pillosu" userId="a6295d4dc9e22643" providerId="LiveId" clId="{E45A9BF4-C197-4918-8A99-49F61B604D71}" dt="2025-06-11T14:40:38.191" v="0" actId="478"/>
+          <ac:spMkLst>
+            <pc:docMk/>
+            <pc:sldMk cId="2412790101" sldId="256"/>
+            <ac:spMk id="29" creationId="{03BDF258-EAE2-5C51-887C-04325961DE3E}"/>
+          </ac:spMkLst>
+        </pc:spChg>
+        <pc:spChg chg="del">
+          <ac:chgData name="Fatima Pillosu" userId="a6295d4dc9e22643" providerId="LiveId" clId="{E45A9BF4-C197-4918-8A99-49F61B604D71}" dt="2025-06-11T14:40:38.191" v="0" actId="478"/>
+          <ac:spMkLst>
+            <pc:docMk/>
+            <pc:sldMk cId="2412790101" sldId="256"/>
+            <ac:spMk id="30" creationId="{270F2959-BD8B-2196-95FB-8D47C2F8DFEE}"/>
+          </ac:spMkLst>
+        </pc:spChg>
+        <pc:spChg chg="add mod">
+          <ac:chgData name="Fatima Pillosu" userId="a6295d4dc9e22643" providerId="LiveId" clId="{E45A9BF4-C197-4918-8A99-49F61B604D71}" dt="2025-06-11T15:07:01.601" v="678"/>
+          <ac:spMkLst>
+            <pc:docMk/>
+            <pc:sldMk cId="2412790101" sldId="256"/>
+            <ac:spMk id="31" creationId="{44B1E732-CD1A-C841-C76B-2D4E477D2BEA}"/>
+          </ac:spMkLst>
+        </pc:spChg>
+        <pc:spChg chg="del mod">
+          <ac:chgData name="Fatima Pillosu" userId="a6295d4dc9e22643" providerId="LiveId" clId="{E45A9BF4-C197-4918-8A99-49F61B604D71}" dt="2025-06-11T15:06:44.758" v="677" actId="21"/>
+          <ac:spMkLst>
+            <pc:docMk/>
+            <pc:sldMk cId="2412790101" sldId="256"/>
+            <ac:spMk id="33" creationId="{3FA77F1B-56D8-FF8C-7ECE-F7D395C2B6A3}"/>
+          </ac:spMkLst>
+        </pc:spChg>
+        <pc:spChg chg="del mod">
+          <ac:chgData name="Fatima Pillosu" userId="a6295d4dc9e22643" providerId="LiveId" clId="{E45A9BF4-C197-4918-8A99-49F61B604D71}" dt="2025-06-11T15:06:44.758" v="677" actId="21"/>
+          <ac:spMkLst>
+            <pc:docMk/>
+            <pc:sldMk cId="2412790101" sldId="256"/>
+            <ac:spMk id="34" creationId="{44B1E732-CD1A-C841-C76B-2D4E477D2BEA}"/>
+          </ac:spMkLst>
+        </pc:spChg>
+        <pc:spChg chg="add mod">
+          <ac:chgData name="Fatima Pillosu" userId="a6295d4dc9e22643" providerId="LiveId" clId="{E45A9BF4-C197-4918-8A99-49F61B604D71}" dt="2025-06-11T15:07:01.601" v="678"/>
+          <ac:spMkLst>
+            <pc:docMk/>
+            <pc:sldMk cId="2412790101" sldId="256"/>
+            <ac:spMk id="35" creationId="{68257504-6232-AE97-65EB-A783B54CBE6E}"/>
+          </ac:spMkLst>
+        </pc:spChg>
+        <pc:spChg chg="add mod">
+          <ac:chgData name="Fatima Pillosu" userId="a6295d4dc9e22643" providerId="LiveId" clId="{E45A9BF4-C197-4918-8A99-49F61B604D71}" dt="2025-06-11T15:07:01.601" v="678"/>
+          <ac:spMkLst>
+            <pc:docMk/>
+            <pc:sldMk cId="2412790101" sldId="256"/>
+            <ac:spMk id="36" creationId="{FACA616D-C4B5-17C1-769A-FD8F22C41947}"/>
+          </ac:spMkLst>
+        </pc:spChg>
+        <pc:spChg chg="add mod">
+          <ac:chgData name="Fatima Pillosu" userId="a6295d4dc9e22643" providerId="LiveId" clId="{E45A9BF4-C197-4918-8A99-49F61B604D71}" dt="2025-06-11T15:07:01.601" v="678"/>
+          <ac:spMkLst>
+            <pc:docMk/>
+            <pc:sldMk cId="2412790101" sldId="256"/>
+            <ac:spMk id="37" creationId="{F26916BE-D699-C1DD-08D0-AA710FCCDE17}"/>
+          </ac:spMkLst>
+        </pc:spChg>
+        <pc:spChg chg="del mod">
+          <ac:chgData name="Fatima Pillosu" userId="a6295d4dc9e22643" providerId="LiveId" clId="{E45A9BF4-C197-4918-8A99-49F61B604D71}" dt="2025-06-11T15:06:44.758" v="677" actId="21"/>
+          <ac:spMkLst>
+            <pc:docMk/>
+            <pc:sldMk cId="2412790101" sldId="256"/>
+            <ac:spMk id="38" creationId="{68257504-6232-AE97-65EB-A783B54CBE6E}"/>
+          </ac:spMkLst>
+        </pc:spChg>
+        <pc:spChg chg="del mod">
+          <ac:chgData name="Fatima Pillosu" userId="a6295d4dc9e22643" providerId="LiveId" clId="{E45A9BF4-C197-4918-8A99-49F61B604D71}" dt="2025-06-11T15:06:44.758" v="677" actId="21"/>
+          <ac:spMkLst>
+            <pc:docMk/>
+            <pc:sldMk cId="2412790101" sldId="256"/>
+            <ac:spMk id="39" creationId="{FACA616D-C4B5-17C1-769A-FD8F22C41947}"/>
+          </ac:spMkLst>
+        </pc:spChg>
+        <pc:spChg chg="del mod">
+          <ac:chgData name="Fatima Pillosu" userId="a6295d4dc9e22643" providerId="LiveId" clId="{E45A9BF4-C197-4918-8A99-49F61B604D71}" dt="2025-06-11T15:06:44.758" v="677" actId="21"/>
+          <ac:spMkLst>
+            <pc:docMk/>
+            <pc:sldMk cId="2412790101" sldId="256"/>
+            <ac:spMk id="40" creationId="{F26916BE-D699-C1DD-08D0-AA710FCCDE17}"/>
+          </ac:spMkLst>
+        </pc:spChg>
+        <pc:spChg chg="del mod">
+          <ac:chgData name="Fatima Pillosu" userId="a6295d4dc9e22643" providerId="LiveId" clId="{E45A9BF4-C197-4918-8A99-49F61B604D71}" dt="2025-06-11T15:06:44.758" v="677" actId="21"/>
+          <ac:spMkLst>
+            <pc:docMk/>
+            <pc:sldMk cId="2412790101" sldId="256"/>
+            <ac:spMk id="41" creationId="{02EDCF91-6F58-68A4-E039-B443793D57EE}"/>
+          </ac:spMkLst>
+        </pc:spChg>
+        <pc:spChg chg="del mod">
+          <ac:chgData name="Fatima Pillosu" userId="a6295d4dc9e22643" providerId="LiveId" clId="{E45A9BF4-C197-4918-8A99-49F61B604D71}" dt="2025-06-11T15:06:44.758" v="677" actId="21"/>
+          <ac:spMkLst>
+            <pc:docMk/>
+            <pc:sldMk cId="2412790101" sldId="256"/>
+            <ac:spMk id="42" creationId="{8D6F7FC1-F44B-F17D-70EB-2F3046E87765}"/>
+          </ac:spMkLst>
+        </pc:spChg>
+        <pc:spChg chg="del mod">
+          <ac:chgData name="Fatima Pillosu" userId="a6295d4dc9e22643" providerId="LiveId" clId="{E45A9BF4-C197-4918-8A99-49F61B604D71}" dt="2025-06-11T15:06:44.758" v="677" actId="21"/>
+          <ac:spMkLst>
+            <pc:docMk/>
+            <pc:sldMk cId="2412790101" sldId="256"/>
+            <ac:spMk id="43" creationId="{8E390072-E55B-20B8-89E6-4C4585DFB6F8}"/>
+          </ac:spMkLst>
+        </pc:spChg>
+        <pc:spChg chg="del mod">
+          <ac:chgData name="Fatima Pillosu" userId="a6295d4dc9e22643" providerId="LiveId" clId="{E45A9BF4-C197-4918-8A99-49F61B604D71}" dt="2025-06-11T15:06:44.758" v="677" actId="21"/>
+          <ac:spMkLst>
+            <pc:docMk/>
+            <pc:sldMk cId="2412790101" sldId="256"/>
+            <ac:spMk id="44" creationId="{737BB970-06A3-D82D-DD59-9485C3A2FB34}"/>
+          </ac:spMkLst>
+        </pc:spChg>
+        <pc:spChg chg="del mod">
+          <ac:chgData name="Fatima Pillosu" userId="a6295d4dc9e22643" providerId="LiveId" clId="{E45A9BF4-C197-4918-8A99-49F61B604D71}" dt="2025-06-11T15:06:44.758" v="677" actId="21"/>
+          <ac:spMkLst>
+            <pc:docMk/>
+            <pc:sldMk cId="2412790101" sldId="256"/>
+            <ac:spMk id="45" creationId="{88E5E416-C7A1-C227-031E-B35CF991FEFF}"/>
+          </ac:spMkLst>
+        </pc:spChg>
+        <pc:spChg chg="add mod">
+          <ac:chgData name="Fatima Pillosu" userId="a6295d4dc9e22643" providerId="LiveId" clId="{E45A9BF4-C197-4918-8A99-49F61B604D71}" dt="2025-06-11T15:07:01.601" v="678"/>
+          <ac:spMkLst>
+            <pc:docMk/>
+            <pc:sldMk cId="2412790101" sldId="256"/>
+            <ac:spMk id="46" creationId="{02EDCF91-6F58-68A4-E039-B443793D57EE}"/>
+          </ac:spMkLst>
+        </pc:spChg>
+        <pc:spChg chg="add mod">
+          <ac:chgData name="Fatima Pillosu" userId="a6295d4dc9e22643" providerId="LiveId" clId="{E45A9BF4-C197-4918-8A99-49F61B604D71}" dt="2025-06-11T15:07:01.601" v="678"/>
+          <ac:spMkLst>
+            <pc:docMk/>
+            <pc:sldMk cId="2412790101" sldId="256"/>
+            <ac:spMk id="47" creationId="{8D6F7FC1-F44B-F17D-70EB-2F3046E87765}"/>
+          </ac:spMkLst>
+        </pc:spChg>
+        <pc:spChg chg="add mod">
+          <ac:chgData name="Fatima Pillosu" userId="a6295d4dc9e22643" providerId="LiveId" clId="{E45A9BF4-C197-4918-8A99-49F61B604D71}" dt="2025-06-11T15:07:01.601" v="678"/>
+          <ac:spMkLst>
+            <pc:docMk/>
+            <pc:sldMk cId="2412790101" sldId="256"/>
+            <ac:spMk id="48" creationId="{8E390072-E55B-20B8-89E6-4C4585DFB6F8}"/>
+          </ac:spMkLst>
+        </pc:spChg>
+        <pc:spChg chg="add mod">
+          <ac:chgData name="Fatima Pillosu" userId="a6295d4dc9e22643" providerId="LiveId" clId="{E45A9BF4-C197-4918-8A99-49F61B604D71}" dt="2025-06-11T15:07:01.601" v="678"/>
+          <ac:spMkLst>
+            <pc:docMk/>
+            <pc:sldMk cId="2412790101" sldId="256"/>
+            <ac:spMk id="49" creationId="{737BB970-06A3-D82D-DD59-9485C3A2FB34}"/>
+          </ac:spMkLst>
+        </pc:spChg>
+        <pc:spChg chg="add mod">
+          <ac:chgData name="Fatima Pillosu" userId="a6295d4dc9e22643" providerId="LiveId" clId="{E45A9BF4-C197-4918-8A99-49F61B604D71}" dt="2025-06-11T15:07:01.601" v="678"/>
+          <ac:spMkLst>
+            <pc:docMk/>
+            <pc:sldMk cId="2412790101" sldId="256"/>
+            <ac:spMk id="50" creationId="{88E5E416-C7A1-C227-031E-B35CF991FEFF}"/>
+          </ac:spMkLst>
+        </pc:spChg>
+        <pc:spChg chg="add mod">
+          <ac:chgData name="Fatima Pillosu" userId="a6295d4dc9e22643" providerId="LiveId" clId="{E45A9BF4-C197-4918-8A99-49F61B604D71}" dt="2025-06-11T15:07:01.601" v="678"/>
+          <ac:spMkLst>
+            <pc:docMk/>
+            <pc:sldMk cId="2412790101" sldId="256"/>
+            <ac:spMk id="51" creationId="{761A0E4A-D491-74D5-90F0-C519DB1C25DC}"/>
+          </ac:spMkLst>
+        </pc:spChg>
+        <pc:cxnChg chg="del">
+          <ac:chgData name="Fatima Pillosu" userId="a6295d4dc9e22643" providerId="LiveId" clId="{E45A9BF4-C197-4918-8A99-49F61B604D71}" dt="2025-06-11T14:40:38.191" v="0" actId="478"/>
+          <ac:cxnSpMkLst>
+            <pc:docMk/>
+            <pc:sldMk cId="2412790101" sldId="256"/>
+            <ac:cxnSpMk id="25" creationId="{ED91A587-0A65-910E-7888-AF5E98942882}"/>
+          </ac:cxnSpMkLst>
+        </pc:cxnChg>
+        <pc:cxnChg chg="del">
+          <ac:chgData name="Fatima Pillosu" userId="a6295d4dc9e22643" providerId="LiveId" clId="{E45A9BF4-C197-4918-8A99-49F61B604D71}" dt="2025-06-11T14:40:38.191" v="0" actId="478"/>
+          <ac:cxnSpMkLst>
+            <pc:docMk/>
+            <pc:sldMk cId="2412790101" sldId="256"/>
+            <ac:cxnSpMk id="26" creationId="{50849AC7-0405-6E4C-255B-2854D4AC2067}"/>
+          </ac:cxnSpMkLst>
+        </pc:cxnChg>
+        <pc:cxnChg chg="add mod">
+          <ac:chgData name="Fatima Pillosu" userId="a6295d4dc9e22643" providerId="LiveId" clId="{E45A9BF4-C197-4918-8A99-49F61B604D71}" dt="2025-06-11T15:07:01.601" v="678"/>
+          <ac:cxnSpMkLst>
+            <pc:docMk/>
+            <pc:sldMk cId="2412790101" sldId="256"/>
+            <ac:cxnSpMk id="27" creationId="{D31AED20-CCB3-4490-522C-CFA515D0B76F}"/>
+          </ac:cxnSpMkLst>
+        </pc:cxnChg>
+        <pc:cxnChg chg="del mod">
+          <ac:chgData name="Fatima Pillosu" userId="a6295d4dc9e22643" providerId="LiveId" clId="{E45A9BF4-C197-4918-8A99-49F61B604D71}" dt="2025-06-11T15:06:44.758" v="677" actId="21"/>
+          <ac:cxnSpMkLst>
+            <pc:docMk/>
+            <pc:sldMk cId="2412790101" sldId="256"/>
+            <ac:cxnSpMk id="32" creationId="{D31AED20-CCB3-4490-522C-CFA515D0B76F}"/>
           </ac:cxnSpMkLst>
         </pc:cxnChg>
       </pc:sldChg>
@@ -434,7 +850,7 @@
           <a:p>
             <a:fld id="{976F351E-84E9-41B7-B0E8-3865FDEE6578}" type="datetimeFigureOut">
               <a:rPr lang="en-GB" smtClean="0"/>
-              <a:t>07/04/2025</a:t>
+              <a:t>11/06/2025</a:t>
             </a:fld>
             <a:endParaRPr lang="en-GB"/>
           </a:p>
@@ -452,8 +868,8 @@
         </p:nvSpPr>
         <p:spPr>
           <a:xfrm>
-            <a:off x="2503488" y="1143000"/>
-            <a:ext cx="1851025" cy="3086100"/>
+            <a:off x="2027238" y="1143000"/>
+            <a:ext cx="2803525" cy="3086100"/>
           </a:xfrm>
           <a:prstGeom prst="rect">
             <a:avLst/>
@@ -729,7 +1145,12 @@
             <p:ph type="sldImg"/>
           </p:nvPr>
         </p:nvSpPr>
-        <p:spPr/>
+        <p:spPr>
+          <a:xfrm>
+            <a:off x="2027238" y="1143000"/>
+            <a:ext cx="2803525" cy="3086100"/>
+          </a:xfrm>
+        </p:spPr>
       </p:sp>
       <p:sp>
         <p:nvSpPr>
@@ -815,8 +1236,8 @@
         </p:nvSpPr>
         <p:spPr>
           <a:xfrm>
-            <a:off x="323969" y="1178222"/>
-            <a:ext cx="3671650" cy="2506427"/>
+            <a:off x="323969" y="777600"/>
+            <a:ext cx="3671650" cy="1654187"/>
           </a:xfrm>
         </p:spPr>
         <p:txBody>
@@ -847,8 +1268,8 @@
         </p:nvSpPr>
         <p:spPr>
           <a:xfrm>
-            <a:off x="539949" y="3781306"/>
-            <a:ext cx="3239691" cy="1738167"/>
+            <a:off x="539949" y="2495579"/>
+            <a:ext cx="3239691" cy="1147152"/>
           </a:xfrm>
         </p:spPr>
         <p:txBody>
@@ -917,7 +1338,7 @@
           <a:p>
             <a:fld id="{42C97ECD-701F-43E5-BEEA-27FD7C580DC1}" type="datetimeFigureOut">
               <a:rPr lang="en-GB" smtClean="0"/>
-              <a:t>07/04/2025</a:t>
+              <a:t>11/06/2025</a:t>
             </a:fld>
             <a:endParaRPr lang="en-GB"/>
           </a:p>
@@ -968,7 +1389,7 @@
     </p:spTree>
     <p:extLst>
       <p:ext uri="{BB962C8B-B14F-4D97-AF65-F5344CB8AC3E}">
-        <p14:creationId xmlns:p14="http://schemas.microsoft.com/office/powerpoint/2010/main" val="3617167083"/>
+        <p14:creationId xmlns:p14="http://schemas.microsoft.com/office/powerpoint/2010/main" val="510039804"/>
       </p:ext>
     </p:extLst>
   </p:cSld>
@@ -1087,7 +1508,7 @@
           <a:p>
             <a:fld id="{42C97ECD-701F-43E5-BEEA-27FD7C580DC1}" type="datetimeFigureOut">
               <a:rPr lang="en-GB" smtClean="0"/>
-              <a:t>07/04/2025</a:t>
+              <a:t>11/06/2025</a:t>
             </a:fld>
             <a:endParaRPr lang="en-GB"/>
           </a:p>
@@ -1138,7 +1559,7 @@
     </p:spTree>
     <p:extLst>
       <p:ext uri="{BB962C8B-B14F-4D97-AF65-F5344CB8AC3E}">
-        <p14:creationId xmlns:p14="http://schemas.microsoft.com/office/powerpoint/2010/main" val="1353157279"/>
+        <p14:creationId xmlns:p14="http://schemas.microsoft.com/office/powerpoint/2010/main" val="2970113716"/>
       </p:ext>
     </p:extLst>
   </p:cSld>
@@ -1177,8 +1598,8 @@
         </p:nvSpPr>
         <p:spPr>
           <a:xfrm>
-            <a:off x="3091205" y="383297"/>
-            <a:ext cx="931411" cy="6101085"/>
+            <a:off x="3091205" y="252967"/>
+            <a:ext cx="931411" cy="4026582"/>
           </a:xfrm>
         </p:spPr>
         <p:txBody>
@@ -1205,8 +1626,8 @@
         </p:nvSpPr>
         <p:spPr>
           <a:xfrm>
-            <a:off x="296972" y="383297"/>
-            <a:ext cx="2740239" cy="6101085"/>
+            <a:off x="296972" y="252967"/>
+            <a:ext cx="2740239" cy="4026582"/>
           </a:xfrm>
         </p:spPr>
         <p:txBody>
@@ -1267,7 +1688,7 @@
           <a:p>
             <a:fld id="{42C97ECD-701F-43E5-BEEA-27FD7C580DC1}" type="datetimeFigureOut">
               <a:rPr lang="en-GB" smtClean="0"/>
-              <a:t>07/04/2025</a:t>
+              <a:t>11/06/2025</a:t>
             </a:fld>
             <a:endParaRPr lang="en-GB"/>
           </a:p>
@@ -1318,7 +1739,7 @@
     </p:spTree>
     <p:extLst>
       <p:ext uri="{BB962C8B-B14F-4D97-AF65-F5344CB8AC3E}">
-        <p14:creationId xmlns:p14="http://schemas.microsoft.com/office/powerpoint/2010/main" val="2434998388"/>
+        <p14:creationId xmlns:p14="http://schemas.microsoft.com/office/powerpoint/2010/main" val="3543463722"/>
       </p:ext>
     </p:extLst>
   </p:cSld>
@@ -1437,7 +1858,7 @@
           <a:p>
             <a:fld id="{42C97ECD-701F-43E5-BEEA-27FD7C580DC1}" type="datetimeFigureOut">
               <a:rPr lang="en-GB" smtClean="0"/>
-              <a:t>07/04/2025</a:t>
+              <a:t>11/06/2025</a:t>
             </a:fld>
             <a:endParaRPr lang="en-GB"/>
           </a:p>
@@ -1488,7 +1909,7 @@
     </p:spTree>
     <p:extLst>
       <p:ext uri="{BB962C8B-B14F-4D97-AF65-F5344CB8AC3E}">
-        <p14:creationId xmlns:p14="http://schemas.microsoft.com/office/powerpoint/2010/main" val="3342276749"/>
+        <p14:creationId xmlns:p14="http://schemas.microsoft.com/office/powerpoint/2010/main" val="1561256159"/>
       </p:ext>
     </p:extLst>
   </p:cSld>
@@ -1527,8 +1948,8 @@
         </p:nvSpPr>
         <p:spPr>
           <a:xfrm>
-            <a:off x="294722" y="1794831"/>
-            <a:ext cx="3725645" cy="2994714"/>
+            <a:off x="294722" y="1184549"/>
+            <a:ext cx="3725645" cy="1976445"/>
           </a:xfrm>
         </p:spPr>
         <p:txBody>
@@ -1559,8 +1980,8 @@
         </p:nvSpPr>
         <p:spPr>
           <a:xfrm>
-            <a:off x="294722" y="4817876"/>
-            <a:ext cx="3725645" cy="1574849"/>
+            <a:off x="294722" y="3179692"/>
+            <a:ext cx="3725645" cy="1039366"/>
           </a:xfrm>
         </p:spPr>
         <p:txBody>
@@ -1683,7 +2104,7 @@
           <a:p>
             <a:fld id="{42C97ECD-701F-43E5-BEEA-27FD7C580DC1}" type="datetimeFigureOut">
               <a:rPr lang="en-GB" smtClean="0"/>
-              <a:t>07/04/2025</a:t>
+              <a:t>11/06/2025</a:t>
             </a:fld>
             <a:endParaRPr lang="en-GB"/>
           </a:p>
@@ -1734,7 +2155,7 @@
     </p:spTree>
     <p:extLst>
       <p:ext uri="{BB962C8B-B14F-4D97-AF65-F5344CB8AC3E}">
-        <p14:creationId xmlns:p14="http://schemas.microsoft.com/office/powerpoint/2010/main" val="1742769588"/>
+        <p14:creationId xmlns:p14="http://schemas.microsoft.com/office/powerpoint/2010/main" val="3121717307"/>
       </p:ext>
     </p:extLst>
   </p:cSld>
@@ -1796,8 +2217,8 @@
         </p:nvSpPr>
         <p:spPr>
           <a:xfrm>
-            <a:off x="296972" y="1916484"/>
-            <a:ext cx="1835825" cy="4567898"/>
+            <a:off x="296972" y="1264837"/>
+            <a:ext cx="1835825" cy="3014712"/>
           </a:xfrm>
         </p:spPr>
         <p:txBody>
@@ -1853,8 +2274,8 @@
         </p:nvSpPr>
         <p:spPr>
           <a:xfrm>
-            <a:off x="2186791" y="1916484"/>
-            <a:ext cx="1835825" cy="4567898"/>
+            <a:off x="2186791" y="1264837"/>
+            <a:ext cx="1835825" cy="3014712"/>
           </a:xfrm>
         </p:spPr>
         <p:txBody>
@@ -1915,7 +2336,7 @@
           <a:p>
             <a:fld id="{42C97ECD-701F-43E5-BEEA-27FD7C580DC1}" type="datetimeFigureOut">
               <a:rPr lang="en-GB" smtClean="0"/>
-              <a:t>07/04/2025</a:t>
+              <a:t>11/06/2025</a:t>
             </a:fld>
             <a:endParaRPr lang="en-GB"/>
           </a:p>
@@ -1966,7 +2387,7 @@
     </p:spTree>
     <p:extLst>
       <p:ext uri="{BB962C8B-B14F-4D97-AF65-F5344CB8AC3E}">
-        <p14:creationId xmlns:p14="http://schemas.microsoft.com/office/powerpoint/2010/main" val="2654287803"/>
+        <p14:creationId xmlns:p14="http://schemas.microsoft.com/office/powerpoint/2010/main" val="2264559350"/>
       </p:ext>
     </p:extLst>
   </p:cSld>
@@ -2005,8 +2426,8 @@
         </p:nvSpPr>
         <p:spPr>
           <a:xfrm>
-            <a:off x="297534" y="383299"/>
-            <a:ext cx="3725645" cy="1391534"/>
+            <a:off x="297534" y="252968"/>
+            <a:ext cx="3725645" cy="918382"/>
           </a:xfrm>
         </p:spPr>
         <p:txBody>
@@ -2033,8 +2454,8 @@
         </p:nvSpPr>
         <p:spPr>
           <a:xfrm>
-            <a:off x="297535" y="1764832"/>
-            <a:ext cx="1827388" cy="864917"/>
+            <a:off x="297535" y="1164750"/>
+            <a:ext cx="1827388" cy="570826"/>
           </a:xfrm>
         </p:spPr>
         <p:txBody>
@@ -2098,8 +2519,8 @@
         </p:nvSpPr>
         <p:spPr>
           <a:xfrm>
-            <a:off x="297535" y="2629749"/>
-            <a:ext cx="1827388" cy="3867965"/>
+            <a:off x="297535" y="1735576"/>
+            <a:ext cx="1827388" cy="2552772"/>
           </a:xfrm>
         </p:spPr>
         <p:txBody>
@@ -2155,8 +2576,8 @@
         </p:nvSpPr>
         <p:spPr>
           <a:xfrm>
-            <a:off x="2186791" y="1764832"/>
-            <a:ext cx="1836388" cy="864917"/>
+            <a:off x="2186791" y="1164750"/>
+            <a:ext cx="1836388" cy="570826"/>
           </a:xfrm>
         </p:spPr>
         <p:txBody>
@@ -2220,8 +2641,8 @@
         </p:nvSpPr>
         <p:spPr>
           <a:xfrm>
-            <a:off x="2186791" y="2629749"/>
-            <a:ext cx="1836388" cy="3867965"/>
+            <a:off x="2186791" y="1735576"/>
+            <a:ext cx="1836388" cy="2552772"/>
           </a:xfrm>
         </p:spPr>
         <p:txBody>
@@ -2282,7 +2703,7 @@
           <a:p>
             <a:fld id="{42C97ECD-701F-43E5-BEEA-27FD7C580DC1}" type="datetimeFigureOut">
               <a:rPr lang="en-GB" smtClean="0"/>
-              <a:t>07/04/2025</a:t>
+              <a:t>11/06/2025</a:t>
             </a:fld>
             <a:endParaRPr lang="en-GB"/>
           </a:p>
@@ -2333,7 +2754,7 @@
     </p:spTree>
     <p:extLst>
       <p:ext uri="{BB962C8B-B14F-4D97-AF65-F5344CB8AC3E}">
-        <p14:creationId xmlns:p14="http://schemas.microsoft.com/office/powerpoint/2010/main" val="4198270793"/>
+        <p14:creationId xmlns:p14="http://schemas.microsoft.com/office/powerpoint/2010/main" val="174570890"/>
       </p:ext>
     </p:extLst>
   </p:cSld>
@@ -2400,7 +2821,7 @@
           <a:p>
             <a:fld id="{42C97ECD-701F-43E5-BEEA-27FD7C580DC1}" type="datetimeFigureOut">
               <a:rPr lang="en-GB" smtClean="0"/>
-              <a:t>07/04/2025</a:t>
+              <a:t>11/06/2025</a:t>
             </a:fld>
             <a:endParaRPr lang="en-GB"/>
           </a:p>
@@ -2451,7 +2872,7 @@
     </p:spTree>
     <p:extLst>
       <p:ext uri="{BB962C8B-B14F-4D97-AF65-F5344CB8AC3E}">
-        <p14:creationId xmlns:p14="http://schemas.microsoft.com/office/powerpoint/2010/main" val="1803901457"/>
+        <p14:creationId xmlns:p14="http://schemas.microsoft.com/office/powerpoint/2010/main" val="878815597"/>
       </p:ext>
     </p:extLst>
   </p:cSld>
@@ -2495,7 +2916,7 @@
           <a:p>
             <a:fld id="{42C97ECD-701F-43E5-BEEA-27FD7C580DC1}" type="datetimeFigureOut">
               <a:rPr lang="en-GB" smtClean="0"/>
-              <a:t>07/04/2025</a:t>
+              <a:t>11/06/2025</a:t>
             </a:fld>
             <a:endParaRPr lang="en-GB"/>
           </a:p>
@@ -2546,7 +2967,7 @@
     </p:spTree>
     <p:extLst>
       <p:ext uri="{BB962C8B-B14F-4D97-AF65-F5344CB8AC3E}">
-        <p14:creationId xmlns:p14="http://schemas.microsoft.com/office/powerpoint/2010/main" val="3765430337"/>
+        <p14:creationId xmlns:p14="http://schemas.microsoft.com/office/powerpoint/2010/main" val="623411682"/>
       </p:ext>
     </p:extLst>
   </p:cSld>
@@ -2585,8 +3006,8 @@
         </p:nvSpPr>
         <p:spPr>
           <a:xfrm>
-            <a:off x="297534" y="479954"/>
-            <a:ext cx="1393180" cy="1679840"/>
+            <a:off x="297534" y="316759"/>
+            <a:ext cx="1393180" cy="1108657"/>
           </a:xfrm>
         </p:spPr>
         <p:txBody>
@@ -2617,8 +3038,8 @@
         </p:nvSpPr>
         <p:spPr>
           <a:xfrm>
-            <a:off x="1836388" y="1036570"/>
-            <a:ext cx="2186791" cy="5116178"/>
+            <a:off x="1836388" y="684113"/>
+            <a:ext cx="2186791" cy="3376565"/>
           </a:xfrm>
         </p:spPr>
         <p:txBody>
@@ -2702,8 +3123,8 @@
         </p:nvSpPr>
         <p:spPr>
           <a:xfrm>
-            <a:off x="297534" y="2159794"/>
-            <a:ext cx="1393180" cy="4001285"/>
+            <a:off x="297534" y="1425417"/>
+            <a:ext cx="1393180" cy="2640760"/>
           </a:xfrm>
         </p:spPr>
         <p:txBody>
@@ -2772,7 +3193,7 @@
           <a:p>
             <a:fld id="{42C97ECD-701F-43E5-BEEA-27FD7C580DC1}" type="datetimeFigureOut">
               <a:rPr lang="en-GB" smtClean="0"/>
-              <a:t>07/04/2025</a:t>
+              <a:t>11/06/2025</a:t>
             </a:fld>
             <a:endParaRPr lang="en-GB"/>
           </a:p>
@@ -2823,7 +3244,7 @@
     </p:spTree>
     <p:extLst>
       <p:ext uri="{BB962C8B-B14F-4D97-AF65-F5344CB8AC3E}">
-        <p14:creationId xmlns:p14="http://schemas.microsoft.com/office/powerpoint/2010/main" val="2217049618"/>
+        <p14:creationId xmlns:p14="http://schemas.microsoft.com/office/powerpoint/2010/main" val="3900860301"/>
       </p:ext>
     </p:extLst>
   </p:cSld>
@@ -2862,8 +3283,8 @@
         </p:nvSpPr>
         <p:spPr>
           <a:xfrm>
-            <a:off x="297534" y="479954"/>
-            <a:ext cx="1393180" cy="1679840"/>
+            <a:off x="297534" y="316759"/>
+            <a:ext cx="1393180" cy="1108657"/>
           </a:xfrm>
         </p:spPr>
         <p:txBody>
@@ -2894,8 +3315,8 @@
         </p:nvSpPr>
         <p:spPr>
           <a:xfrm>
-            <a:off x="1836388" y="1036570"/>
-            <a:ext cx="2186791" cy="5116178"/>
+            <a:off x="1836388" y="684113"/>
+            <a:ext cx="2186791" cy="3376565"/>
           </a:xfrm>
         </p:spPr>
         <p:txBody>
@@ -2959,8 +3380,8 @@
         </p:nvSpPr>
         <p:spPr>
           <a:xfrm>
-            <a:off x="297534" y="2159794"/>
-            <a:ext cx="1393180" cy="4001285"/>
+            <a:off x="297534" y="1425417"/>
+            <a:ext cx="1393180" cy="2640760"/>
           </a:xfrm>
         </p:spPr>
         <p:txBody>
@@ -3029,7 +3450,7 @@
           <a:p>
             <a:fld id="{42C97ECD-701F-43E5-BEEA-27FD7C580DC1}" type="datetimeFigureOut">
               <a:rPr lang="en-GB" smtClean="0"/>
-              <a:t>07/04/2025</a:t>
+              <a:t>11/06/2025</a:t>
             </a:fld>
             <a:endParaRPr lang="en-GB"/>
           </a:p>
@@ -3080,7 +3501,7 @@
     </p:spTree>
     <p:extLst>
       <p:ext uri="{BB962C8B-B14F-4D97-AF65-F5344CB8AC3E}">
-        <p14:creationId xmlns:p14="http://schemas.microsoft.com/office/powerpoint/2010/main" val="1617452354"/>
+        <p14:creationId xmlns:p14="http://schemas.microsoft.com/office/powerpoint/2010/main" val="893326614"/>
       </p:ext>
     </p:extLst>
   </p:cSld>
@@ -3124,8 +3545,8 @@
         </p:nvSpPr>
         <p:spPr>
           <a:xfrm>
-            <a:off x="296972" y="383299"/>
-            <a:ext cx="3725645" cy="1391534"/>
+            <a:off x="296972" y="252968"/>
+            <a:ext cx="3725645" cy="918382"/>
           </a:xfrm>
           <a:prstGeom prst="rect">
             <a:avLst/>
@@ -3157,8 +3578,8 @@
         </p:nvSpPr>
         <p:spPr>
           <a:xfrm>
-            <a:off x="296972" y="1916484"/>
-            <a:ext cx="3725645" cy="4567898"/>
+            <a:off x="296972" y="1264837"/>
+            <a:ext cx="3725645" cy="3014712"/>
           </a:xfrm>
           <a:prstGeom prst="rect">
             <a:avLst/>
@@ -3219,8 +3640,8 @@
         </p:nvSpPr>
         <p:spPr>
           <a:xfrm>
-            <a:off x="296972" y="6672698"/>
-            <a:ext cx="971907" cy="383297"/>
+            <a:off x="296972" y="4403834"/>
+            <a:ext cx="971907" cy="252967"/>
           </a:xfrm>
           <a:prstGeom prst="rect">
             <a:avLst/>
@@ -3242,7 +3663,7 @@
           <a:p>
             <a:fld id="{42C97ECD-701F-43E5-BEEA-27FD7C580DC1}" type="datetimeFigureOut">
               <a:rPr lang="en-GB" smtClean="0"/>
-              <a:t>07/04/2025</a:t>
+              <a:t>11/06/2025</a:t>
             </a:fld>
             <a:endParaRPr lang="en-GB"/>
           </a:p>
@@ -3260,8 +3681,8 @@
         </p:nvSpPr>
         <p:spPr>
           <a:xfrm>
-            <a:off x="1430864" y="6672698"/>
-            <a:ext cx="1457861" cy="383297"/>
+            <a:off x="1430864" y="4403834"/>
+            <a:ext cx="1457861" cy="252967"/>
           </a:xfrm>
           <a:prstGeom prst="rect">
             <a:avLst/>
@@ -3297,8 +3718,8 @@
         </p:nvSpPr>
         <p:spPr>
           <a:xfrm>
-            <a:off x="3050709" y="6672698"/>
-            <a:ext cx="971907" cy="383297"/>
+            <a:off x="3050709" y="4403834"/>
+            <a:ext cx="971907" cy="252967"/>
           </a:xfrm>
           <a:prstGeom prst="rect">
             <a:avLst/>
@@ -3329,23 +3750,23 @@
     </p:spTree>
     <p:extLst>
       <p:ext uri="{BB962C8B-B14F-4D97-AF65-F5344CB8AC3E}">
-        <p14:creationId xmlns:p14="http://schemas.microsoft.com/office/powerpoint/2010/main" val="1610335434"/>
+        <p14:creationId xmlns:p14="http://schemas.microsoft.com/office/powerpoint/2010/main" val="341480541"/>
       </p:ext>
     </p:extLst>
   </p:cSld>
   <p:clrMap bg1="lt1" tx1="dk1" bg2="lt2" tx2="dk2" accent1="accent1" accent2="accent2" accent3="accent3" accent4="accent4" accent5="accent5" accent6="accent6" hlink="hlink" folHlink="folHlink"/>
   <p:sldLayoutIdLst>
-    <p:sldLayoutId id="2147483673" r:id="rId1"/>
-    <p:sldLayoutId id="2147483674" r:id="rId2"/>
-    <p:sldLayoutId id="2147483675" r:id="rId3"/>
-    <p:sldLayoutId id="2147483676" r:id="rId4"/>
-    <p:sldLayoutId id="2147483677" r:id="rId5"/>
-    <p:sldLayoutId id="2147483678" r:id="rId6"/>
-    <p:sldLayoutId id="2147483679" r:id="rId7"/>
-    <p:sldLayoutId id="2147483680" r:id="rId8"/>
-    <p:sldLayoutId id="2147483681" r:id="rId9"/>
-    <p:sldLayoutId id="2147483682" r:id="rId10"/>
-    <p:sldLayoutId id="2147483683" r:id="rId11"/>
+    <p:sldLayoutId id="2147483685" r:id="rId1"/>
+    <p:sldLayoutId id="2147483686" r:id="rId2"/>
+    <p:sldLayoutId id="2147483687" r:id="rId3"/>
+    <p:sldLayoutId id="2147483688" r:id="rId4"/>
+    <p:sldLayoutId id="2147483689" r:id="rId5"/>
+    <p:sldLayoutId id="2147483690" r:id="rId6"/>
+    <p:sldLayoutId id="2147483691" r:id="rId7"/>
+    <p:sldLayoutId id="2147483692" r:id="rId8"/>
+    <p:sldLayoutId id="2147483693" r:id="rId9"/>
+    <p:sldLayoutId id="2147483694" r:id="rId10"/>
+    <p:sldLayoutId id="2147483695" r:id="rId11"/>
   </p:sldLayoutIdLst>
   <p:txStyles>
     <p:titleStyle>
@@ -3649,7 +4070,7 @@
       </p:grpSpPr>
       <p:sp>
         <p:nvSpPr>
-          <p:cNvPr id="6" name="TextBox 5">
+          <p:cNvPr id="4" name="TextBox 3">
             <a:extLst>
               <a:ext uri="{FF2B5EF4-FFF2-40B4-BE49-F238E27FC236}">
                 <a16:creationId xmlns:a16="http://schemas.microsoft.com/office/drawing/2014/main" id="{E38ABB4D-863F-E734-71F8-6A361F5E1DE3}"/>
@@ -3661,8 +4082,8 @@
         </p:nvSpPr>
         <p:spPr>
           <a:xfrm>
-            <a:off x="-1" y="683850"/>
-            <a:ext cx="430887" cy="1200329"/>
+            <a:off x="-97281" y="714629"/>
+            <a:ext cx="492443" cy="1079492"/>
           </a:xfrm>
           <a:prstGeom prst="rect">
             <a:avLst/>
@@ -3677,8 +4098,9 @@
           <a:p>
             <a:pPr algn="ctr"/>
             <a:r>
-              <a:rPr lang="en-GB" sz="800" dirty="0">
-                <a:latin typeface="Avenir Next LT Pro Demi" panose="020B0704020202020204" pitchFamily="34" charset="0"/>
+              <a:rPr lang="en-GB" sz="1000" b="1" dirty="0">
+                <a:latin typeface="Calibri" panose="020F0502020204030204" pitchFamily="34" charset="0"/>
+                <a:cs typeface="Calibri" panose="020F0502020204030204" pitchFamily="34" charset="0"/>
               </a:rPr>
               <a:t>RESEARCH QUESTIONS (RQ)</a:t>
             </a:r>
@@ -3687,120 +4109,7 @@
       </p:sp>
       <p:sp>
         <p:nvSpPr>
-          <p:cNvPr id="7" name="TextBox 6">
-            <a:extLst>
-              <a:ext uri="{FF2B5EF4-FFF2-40B4-BE49-F238E27FC236}">
-                <a16:creationId xmlns:a16="http://schemas.microsoft.com/office/drawing/2014/main" id="{5F9C8026-4C6B-D6F9-CA2C-A59B5ECF5D00}"/>
-              </a:ext>
-            </a:extLst>
-          </p:cNvPr>
-          <p:cNvSpPr txBox="1"/>
-          <p:nvPr/>
-        </p:nvSpPr>
-        <p:spPr>
-          <a:xfrm>
-            <a:off x="-1" y="5063464"/>
-            <a:ext cx="307777" cy="1323975"/>
-          </a:xfrm>
-          <a:prstGeom prst="rect">
-            <a:avLst/>
-          </a:prstGeom>
-          <a:noFill/>
-        </p:spPr>
-        <p:txBody>
-          <a:bodyPr vert="vert270" wrap="square" rtlCol="0">
-            <a:spAutoFit/>
-          </a:bodyPr>
-          <a:lstStyle/>
-          <a:p>
-            <a:r>
-              <a:rPr lang="en-GB" sz="800" dirty="0">
-                <a:latin typeface="Avenir Next LT Pro Demi" panose="020B0704020202020204" pitchFamily="34" charset="0"/>
-              </a:rPr>
-              <a:t>EVALUATION STRATEGY</a:t>
-            </a:r>
-          </a:p>
-        </p:txBody>
-      </p:sp>
-      <p:sp>
-        <p:nvSpPr>
-          <p:cNvPr id="8" name="TextBox 7">
-            <a:extLst>
-              <a:ext uri="{FF2B5EF4-FFF2-40B4-BE49-F238E27FC236}">
-                <a16:creationId xmlns:a16="http://schemas.microsoft.com/office/drawing/2014/main" id="{31C95DF1-1021-B801-DF6E-518471057358}"/>
-              </a:ext>
-            </a:extLst>
-          </p:cNvPr>
-          <p:cNvSpPr txBox="1"/>
-          <p:nvPr/>
-        </p:nvSpPr>
-        <p:spPr>
-          <a:xfrm>
-            <a:off x="279379" y="5734977"/>
-            <a:ext cx="307777" cy="1464336"/>
-          </a:xfrm>
-          <a:prstGeom prst="rect">
-            <a:avLst/>
-          </a:prstGeom>
-          <a:noFill/>
-        </p:spPr>
-        <p:txBody>
-          <a:bodyPr vert="vert270" wrap="square" rtlCol="0">
-            <a:spAutoFit/>
-          </a:bodyPr>
-          <a:lstStyle/>
-          <a:p>
-            <a:pPr algn="ctr"/>
-            <a:r>
-              <a:rPr lang="en-GB" sz="800" dirty="0">
-                <a:latin typeface="Avenir Next LT Pro Demi" panose="020B0704020202020204" pitchFamily="34" charset="0"/>
-              </a:rPr>
-              <a:t>Subjective Verification</a:t>
-            </a:r>
-          </a:p>
-        </p:txBody>
-      </p:sp>
-      <p:sp>
-        <p:nvSpPr>
-          <p:cNvPr id="9" name="TextBox 8">
-            <a:extLst>
-              <a:ext uri="{FF2B5EF4-FFF2-40B4-BE49-F238E27FC236}">
-                <a16:creationId xmlns:a16="http://schemas.microsoft.com/office/drawing/2014/main" id="{26DAFA34-6888-C3F6-07E1-0C3D78F45867}"/>
-              </a:ext>
-            </a:extLst>
-          </p:cNvPr>
-          <p:cNvSpPr txBox="1"/>
-          <p:nvPr/>
-        </p:nvSpPr>
-        <p:spPr>
-          <a:xfrm>
-            <a:off x="279379" y="3855852"/>
-            <a:ext cx="307777" cy="1879125"/>
-          </a:xfrm>
-          <a:prstGeom prst="rect">
-            <a:avLst/>
-          </a:prstGeom>
-          <a:noFill/>
-        </p:spPr>
-        <p:txBody>
-          <a:bodyPr vert="vert270" wrap="square" rtlCol="0">
-            <a:spAutoFit/>
-          </a:bodyPr>
-          <a:lstStyle/>
-          <a:p>
-            <a:pPr algn="ctr"/>
-            <a:r>
-              <a:rPr lang="en-GB" sz="800" dirty="0">
-                <a:latin typeface="Avenir Next LT Pro Demi" panose="020B0704020202020204" pitchFamily="34" charset="0"/>
-              </a:rPr>
-              <a:t>Objective Verification</a:t>
-            </a:r>
-          </a:p>
-        </p:txBody>
-      </p:sp>
-      <p:sp>
-        <p:nvSpPr>
-          <p:cNvPr id="12" name="Rectangle 11">
+          <p:cNvPr id="5" name="Rectangle 4">
             <a:extLst>
               <a:ext uri="{FF2B5EF4-FFF2-40B4-BE49-F238E27FC236}">
                 <a16:creationId xmlns:a16="http://schemas.microsoft.com/office/drawing/2014/main" id="{887FF438-27CB-7933-3FF0-750C83E136A4}"/>
@@ -3812,7 +4121,7 @@
         </p:nvSpPr>
         <p:spPr>
           <a:xfrm>
-            <a:off x="3095588" y="276225"/>
+            <a:off x="3066404" y="276225"/>
             <a:ext cx="1224000" cy="360000"/>
           </a:xfrm>
           <a:prstGeom prst="rect">
@@ -3847,11 +4156,12 @@
           <a:p>
             <a:pPr algn="ctr"/>
             <a:r>
-              <a:rPr lang="en-GB" sz="800" dirty="0">
+              <a:rPr lang="en-GB" sz="1000" dirty="0">
                 <a:solidFill>
                   <a:schemeClr val="bg1"/>
                 </a:solidFill>
-                <a:latin typeface="Avenir Next LT Pro Demi" panose="020B0704020202020204" pitchFamily="34" charset="0"/>
+                <a:latin typeface="Calibri Light" panose="020F0302020204030204" pitchFamily="34" charset="0"/>
+                <a:cs typeface="Calibri Light" panose="020F0302020204030204" pitchFamily="34" charset="0"/>
               </a:rPr>
               <a:t>Chapter 7</a:t>
             </a:r>
@@ -3860,7 +4170,7 @@
       </p:sp>
       <p:sp>
         <p:nvSpPr>
-          <p:cNvPr id="13" name="Rectangle 12">
+          <p:cNvPr id="10" name="Rectangle 9">
             <a:extLst>
               <a:ext uri="{FF2B5EF4-FFF2-40B4-BE49-F238E27FC236}">
                 <a16:creationId xmlns:a16="http://schemas.microsoft.com/office/drawing/2014/main" id="{94699DC0-F296-4F13-1267-BB22E3869038}"/>
@@ -3872,7 +4182,7 @@
         </p:nvSpPr>
         <p:spPr>
           <a:xfrm>
-            <a:off x="1825954" y="276225"/>
+            <a:off x="1757092" y="276225"/>
             <a:ext cx="1224000" cy="360000"/>
           </a:xfrm>
           <a:prstGeom prst="rect">
@@ -3907,11 +4217,12 @@
           <a:p>
             <a:pPr algn="ctr"/>
             <a:r>
-              <a:rPr lang="en-GB" sz="800" dirty="0">
+              <a:rPr lang="en-GB" sz="1000" dirty="0">
                 <a:solidFill>
                   <a:schemeClr val="bg1"/>
                 </a:solidFill>
-                <a:latin typeface="Avenir Next LT Pro Demi" panose="020B0704020202020204" pitchFamily="34" charset="0"/>
+                <a:latin typeface="Calibri Light" panose="020F0302020204030204" pitchFamily="34" charset="0"/>
+                <a:cs typeface="Calibri Light" panose="020F0302020204030204" pitchFamily="34" charset="0"/>
               </a:rPr>
               <a:t>Chapter 6</a:t>
             </a:r>
@@ -3920,7 +4231,7 @@
       </p:sp>
       <p:sp>
         <p:nvSpPr>
-          <p:cNvPr id="14" name="Rectangle 13">
+          <p:cNvPr id="11" name="Rectangle 10">
             <a:extLst>
               <a:ext uri="{FF2B5EF4-FFF2-40B4-BE49-F238E27FC236}">
                 <a16:creationId xmlns:a16="http://schemas.microsoft.com/office/drawing/2014/main" id="{B70B7DAE-BBF8-26B9-F316-694D75EF55A1}"/>
@@ -3932,7 +4243,7 @@
         </p:nvSpPr>
         <p:spPr>
           <a:xfrm>
-            <a:off x="556320" y="276225"/>
+            <a:off x="434272" y="276225"/>
             <a:ext cx="1224000" cy="360000"/>
           </a:xfrm>
           <a:prstGeom prst="rect">
@@ -3967,11 +4278,12 @@
           <a:p>
             <a:pPr algn="ctr"/>
             <a:r>
-              <a:rPr lang="en-GB" sz="800" dirty="0">
+              <a:rPr lang="en-GB" sz="1000" dirty="0">
                 <a:solidFill>
                   <a:schemeClr val="bg1"/>
                 </a:solidFill>
-                <a:latin typeface="Avenir Next LT Pro Demi" panose="020B0704020202020204" pitchFamily="34" charset="0"/>
+                <a:latin typeface="Calibri Light" panose="020F0302020204030204" pitchFamily="34" charset="0"/>
+                <a:cs typeface="Calibri Light" panose="020F0302020204030204" pitchFamily="34" charset="0"/>
               </a:rPr>
               <a:t>Chapter 5</a:t>
             </a:r>
@@ -3980,7 +4292,7 @@
       </p:sp>
       <p:sp>
         <p:nvSpPr>
-          <p:cNvPr id="15" name="TextBox 14">
+          <p:cNvPr id="18" name="TextBox 17">
             <a:extLst>
               <a:ext uri="{FF2B5EF4-FFF2-40B4-BE49-F238E27FC236}">
                 <a16:creationId xmlns:a16="http://schemas.microsoft.com/office/drawing/2014/main" id="{DA0A3A3F-6F21-9FFB-DFE8-C73B8123777A}"/>
@@ -3992,8 +4304,8 @@
         </p:nvSpPr>
         <p:spPr>
           <a:xfrm>
-            <a:off x="556320" y="683850"/>
-            <a:ext cx="1224000" cy="830997"/>
+            <a:off x="365257" y="644938"/>
+            <a:ext cx="1362031" cy="1169551"/>
           </a:xfrm>
           <a:prstGeom prst="rect">
             <a:avLst/>
@@ -4008,14 +4320,31 @@
           <a:p>
             <a:pPr algn="ctr"/>
             <a:r>
-              <a:rPr lang="en-GB" sz="800" dirty="0">
+              <a:rPr lang="en-GB" sz="1000" u="sng" dirty="0">
                 <a:solidFill>
                   <a:schemeClr val="tx1">
                     <a:lumMod val="75000"/>
                     <a:lumOff val="25000"/>
                   </a:schemeClr>
                 </a:solidFill>
-                <a:latin typeface="Avenir Next LT Pro Light" panose="020B0304020202020204" pitchFamily="34" charset="0"/>
+                <a:latin typeface="Calibri Light" panose="020F0302020204030204" pitchFamily="34" charset="0"/>
+                <a:cs typeface="Calibri Light" panose="020F0302020204030204" pitchFamily="34" charset="0"/>
+              </a:rPr>
+              <a:t>RQ1</a:t>
+            </a:r>
+          </a:p>
+          <a:p>
+            <a:pPr algn="ctr"/>
+            <a:r>
+              <a:rPr lang="en-GB" sz="1000" dirty="0">
+                <a:solidFill>
+                  <a:schemeClr val="tx1">
+                    <a:lumMod val="75000"/>
+                    <a:lumOff val="25000"/>
+                  </a:schemeClr>
+                </a:solidFill>
+                <a:latin typeface="Calibri Light" panose="020F0302020204030204" pitchFamily="34" charset="0"/>
+                <a:cs typeface="Calibri Light" panose="020F0302020204030204" pitchFamily="34" charset="0"/>
               </a:rPr>
               <a:t>Can global NWP rainfall forecasts successfully identify areas at risk of flash floods up to medium-range lead times?</a:t>
             </a:r>
@@ -4024,7 +4353,7 @@
       </p:sp>
       <p:sp>
         <p:nvSpPr>
-          <p:cNvPr id="16" name="TextBox 15">
+          <p:cNvPr id="19" name="TextBox 18">
             <a:extLst>
               <a:ext uri="{FF2B5EF4-FFF2-40B4-BE49-F238E27FC236}">
                 <a16:creationId xmlns:a16="http://schemas.microsoft.com/office/drawing/2014/main" id="{DB5FE5E2-2AF1-E6C3-A893-A13186B11D78}"/>
@@ -4036,8 +4365,8 @@
         </p:nvSpPr>
         <p:spPr>
           <a:xfrm>
-            <a:off x="1825954" y="683850"/>
-            <a:ext cx="1224000" cy="1200329"/>
+            <a:off x="1662290" y="644938"/>
+            <a:ext cx="1413605" cy="1169551"/>
           </a:xfrm>
           <a:prstGeom prst="rect">
             <a:avLst/>
@@ -4052,23 +4381,40 @@
           <a:p>
             <a:pPr algn="ctr"/>
             <a:r>
-              <a:rPr lang="en-GB" sz="800" dirty="0">
+              <a:rPr lang="en-GB" sz="1000" u="sng" dirty="0">
                 <a:solidFill>
                   <a:schemeClr val="tx1">
                     <a:lumMod val="75000"/>
                     <a:lumOff val="25000"/>
                   </a:schemeClr>
                 </a:solidFill>
-                <a:latin typeface="Avenir Next LT Pro Light" panose="020B0304020202020204" pitchFamily="34" charset="0"/>
+                <a:latin typeface="Calibri Light" panose="020F0302020204030204" pitchFamily="34" charset="0"/>
+                <a:cs typeface="Calibri Light" panose="020F0302020204030204" pitchFamily="34" charset="0"/>
               </a:rPr>
-              <a:t>Is it feasible to develop a data-driven flash flood prediction using (short-range) hydro-meteorological reanalysis data to predict the probability of flash flood occurrence?</a:t>
-            </a:r>
-          </a:p>
-        </p:txBody>
-      </p:sp>
-      <p:sp>
-        <p:nvSpPr>
-          <p:cNvPr id="17" name="TextBox 16">
+              <a:t>RQ2</a:t>
+            </a:r>
+          </a:p>
+          <a:p>
+            <a:pPr algn="ctr"/>
+            <a:r>
+              <a:rPr lang="en-GB" sz="1000" dirty="0">
+                <a:solidFill>
+                  <a:schemeClr val="tx1">
+                    <a:lumMod val="75000"/>
+                    <a:lumOff val="25000"/>
+                  </a:schemeClr>
+                </a:solidFill>
+                <a:latin typeface="Calibri Light" panose="020F0302020204030204" pitchFamily="34" charset="0"/>
+                <a:cs typeface="Calibri Light" panose="020F0302020204030204" pitchFamily="34" charset="0"/>
+              </a:rPr>
+              <a:t>Is it feasible to develop data-driven predictions of areas at risk of flash floods using hydro-meteorological reanalysis data?</a:t>
+            </a:r>
+          </a:p>
+        </p:txBody>
+      </p:sp>
+      <p:sp>
+        <p:nvSpPr>
+          <p:cNvPr id="24" name="TextBox 23">
             <a:extLst>
               <a:ext uri="{FF2B5EF4-FFF2-40B4-BE49-F238E27FC236}">
                 <a16:creationId xmlns:a16="http://schemas.microsoft.com/office/drawing/2014/main" id="{C697B761-747A-2315-B6B9-C750C47D99DC}"/>
@@ -4080,8 +4426,8 @@
         </p:nvSpPr>
         <p:spPr>
           <a:xfrm>
-            <a:off x="3095588" y="683850"/>
-            <a:ext cx="1224000" cy="707886"/>
+            <a:off x="3066404" y="644938"/>
+            <a:ext cx="1224000" cy="1169551"/>
           </a:xfrm>
           <a:prstGeom prst="rect">
             <a:avLst/>
@@ -4096,503 +4442,43 @@
           <a:p>
             <a:pPr algn="ctr"/>
             <a:r>
-              <a:rPr lang="en-GB" sz="800" dirty="0">
+              <a:rPr lang="en-GB" sz="1000" u="sng" dirty="0">
                 <a:solidFill>
                   <a:schemeClr val="tx1">
                     <a:lumMod val="75000"/>
                     <a:lumOff val="25000"/>
                   </a:schemeClr>
                 </a:solidFill>
-                <a:latin typeface="Avenir Next LT Pro Light" panose="020B0304020202020204" pitchFamily="34" charset="0"/>
+                <a:latin typeface="Calibri Light" panose="020F0302020204030204" pitchFamily="34" charset="0"/>
+                <a:cs typeface="Calibri Light" panose="020F0302020204030204" pitchFamily="34" charset="0"/>
               </a:rPr>
-              <a:t>What is the predictability of data-driven flash flood forecasts at medium-range lead times?</a:t>
-            </a:r>
-          </a:p>
-        </p:txBody>
-      </p:sp>
-      <p:sp>
-        <p:nvSpPr>
-          <p:cNvPr id="20" name="TextBox 19">
-            <a:extLst>
-              <a:ext uri="{FF2B5EF4-FFF2-40B4-BE49-F238E27FC236}">
-                <a16:creationId xmlns:a16="http://schemas.microsoft.com/office/drawing/2014/main" id="{4245987F-BE81-E206-9BA2-6D40FB210E59}"/>
-              </a:ext>
-            </a:extLst>
-          </p:cNvPr>
-          <p:cNvSpPr txBox="1"/>
-          <p:nvPr/>
-        </p:nvSpPr>
-        <p:spPr>
-          <a:xfrm>
-            <a:off x="556320" y="3893953"/>
-            <a:ext cx="1224000" cy="1200329"/>
-          </a:xfrm>
-          <a:prstGeom prst="rect">
-            <a:avLst/>
-          </a:prstGeom>
-          <a:noFill/>
-        </p:spPr>
-        <p:txBody>
-          <a:bodyPr wrap="square" rtlCol="0">
-            <a:spAutoFit/>
-          </a:bodyPr>
-          <a:lstStyle/>
-          <a:p>
-            <a:r>
-              <a:rPr lang="en-GB" sz="800" dirty="0">
-                <a:latin typeface="Avenir Next LT Pro Demi" panose="020B0704020202020204" pitchFamily="34" charset="0"/>
-              </a:rPr>
-              <a:t>Discrimination ability</a:t>
-            </a:r>
-          </a:p>
-          <a:p>
-            <a:r>
-              <a:rPr lang="en-GB" sz="800" dirty="0">
+              <a:t>RQ3</a:t>
+            </a:r>
+          </a:p>
+          <a:p>
+            <a:pPr algn="ctr"/>
+            <a:r>
+              <a:rPr lang="en-GB" sz="1000" dirty="0">
                 <a:solidFill>
                   <a:schemeClr val="tx1">
                     <a:lumMod val="75000"/>
                     <a:lumOff val="25000"/>
                   </a:schemeClr>
                 </a:solidFill>
-                <a:latin typeface="Avenir Next LT Pro Light" panose="020B0304020202020204" pitchFamily="34" charset="0"/>
+                <a:latin typeface="Calibri Light" panose="020F0302020204030204" pitchFamily="34" charset="0"/>
+                <a:cs typeface="Calibri Light" panose="020F0302020204030204" pitchFamily="34" charset="0"/>
               </a:rPr>
-              <a:t>- Receiving Operating Characteristic (ROC) Curves</a:t>
-            </a:r>
-          </a:p>
-          <a:p>
-            <a:r>
-              <a:rPr lang="en-GB" sz="800" dirty="0">
-                <a:solidFill>
-                  <a:schemeClr val="tx1">
-                    <a:lumMod val="75000"/>
-                    <a:lumOff val="25000"/>
-                  </a:schemeClr>
-                </a:solidFill>
-                <a:latin typeface="Avenir Next LT Pro Light" panose="020B0304020202020204" pitchFamily="34" charset="0"/>
-              </a:rPr>
-              <a:t>- Area under the ROC curve</a:t>
-            </a:r>
-          </a:p>
-          <a:p>
-            <a:endParaRPr lang="en-GB" sz="800" dirty="0">
-              <a:solidFill>
-                <a:schemeClr val="tx1">
-                  <a:lumMod val="75000"/>
-                  <a:lumOff val="25000"/>
-                </a:schemeClr>
-              </a:solidFill>
-              <a:latin typeface="Avenir Next LT Pro Light" panose="020B0304020202020204" pitchFamily="34" charset="0"/>
-            </a:endParaRPr>
-          </a:p>
-          <a:p>
-            <a:r>
-              <a:rPr lang="en-GB" sz="800" dirty="0">
-                <a:latin typeface="Avenir Next LT Pro Demi" panose="020B0704020202020204" pitchFamily="34" charset="0"/>
-              </a:rPr>
-              <a:t>Reliability</a:t>
-            </a:r>
-          </a:p>
-          <a:p>
-            <a:r>
-              <a:rPr lang="en-GB" sz="800" dirty="0">
-                <a:solidFill>
-                  <a:schemeClr val="tx1">
-                    <a:lumMod val="75000"/>
-                    <a:lumOff val="25000"/>
-                  </a:schemeClr>
-                </a:solidFill>
-                <a:latin typeface="Avenir Next LT Pro Light" panose="020B0304020202020204" pitchFamily="34" charset="0"/>
-              </a:rPr>
-              <a:t>- Frequency Bias</a:t>
-            </a:r>
-          </a:p>
-        </p:txBody>
-      </p:sp>
-      <p:sp>
-        <p:nvSpPr>
-          <p:cNvPr id="21" name="TextBox 20">
+              <a:t>What is the predictability of data-driven flash flood forecasts at medium-range lead times?</a:t>
+            </a:r>
+          </a:p>
+        </p:txBody>
+      </p:sp>
+      <p:cxnSp>
+        <p:nvCxnSpPr>
+          <p:cNvPr id="27" name="Straight Connector 26">
             <a:extLst>
               <a:ext uri="{FF2B5EF4-FFF2-40B4-BE49-F238E27FC236}">
-                <a16:creationId xmlns:a16="http://schemas.microsoft.com/office/drawing/2014/main" id="{E88CAF47-5440-73C9-1B42-B3885629252B}"/>
-              </a:ext>
-            </a:extLst>
-          </p:cNvPr>
-          <p:cNvSpPr txBox="1"/>
-          <p:nvPr/>
-        </p:nvSpPr>
-        <p:spPr>
-          <a:xfrm>
-            <a:off x="1825953" y="3893953"/>
-            <a:ext cx="1224000" cy="1815882"/>
-          </a:xfrm>
-          <a:prstGeom prst="rect">
-            <a:avLst/>
-          </a:prstGeom>
-          <a:noFill/>
-        </p:spPr>
-        <p:txBody>
-          <a:bodyPr wrap="square" rtlCol="0">
-            <a:spAutoFit/>
-          </a:bodyPr>
-          <a:lstStyle/>
-          <a:p>
-            <a:r>
-              <a:rPr lang="en-GB" sz="800" dirty="0">
-                <a:latin typeface="Avenir Next LT Pro Demi" panose="020B0704020202020204" pitchFamily="34" charset="0"/>
-              </a:rPr>
-              <a:t>Model performance under class imbalance</a:t>
-            </a:r>
-          </a:p>
-          <a:p>
-            <a:r>
-              <a:rPr lang="en-GB" sz="800" dirty="0">
-                <a:solidFill>
-                  <a:schemeClr val="tx1">
-                    <a:lumMod val="75000"/>
-                    <a:lumOff val="25000"/>
-                  </a:schemeClr>
-                </a:solidFill>
-                <a:latin typeface="Avenir Next LT Pro Light" panose="020B0304020202020204" pitchFamily="34" charset="0"/>
-              </a:rPr>
-              <a:t>- Recall score</a:t>
-            </a:r>
-          </a:p>
-          <a:p>
-            <a:r>
-              <a:rPr lang="en-GB" sz="800" dirty="0">
-                <a:solidFill>
-                  <a:schemeClr val="tx1">
-                    <a:lumMod val="75000"/>
-                    <a:lumOff val="25000"/>
-                  </a:schemeClr>
-                </a:solidFill>
-                <a:latin typeface="Avenir Next LT Pro Light" panose="020B0304020202020204" pitchFamily="34" charset="0"/>
-              </a:rPr>
-              <a:t>- F1 score</a:t>
-            </a:r>
-          </a:p>
-          <a:p>
-            <a:endParaRPr lang="en-GB" sz="800" b="1" dirty="0">
-              <a:solidFill>
-                <a:schemeClr val="tx1">
-                  <a:lumMod val="75000"/>
-                  <a:lumOff val="25000"/>
-                </a:schemeClr>
-              </a:solidFill>
-              <a:latin typeface="Avenir Next LT Pro Light" panose="020B0304020202020204" pitchFamily="34" charset="0"/>
-            </a:endParaRPr>
-          </a:p>
-          <a:p>
-            <a:r>
-              <a:rPr lang="en-GB" sz="800" dirty="0">
-                <a:latin typeface="Avenir Next LT Pro Demi" panose="020B0704020202020204" pitchFamily="34" charset="0"/>
-              </a:rPr>
-              <a:t>Discrimination ability</a:t>
-            </a:r>
-          </a:p>
-          <a:p>
-            <a:r>
-              <a:rPr lang="en-GB" sz="800" dirty="0">
-                <a:solidFill>
-                  <a:schemeClr val="tx1">
-                    <a:lumMod val="75000"/>
-                    <a:lumOff val="25000"/>
-                  </a:schemeClr>
-                </a:solidFill>
-                <a:latin typeface="Avenir Next LT Pro Light" panose="020B0304020202020204" pitchFamily="34" charset="0"/>
-              </a:rPr>
-              <a:t>- Receiving Operating Characteristic (ROC) Curves</a:t>
-            </a:r>
-          </a:p>
-          <a:p>
-            <a:r>
-              <a:rPr lang="en-GB" sz="800" dirty="0">
-                <a:solidFill>
-                  <a:schemeClr val="tx1">
-                    <a:lumMod val="75000"/>
-                    <a:lumOff val="25000"/>
-                  </a:schemeClr>
-                </a:solidFill>
-                <a:latin typeface="Avenir Next LT Pro Light" panose="020B0304020202020204" pitchFamily="34" charset="0"/>
-              </a:rPr>
-              <a:t>- Area under the ROC curve</a:t>
-            </a:r>
-          </a:p>
-          <a:p>
-            <a:endParaRPr lang="en-GB" sz="800" dirty="0">
-              <a:solidFill>
-                <a:schemeClr val="tx1">
-                  <a:lumMod val="75000"/>
-                  <a:lumOff val="25000"/>
-                </a:schemeClr>
-              </a:solidFill>
-              <a:latin typeface="Avenir Next LT Pro Light" panose="020B0304020202020204" pitchFamily="34" charset="0"/>
-            </a:endParaRPr>
-          </a:p>
-          <a:p>
-            <a:r>
-              <a:rPr lang="en-GB" sz="800" dirty="0">
-                <a:latin typeface="Avenir Next LT Pro Demi" panose="020B0704020202020204" pitchFamily="34" charset="0"/>
-              </a:rPr>
-              <a:t>Reliability</a:t>
-            </a:r>
-          </a:p>
-          <a:p>
-            <a:r>
-              <a:rPr lang="en-GB" sz="800" dirty="0">
-                <a:solidFill>
-                  <a:schemeClr val="tx1">
-                    <a:lumMod val="75000"/>
-                    <a:lumOff val="25000"/>
-                  </a:schemeClr>
-                </a:solidFill>
-                <a:latin typeface="Avenir Next LT Pro Light" panose="020B0304020202020204" pitchFamily="34" charset="0"/>
-              </a:rPr>
-              <a:t>-Reliability diagram</a:t>
-            </a:r>
-          </a:p>
-        </p:txBody>
-      </p:sp>
-      <p:sp>
-        <p:nvSpPr>
-          <p:cNvPr id="22" name="TextBox 21">
-            <a:extLst>
-              <a:ext uri="{FF2B5EF4-FFF2-40B4-BE49-F238E27FC236}">
-                <a16:creationId xmlns:a16="http://schemas.microsoft.com/office/drawing/2014/main" id="{F0379129-0B4C-9E6E-3C06-018694AD7810}"/>
-              </a:ext>
-            </a:extLst>
-          </p:cNvPr>
-          <p:cNvSpPr txBox="1"/>
-          <p:nvPr/>
-        </p:nvSpPr>
-        <p:spPr>
-          <a:xfrm>
-            <a:off x="3095586" y="3893953"/>
-            <a:ext cx="1224000" cy="1815882"/>
-          </a:xfrm>
-          <a:prstGeom prst="rect">
-            <a:avLst/>
-          </a:prstGeom>
-          <a:noFill/>
-        </p:spPr>
-        <p:txBody>
-          <a:bodyPr wrap="square" rtlCol="0">
-            <a:spAutoFit/>
-          </a:bodyPr>
-          <a:lstStyle/>
-          <a:p>
-            <a:r>
-              <a:rPr lang="en-GB" sz="800" dirty="0">
-                <a:latin typeface="Avenir Next LT Pro Demi" panose="020B0704020202020204" pitchFamily="34" charset="0"/>
-              </a:rPr>
-              <a:t>Model performance under class imbalance</a:t>
-            </a:r>
-          </a:p>
-          <a:p>
-            <a:r>
-              <a:rPr lang="en-GB" sz="800" dirty="0">
-                <a:solidFill>
-                  <a:schemeClr val="tx1">
-                    <a:lumMod val="75000"/>
-                    <a:lumOff val="25000"/>
-                  </a:schemeClr>
-                </a:solidFill>
-                <a:latin typeface="Avenir Next LT Pro Light" panose="020B0304020202020204" pitchFamily="34" charset="0"/>
-              </a:rPr>
-              <a:t>- Recall score</a:t>
-            </a:r>
-          </a:p>
-          <a:p>
-            <a:r>
-              <a:rPr lang="en-GB" sz="800" dirty="0">
-                <a:solidFill>
-                  <a:schemeClr val="tx1">
-                    <a:lumMod val="75000"/>
-                    <a:lumOff val="25000"/>
-                  </a:schemeClr>
-                </a:solidFill>
-                <a:latin typeface="Avenir Next LT Pro Light" panose="020B0304020202020204" pitchFamily="34" charset="0"/>
-              </a:rPr>
-              <a:t>- F1 score</a:t>
-            </a:r>
-          </a:p>
-          <a:p>
-            <a:endParaRPr lang="en-GB" sz="800" b="1" dirty="0">
-              <a:solidFill>
-                <a:schemeClr val="tx1">
-                  <a:lumMod val="75000"/>
-                  <a:lumOff val="25000"/>
-                </a:schemeClr>
-              </a:solidFill>
-              <a:latin typeface="Avenir Next LT Pro Light" panose="020B0304020202020204" pitchFamily="34" charset="0"/>
-            </a:endParaRPr>
-          </a:p>
-          <a:p>
-            <a:r>
-              <a:rPr lang="en-GB" sz="800" dirty="0">
-                <a:latin typeface="Avenir Next LT Pro Demi" panose="020B0704020202020204" pitchFamily="34" charset="0"/>
-              </a:rPr>
-              <a:t>Discrimination</a:t>
-            </a:r>
-            <a:r>
-              <a:rPr lang="en-GB" sz="800" dirty="0">
-                <a:solidFill>
-                  <a:schemeClr val="tx1">
-                    <a:lumMod val="75000"/>
-                    <a:lumOff val="25000"/>
-                  </a:schemeClr>
-                </a:solidFill>
-                <a:latin typeface="Avenir Next LT Pro Demi" panose="020B0704020202020204" pitchFamily="34" charset="0"/>
-              </a:rPr>
-              <a:t> </a:t>
-            </a:r>
-            <a:r>
-              <a:rPr lang="en-GB" sz="800" dirty="0">
-                <a:latin typeface="Avenir Next LT Pro Demi" panose="020B0704020202020204" pitchFamily="34" charset="0"/>
-              </a:rPr>
-              <a:t>ability</a:t>
-            </a:r>
-          </a:p>
-          <a:p>
-            <a:r>
-              <a:rPr lang="en-GB" sz="800" dirty="0">
-                <a:solidFill>
-                  <a:schemeClr val="tx1">
-                    <a:lumMod val="75000"/>
-                    <a:lumOff val="25000"/>
-                  </a:schemeClr>
-                </a:solidFill>
-                <a:latin typeface="Avenir Next LT Pro Light" panose="020B0304020202020204" pitchFamily="34" charset="0"/>
-              </a:rPr>
-              <a:t>- Receiving Operating Characteristic (ROC) Curves</a:t>
-            </a:r>
-          </a:p>
-          <a:p>
-            <a:r>
-              <a:rPr lang="en-GB" sz="800" dirty="0">
-                <a:solidFill>
-                  <a:schemeClr val="tx1">
-                    <a:lumMod val="75000"/>
-                    <a:lumOff val="25000"/>
-                  </a:schemeClr>
-                </a:solidFill>
-                <a:latin typeface="Avenir Next LT Pro Light" panose="020B0304020202020204" pitchFamily="34" charset="0"/>
-              </a:rPr>
-              <a:t>- Area under the ROC curve</a:t>
-            </a:r>
-          </a:p>
-          <a:p>
-            <a:endParaRPr lang="en-GB" sz="800" dirty="0">
-              <a:solidFill>
-                <a:schemeClr val="tx1">
-                  <a:lumMod val="75000"/>
-                  <a:lumOff val="25000"/>
-                </a:schemeClr>
-              </a:solidFill>
-              <a:latin typeface="Avenir Next LT Pro Light" panose="020B0304020202020204" pitchFamily="34" charset="0"/>
-            </a:endParaRPr>
-          </a:p>
-          <a:p>
-            <a:r>
-              <a:rPr lang="en-GB" sz="800" dirty="0">
-                <a:latin typeface="Avenir Next LT Pro Demi" panose="020B0704020202020204" pitchFamily="34" charset="0"/>
-              </a:rPr>
-              <a:t>Reliability</a:t>
-            </a:r>
-          </a:p>
-          <a:p>
-            <a:r>
-              <a:rPr lang="en-GB" sz="800" dirty="0">
-                <a:solidFill>
-                  <a:schemeClr val="tx1">
-                    <a:lumMod val="75000"/>
-                    <a:lumOff val="25000"/>
-                  </a:schemeClr>
-                </a:solidFill>
-                <a:latin typeface="Avenir Next LT Pro Light" panose="020B0304020202020204" pitchFamily="34" charset="0"/>
-              </a:rPr>
-              <a:t>-Reliability diagram</a:t>
-            </a:r>
-          </a:p>
-        </p:txBody>
-      </p:sp>
-      <p:sp>
-        <p:nvSpPr>
-          <p:cNvPr id="23" name="TextBox 22">
-            <a:extLst>
-              <a:ext uri="{FF2B5EF4-FFF2-40B4-BE49-F238E27FC236}">
-                <a16:creationId xmlns:a16="http://schemas.microsoft.com/office/drawing/2014/main" id="{ED3F179D-B885-7D31-FEC9-958FC08D0EE6}"/>
-              </a:ext>
-            </a:extLst>
-          </p:cNvPr>
-          <p:cNvSpPr txBox="1"/>
-          <p:nvPr/>
-        </p:nvSpPr>
-        <p:spPr>
-          <a:xfrm>
-            <a:off x="1825953" y="5755799"/>
-            <a:ext cx="1224000" cy="1323439"/>
-          </a:xfrm>
-          <a:prstGeom prst="rect">
-            <a:avLst/>
-          </a:prstGeom>
-          <a:noFill/>
-        </p:spPr>
-        <p:txBody>
-          <a:bodyPr wrap="square" rtlCol="0">
-            <a:spAutoFit/>
-          </a:bodyPr>
-          <a:lstStyle/>
-          <a:p>
-            <a:r>
-              <a:rPr lang="en-GB" sz="800" dirty="0">
-                <a:solidFill>
-                  <a:schemeClr val="tx1">
-                    <a:lumMod val="75000"/>
-                    <a:lumOff val="25000"/>
-                  </a:schemeClr>
-                </a:solidFill>
-                <a:latin typeface="Avenir Next LT Pro Light" panose="020B0304020202020204" pitchFamily="34" charset="0"/>
-              </a:rPr>
-              <a:t>Collection of case studies to understand predictability performance (at short-range) for:</a:t>
-            </a:r>
-          </a:p>
-          <a:p>
-            <a:r>
-              <a:rPr lang="en-GB" sz="800" dirty="0">
-                <a:solidFill>
-                  <a:schemeClr val="tx1">
-                    <a:lumMod val="75000"/>
-                    <a:lumOff val="25000"/>
-                  </a:schemeClr>
-                </a:solidFill>
-                <a:latin typeface="Avenir Next LT Pro Light" panose="020B0304020202020204" pitchFamily="34" charset="0"/>
-              </a:rPr>
-              <a:t>- Large-scale flash flood events</a:t>
-            </a:r>
-          </a:p>
-          <a:p>
-            <a:r>
-              <a:rPr lang="en-GB" sz="800" dirty="0">
-                <a:solidFill>
-                  <a:schemeClr val="tx1">
-                    <a:lumMod val="75000"/>
-                    <a:lumOff val="25000"/>
-                  </a:schemeClr>
-                </a:solidFill>
-                <a:latin typeface="Avenir Next LT Pro Light" panose="020B0304020202020204" pitchFamily="34" charset="0"/>
-              </a:rPr>
-              <a:t>- Small-scale (localised) flash flood events</a:t>
-            </a:r>
-          </a:p>
-        </p:txBody>
-      </p:sp>
-      <p:cxnSp>
-        <p:nvCxnSpPr>
-          <p:cNvPr id="25" name="Straight Connector 24">
-            <a:extLst>
-              <a:ext uri="{FF2B5EF4-FFF2-40B4-BE49-F238E27FC236}">
-                <a16:creationId xmlns:a16="http://schemas.microsoft.com/office/drawing/2014/main" id="{ED91A587-0A65-910E-7888-AF5E98942882}"/>
+                <a16:creationId xmlns:a16="http://schemas.microsoft.com/office/drawing/2014/main" id="{D31AED20-CCB3-4490-522C-CFA515D0B76F}"/>
               </a:ext>
             </a:extLst>
           </p:cNvPr>
@@ -4601,7 +4487,7 @@
         </p:nvCxnSpPr>
         <p:spPr>
           <a:xfrm>
-            <a:off x="0" y="3855853"/>
+            <a:off x="11480" y="1863911"/>
             <a:ext cx="4319586" cy="0"/>
           </a:xfrm>
           <a:prstGeom prst="line">
@@ -4630,239 +4516,9 @@
           </a:fontRef>
         </p:style>
       </p:cxnSp>
-      <p:cxnSp>
-        <p:nvCxnSpPr>
-          <p:cNvPr id="26" name="Straight Connector 25">
-            <a:extLst>
-              <a:ext uri="{FF2B5EF4-FFF2-40B4-BE49-F238E27FC236}">
-                <a16:creationId xmlns:a16="http://schemas.microsoft.com/office/drawing/2014/main" id="{50849AC7-0405-6E4C-255B-2854D4AC2067}"/>
-              </a:ext>
-            </a:extLst>
-          </p:cNvPr>
-          <p:cNvCxnSpPr>
-            <a:cxnSpLocks/>
-          </p:cNvCxnSpPr>
-          <p:nvPr/>
-        </p:nvCxnSpPr>
-        <p:spPr>
-          <a:xfrm>
-            <a:off x="359588" y="5734977"/>
-            <a:ext cx="3960000" cy="0"/>
-          </a:xfrm>
-          <a:prstGeom prst="line">
-            <a:avLst/>
-          </a:prstGeom>
-          <a:ln w="3175">
-            <a:solidFill>
-              <a:schemeClr val="bg1">
-                <a:lumMod val="75000"/>
-              </a:schemeClr>
-            </a:solidFill>
-          </a:ln>
-        </p:spPr>
-        <p:style>
-          <a:lnRef idx="2">
-            <a:schemeClr val="accent1"/>
-          </a:lnRef>
-          <a:fillRef idx="0">
-            <a:schemeClr val="accent1"/>
-          </a:fillRef>
-          <a:effectRef idx="1">
-            <a:schemeClr val="accent1"/>
-          </a:effectRef>
-          <a:fontRef idx="minor">
-            <a:schemeClr val="tx1"/>
-          </a:fontRef>
-        </p:style>
-      </p:cxnSp>
-      <p:sp>
-        <p:nvSpPr>
-          <p:cNvPr id="29" name="TextBox 28">
-            <a:extLst>
-              <a:ext uri="{FF2B5EF4-FFF2-40B4-BE49-F238E27FC236}">
-                <a16:creationId xmlns:a16="http://schemas.microsoft.com/office/drawing/2014/main" id="{03BDF258-EAE2-5C51-887C-04325961DE3E}"/>
-              </a:ext>
-            </a:extLst>
-          </p:cNvPr>
-          <p:cNvSpPr txBox="1"/>
-          <p:nvPr/>
-        </p:nvSpPr>
-        <p:spPr>
-          <a:xfrm>
-            <a:off x="3107066" y="5755799"/>
-            <a:ext cx="1224000" cy="1323439"/>
-          </a:xfrm>
-          <a:prstGeom prst="rect">
-            <a:avLst/>
-          </a:prstGeom>
-          <a:noFill/>
-        </p:spPr>
-        <p:txBody>
-          <a:bodyPr wrap="square" rtlCol="0">
-            <a:spAutoFit/>
-          </a:bodyPr>
-          <a:lstStyle/>
-          <a:p>
-            <a:r>
-              <a:rPr lang="en-GB" sz="800" dirty="0">
-                <a:solidFill>
-                  <a:schemeClr val="tx1">
-                    <a:lumMod val="75000"/>
-                    <a:lumOff val="25000"/>
-                  </a:schemeClr>
-                </a:solidFill>
-                <a:latin typeface="Avenir Next LT Pro Light" panose="020B0304020202020204" pitchFamily="34" charset="0"/>
-              </a:rPr>
-              <a:t>Collection of case studies to understand predictability performance (at medium-range) for:</a:t>
-            </a:r>
-          </a:p>
-          <a:p>
-            <a:r>
-              <a:rPr lang="en-GB" sz="800" dirty="0">
-                <a:solidFill>
-                  <a:schemeClr val="tx1">
-                    <a:lumMod val="75000"/>
-                    <a:lumOff val="25000"/>
-                  </a:schemeClr>
-                </a:solidFill>
-                <a:latin typeface="Avenir Next LT Pro Light" panose="020B0304020202020204" pitchFamily="34" charset="0"/>
-              </a:rPr>
-              <a:t>- Large-scale flash flood events</a:t>
-            </a:r>
-          </a:p>
-          <a:p>
-            <a:r>
-              <a:rPr lang="en-GB" sz="800" dirty="0">
-                <a:solidFill>
-                  <a:schemeClr val="tx1">
-                    <a:lumMod val="75000"/>
-                    <a:lumOff val="25000"/>
-                  </a:schemeClr>
-                </a:solidFill>
-                <a:latin typeface="Avenir Next LT Pro Light" panose="020B0304020202020204" pitchFamily="34" charset="0"/>
-              </a:rPr>
-              <a:t>- Small-scale (localised) flash flood events</a:t>
-            </a:r>
-          </a:p>
-        </p:txBody>
-      </p:sp>
-      <p:sp>
-        <p:nvSpPr>
-          <p:cNvPr id="30" name="TextBox 29">
-            <a:extLst>
-              <a:ext uri="{FF2B5EF4-FFF2-40B4-BE49-F238E27FC236}">
-                <a16:creationId xmlns:a16="http://schemas.microsoft.com/office/drawing/2014/main" id="{270F2959-BD8B-2196-95FB-8D47C2F8DFEE}"/>
-              </a:ext>
-            </a:extLst>
-          </p:cNvPr>
-          <p:cNvSpPr txBox="1"/>
-          <p:nvPr/>
-        </p:nvSpPr>
-        <p:spPr>
-          <a:xfrm>
-            <a:off x="556320" y="5755799"/>
-            <a:ext cx="1224000" cy="1446550"/>
-          </a:xfrm>
-          <a:prstGeom prst="rect">
-            <a:avLst/>
-          </a:prstGeom>
-          <a:noFill/>
-        </p:spPr>
-        <p:txBody>
-          <a:bodyPr wrap="square" rtlCol="0">
-            <a:spAutoFit/>
-          </a:bodyPr>
-          <a:lstStyle/>
-          <a:p>
-            <a:r>
-              <a:rPr lang="en-GB" sz="800" dirty="0">
-                <a:solidFill>
-                  <a:schemeClr val="tx1">
-                    <a:lumMod val="75000"/>
-                    <a:lumOff val="25000"/>
-                  </a:schemeClr>
-                </a:solidFill>
-                <a:latin typeface="Avenir Next LT Pro Light" panose="020B0304020202020204" pitchFamily="34" charset="0"/>
-              </a:rPr>
-              <a:t>Single case study to understand predictability performance (at short- and medium-range) for:</a:t>
-            </a:r>
-          </a:p>
-          <a:p>
-            <a:r>
-              <a:rPr lang="en-GB" sz="800" dirty="0">
-                <a:solidFill>
-                  <a:schemeClr val="tx1">
-                    <a:lumMod val="75000"/>
-                    <a:lumOff val="25000"/>
-                  </a:schemeClr>
-                </a:solidFill>
-                <a:latin typeface="Avenir Next LT Pro Light" panose="020B0304020202020204" pitchFamily="34" charset="0"/>
-              </a:rPr>
-              <a:t>- Large-scale flash flood events</a:t>
-            </a:r>
-          </a:p>
-          <a:p>
-            <a:r>
-              <a:rPr lang="en-GB" sz="800" dirty="0">
-                <a:solidFill>
-                  <a:schemeClr val="tx1">
-                    <a:lumMod val="75000"/>
-                    <a:lumOff val="25000"/>
-                  </a:schemeClr>
-                </a:solidFill>
-                <a:latin typeface="Avenir Next LT Pro Light" panose="020B0304020202020204" pitchFamily="34" charset="0"/>
-              </a:rPr>
-              <a:t>- Small-scale (localised) flash flood events</a:t>
-            </a:r>
-          </a:p>
-        </p:txBody>
-      </p:sp>
-      <p:cxnSp>
-        <p:nvCxnSpPr>
-          <p:cNvPr id="32" name="Straight Connector 31">
-            <a:extLst>
-              <a:ext uri="{FF2B5EF4-FFF2-40B4-BE49-F238E27FC236}">
-                <a16:creationId xmlns:a16="http://schemas.microsoft.com/office/drawing/2014/main" id="{D31AED20-CCB3-4490-522C-CFA515D0B76F}"/>
-              </a:ext>
-            </a:extLst>
-          </p:cNvPr>
-          <p:cNvCxnSpPr/>
-          <p:nvPr/>
-        </p:nvCxnSpPr>
-        <p:spPr>
-          <a:xfrm>
-            <a:off x="11480" y="1922279"/>
-            <a:ext cx="4319586" cy="0"/>
-          </a:xfrm>
-          <a:prstGeom prst="line">
-            <a:avLst/>
-          </a:prstGeom>
-          <a:ln w="3175">
-            <a:solidFill>
-              <a:schemeClr val="bg1">
-                <a:lumMod val="75000"/>
-              </a:schemeClr>
-            </a:solidFill>
-          </a:ln>
-        </p:spPr>
-        <p:style>
-          <a:lnRef idx="2">
-            <a:schemeClr val="accent1"/>
-          </a:lnRef>
-          <a:fillRef idx="0">
-            <a:schemeClr val="accent1"/>
-          </a:fillRef>
-          <a:effectRef idx="1">
-            <a:schemeClr val="accent1"/>
-          </a:effectRef>
-          <a:fontRef idx="minor">
-            <a:schemeClr val="tx1"/>
-          </a:fontRef>
-        </p:style>
-      </p:cxnSp>
-      <p:sp>
-        <p:nvSpPr>
-          <p:cNvPr id="33" name="TextBox 32">
+      <p:sp>
+        <p:nvSpPr>
+          <p:cNvPr id="28" name="TextBox 27">
             <a:extLst>
               <a:ext uri="{FF2B5EF4-FFF2-40B4-BE49-F238E27FC236}">
                 <a16:creationId xmlns:a16="http://schemas.microsoft.com/office/drawing/2014/main" id="{3FA77F1B-56D8-FF8C-7ECE-F7D395C2B6A3}"/>
@@ -4874,8 +4530,8 @@
         </p:nvSpPr>
         <p:spPr>
           <a:xfrm>
-            <a:off x="-1" y="2336526"/>
-            <a:ext cx="430887" cy="1200329"/>
+            <a:off x="-97281" y="1943931"/>
+            <a:ext cx="492443" cy="2823256"/>
           </a:xfrm>
           <a:prstGeom prst="rect">
             <a:avLst/>
@@ -4890,8 +4546,9 @@
           <a:p>
             <a:pPr algn="ctr"/>
             <a:r>
-              <a:rPr lang="en-GB" sz="800" dirty="0">
-                <a:latin typeface="Avenir Next LT Pro Demi" panose="020B0704020202020204" pitchFamily="34" charset="0"/>
+              <a:rPr lang="en-GB" sz="1000" b="1" dirty="0">
+                <a:latin typeface="Calibri" panose="020F0502020204030204" pitchFamily="34" charset="0"/>
+                <a:cs typeface="Calibri" panose="020F0502020204030204" pitchFamily="34" charset="0"/>
               </a:rPr>
               <a:t>WORKFLOW &amp; </a:t>
             </a:r>
@@ -4899,8 +4556,9 @@
           <a:p>
             <a:pPr algn="ctr"/>
             <a:r>
-              <a:rPr lang="en-GB" sz="800" dirty="0">
-                <a:latin typeface="Avenir Next LT Pro Demi" panose="020B0704020202020204" pitchFamily="34" charset="0"/>
+              <a:rPr lang="en-GB" sz="1000" b="1" dirty="0">
+                <a:latin typeface="Calibri" panose="020F0502020204030204" pitchFamily="34" charset="0"/>
+                <a:cs typeface="Calibri" panose="020F0502020204030204" pitchFamily="34" charset="0"/>
               </a:rPr>
               <a:t>DATA FLOW</a:t>
             </a:r>
@@ -4909,7 +4567,7 @@
       </p:sp>
       <p:sp>
         <p:nvSpPr>
-          <p:cNvPr id="34" name="TextBox 33">
+          <p:cNvPr id="31" name="TextBox 30">
             <a:extLst>
               <a:ext uri="{FF2B5EF4-FFF2-40B4-BE49-F238E27FC236}">
                 <a16:creationId xmlns:a16="http://schemas.microsoft.com/office/drawing/2014/main" id="{44B1E732-CD1A-C841-C76B-2D4E477D2BEA}"/>
@@ -4921,8 +4579,8 @@
         </p:nvSpPr>
         <p:spPr>
           <a:xfrm>
-            <a:off x="556320" y="1943930"/>
-            <a:ext cx="1224000" cy="584775"/>
+            <a:off x="353323" y="1943930"/>
+            <a:ext cx="1385898" cy="707886"/>
           </a:xfrm>
           <a:prstGeom prst="rect">
             <a:avLst/>
@@ -4937,14 +4595,15 @@
           <a:p>
             <a:pPr algn="ctr"/>
             <a:r>
-              <a:rPr lang="en-GB" sz="800" dirty="0">
+              <a:rPr lang="en-GB" sz="1000" dirty="0">
                 <a:solidFill>
                   <a:schemeClr val="tx1">
                     <a:lumMod val="75000"/>
                     <a:lumOff val="25000"/>
                   </a:schemeClr>
                 </a:solidFill>
-                <a:latin typeface="Avenir Next LT Pro Light" panose="020B0304020202020204" pitchFamily="34" charset="0"/>
+                <a:latin typeface="Calibri Light" panose="020F0302020204030204" pitchFamily="34" charset="0"/>
+                <a:cs typeface="Calibri Light" panose="020F0302020204030204" pitchFamily="34" charset="0"/>
               </a:rPr>
               <a:t>Development of flash-flood-focused verification framework for rainfall forecasts.</a:t>
             </a:r>
@@ -4953,7 +4612,7 @@
       </p:sp>
       <p:sp>
         <p:nvSpPr>
-          <p:cNvPr id="38" name="Arrow: Right 37">
+          <p:cNvPr id="35" name="Arrow: Right 34">
             <a:extLst>
               <a:ext uri="{FF2B5EF4-FFF2-40B4-BE49-F238E27FC236}">
                 <a16:creationId xmlns:a16="http://schemas.microsoft.com/office/drawing/2014/main" id="{68257504-6232-AE97-65EB-A783B54CBE6E}"/>
@@ -4965,8 +4624,8 @@
         </p:nvSpPr>
         <p:spPr>
           <a:xfrm>
-            <a:off x="1489807" y="2550355"/>
-            <a:ext cx="581025" cy="294803"/>
+            <a:off x="1177560" y="2775574"/>
+            <a:ext cx="1080000" cy="294803"/>
           </a:xfrm>
           <a:prstGeom prst="rightArrow">
             <a:avLst/>
@@ -5008,13 +4667,16 @@
           <a:lstStyle/>
           <a:p>
             <a:pPr algn="ctr"/>
-            <a:endParaRPr lang="en-GB"/>
-          </a:p>
-        </p:txBody>
-      </p:sp>
-      <p:sp>
-        <p:nvSpPr>
-          <p:cNvPr id="39" name="Arrow: Right 38">
+            <a:endParaRPr lang="en-GB" sz="1000">
+              <a:latin typeface="Calibri Light" panose="020F0302020204030204" pitchFamily="34" charset="0"/>
+              <a:cs typeface="Calibri Light" panose="020F0302020204030204" pitchFamily="34" charset="0"/>
+            </a:endParaRPr>
+          </a:p>
+        </p:txBody>
+      </p:sp>
+      <p:sp>
+        <p:nvSpPr>
+          <p:cNvPr id="36" name="Arrow: Right 35">
             <a:extLst>
               <a:ext uri="{FF2B5EF4-FFF2-40B4-BE49-F238E27FC236}">
                 <a16:creationId xmlns:a16="http://schemas.microsoft.com/office/drawing/2014/main" id="{FACA616D-C4B5-17C1-769A-FD8F22C41947}"/>
@@ -5026,7 +4688,7 @@
         </p:nvSpPr>
         <p:spPr>
           <a:xfrm>
-            <a:off x="1498803" y="3377083"/>
+            <a:off x="1469620" y="4120141"/>
             <a:ext cx="1887295" cy="294803"/>
           </a:xfrm>
           <a:prstGeom prst="rightArrow">
@@ -5069,13 +4731,16 @@
           <a:lstStyle/>
           <a:p>
             <a:pPr algn="ctr"/>
-            <a:endParaRPr lang="en-GB"/>
-          </a:p>
-        </p:txBody>
-      </p:sp>
-      <p:sp>
-        <p:nvSpPr>
-          <p:cNvPr id="40" name="Arrow: Right 39">
+            <a:endParaRPr lang="en-GB" sz="1000">
+              <a:latin typeface="Calibri Light" panose="020F0302020204030204" pitchFamily="34" charset="0"/>
+              <a:cs typeface="Calibri Light" panose="020F0302020204030204" pitchFamily="34" charset="0"/>
+            </a:endParaRPr>
+          </a:p>
+        </p:txBody>
+      </p:sp>
+      <p:sp>
+        <p:nvSpPr>
+          <p:cNvPr id="37" name="Arrow: Right 36">
             <a:extLst>
               <a:ext uri="{FF2B5EF4-FFF2-40B4-BE49-F238E27FC236}">
                 <a16:creationId xmlns:a16="http://schemas.microsoft.com/office/drawing/2014/main" id="{F26916BE-D699-C1DD-08D0-AA710FCCDE17}"/>
@@ -5087,8 +4752,8 @@
         </p:nvSpPr>
         <p:spPr>
           <a:xfrm>
-            <a:off x="2805073" y="2550355"/>
-            <a:ext cx="581025" cy="294803"/>
+            <a:off x="2506948" y="2775574"/>
+            <a:ext cx="1080000" cy="294803"/>
           </a:xfrm>
           <a:prstGeom prst="rightArrow">
             <a:avLst/>
@@ -5130,13 +4795,16 @@
           <a:lstStyle/>
           <a:p>
             <a:pPr algn="ctr"/>
-            <a:endParaRPr lang="en-GB"/>
-          </a:p>
-        </p:txBody>
-      </p:sp>
-      <p:sp>
-        <p:nvSpPr>
-          <p:cNvPr id="41" name="TextBox 40">
+            <a:endParaRPr lang="en-GB" sz="1000">
+              <a:latin typeface="Calibri Light" panose="020F0302020204030204" pitchFamily="34" charset="0"/>
+              <a:cs typeface="Calibri Light" panose="020F0302020204030204" pitchFamily="34" charset="0"/>
+            </a:endParaRPr>
+          </a:p>
+        </p:txBody>
+      </p:sp>
+      <p:sp>
+        <p:nvSpPr>
+          <p:cNvPr id="46" name="TextBox 45">
             <a:extLst>
               <a:ext uri="{FF2B5EF4-FFF2-40B4-BE49-F238E27FC236}">
                 <a16:creationId xmlns:a16="http://schemas.microsoft.com/office/drawing/2014/main" id="{02EDCF91-6F58-68A4-E039-B443793D57EE}"/>
@@ -5148,8 +4816,8 @@
         </p:nvSpPr>
         <p:spPr>
           <a:xfrm>
-            <a:off x="879718" y="2803963"/>
-            <a:ext cx="1623513" cy="584775"/>
+            <a:off x="618681" y="3028681"/>
+            <a:ext cx="1943812" cy="1015663"/>
           </a:xfrm>
           <a:prstGeom prst="rect">
             <a:avLst/>
@@ -5164,23 +4832,24 @@
           <a:p>
             <a:pPr algn="ctr"/>
             <a:r>
-              <a:rPr lang="en-GB" sz="800" dirty="0">
+              <a:rPr lang="en-GB" sz="1000" dirty="0">
                 <a:solidFill>
                   <a:schemeClr val="tx1">
                     <a:lumMod val="75000"/>
                     <a:lumOff val="25000"/>
                   </a:schemeClr>
                 </a:solidFill>
-                <a:latin typeface="Avenir Next LT Pro Light" panose="020B0304020202020204" pitchFamily="34" charset="0"/>
+                <a:latin typeface="Calibri Light" panose="020F0302020204030204" pitchFamily="34" charset="0"/>
+                <a:cs typeface="Calibri Light" panose="020F0302020204030204" pitchFamily="34" charset="0"/>
               </a:rPr>
-              <a:t>Flash-flood-focused verification framework &amp; benchmark from verification of medium-rage rainfall forecasts</a:t>
-            </a:r>
-          </a:p>
-        </p:txBody>
-      </p:sp>
-      <p:sp>
-        <p:nvSpPr>
-          <p:cNvPr id="42" name="TextBox 41">
+              <a:t>Flash-flood-focused verification framework &amp; rainfall-based benchmark forecasts to assess short-range data-driven hydro-meteorological predictions of areas at risk of flash floods.</a:t>
+            </a:r>
+          </a:p>
+        </p:txBody>
+      </p:sp>
+      <p:sp>
+        <p:nvSpPr>
+          <p:cNvPr id="47" name="TextBox 46">
             <a:extLst>
               <a:ext uri="{FF2B5EF4-FFF2-40B4-BE49-F238E27FC236}">
                 <a16:creationId xmlns:a16="http://schemas.microsoft.com/office/drawing/2014/main" id="{8D6F7FC1-F44B-F17D-70EB-2F3046E87765}"/>
@@ -5192,8 +4861,8 @@
         </p:nvSpPr>
         <p:spPr>
           <a:xfrm>
-            <a:off x="2483586" y="2803963"/>
-            <a:ext cx="1224000" cy="584775"/>
+            <a:off x="2500132" y="3028681"/>
+            <a:ext cx="1790272" cy="1015663"/>
           </a:xfrm>
           <a:prstGeom prst="rect">
             <a:avLst/>
@@ -5208,23 +4877,24 @@
           <a:p>
             <a:pPr algn="ctr"/>
             <a:r>
-              <a:rPr lang="en-GB" sz="800" dirty="0">
+              <a:rPr lang="en-GB" sz="1000" dirty="0">
                 <a:solidFill>
                   <a:schemeClr val="tx1">
                     <a:lumMod val="75000"/>
                     <a:lumOff val="25000"/>
                   </a:schemeClr>
                 </a:solidFill>
-                <a:latin typeface="Avenir Next LT Pro Light" panose="020B0304020202020204" pitchFamily="34" charset="0"/>
+                <a:latin typeface="Calibri Light" panose="020F0302020204030204" pitchFamily="34" charset="0"/>
+                <a:cs typeface="Calibri Light" panose="020F0302020204030204" pitchFamily="34" charset="0"/>
               </a:rPr>
-              <a:t>Benchmark from verification of (short-rage) data-driven flash flood forecasts.</a:t>
-            </a:r>
-          </a:p>
-        </p:txBody>
-      </p:sp>
-      <p:sp>
-        <p:nvSpPr>
-          <p:cNvPr id="43" name="TextBox 42">
+              <a:t>Hydro-meteorological benchmark forecasts to assess medium-range data-driven hydro-meteorological predictions of areas at risk of flash floods.</a:t>
+            </a:r>
+          </a:p>
+        </p:txBody>
+      </p:sp>
+      <p:sp>
+        <p:nvSpPr>
+          <p:cNvPr id="48" name="TextBox 47">
             <a:extLst>
               <a:ext uri="{FF2B5EF4-FFF2-40B4-BE49-F238E27FC236}">
                 <a16:creationId xmlns:a16="http://schemas.microsoft.com/office/drawing/2014/main" id="{8E390072-E55B-20B8-89E6-4C4585DFB6F8}"/>
@@ -5236,8 +4906,8 @@
         </p:nvSpPr>
         <p:spPr>
           <a:xfrm>
-            <a:off x="1340441" y="3604562"/>
-            <a:ext cx="2195023" cy="215444"/>
+            <a:off x="1311258" y="4367076"/>
+            <a:ext cx="2195023" cy="400110"/>
           </a:xfrm>
           <a:prstGeom prst="rect">
             <a:avLst/>
@@ -5252,14 +4922,15 @@
           <a:p>
             <a:pPr algn="ctr"/>
             <a:r>
-              <a:rPr lang="en-GB" sz="800" dirty="0">
+              <a:rPr lang="en-GB" sz="1000" dirty="0">
                 <a:solidFill>
                   <a:schemeClr val="tx1">
                     <a:lumMod val="75000"/>
                     <a:lumOff val="25000"/>
                   </a:schemeClr>
                 </a:solidFill>
-                <a:latin typeface="Avenir Next LT Pro Light" panose="020B0304020202020204" pitchFamily="34" charset="0"/>
+                <a:latin typeface="Calibri Light" panose="020F0302020204030204" pitchFamily="34" charset="0"/>
+                <a:cs typeface="Calibri Light" panose="020F0302020204030204" pitchFamily="34" charset="0"/>
               </a:rPr>
               <a:t>Flash-flood-focused verification framework</a:t>
             </a:r>
@@ -5268,7 +4939,7 @@
       </p:sp>
       <p:sp>
         <p:nvSpPr>
-          <p:cNvPr id="44" name="TextBox 43">
+          <p:cNvPr id="49" name="TextBox 48">
             <a:extLst>
               <a:ext uri="{FF2B5EF4-FFF2-40B4-BE49-F238E27FC236}">
                 <a16:creationId xmlns:a16="http://schemas.microsoft.com/office/drawing/2014/main" id="{737BB970-06A3-D82D-DD59-9485C3A2FB34}"/>
@@ -5280,8 +4951,8 @@
         </p:nvSpPr>
         <p:spPr>
           <a:xfrm>
-            <a:off x="1825953" y="1943930"/>
-            <a:ext cx="1224000" cy="584775"/>
+            <a:off x="1757092" y="1943930"/>
+            <a:ext cx="1224000" cy="707886"/>
           </a:xfrm>
           <a:prstGeom prst="rect">
             <a:avLst/>
@@ -5296,14 +4967,15 @@
           <a:p>
             <a:pPr algn="ctr"/>
             <a:r>
-              <a:rPr lang="en-GB" sz="800" dirty="0">
+              <a:rPr lang="en-GB" sz="1000" dirty="0">
                 <a:solidFill>
                   <a:schemeClr val="tx1">
                     <a:lumMod val="75000"/>
                     <a:lumOff val="25000"/>
                   </a:schemeClr>
                 </a:solidFill>
-                <a:latin typeface="Avenir Next LT Pro Light" panose="020B0304020202020204" pitchFamily="34" charset="0"/>
+                <a:latin typeface="Calibri Light" panose="020F0302020204030204" pitchFamily="34" charset="0"/>
+                <a:cs typeface="Calibri Light" panose="020F0302020204030204" pitchFamily="34" charset="0"/>
               </a:rPr>
               <a:t>Development of (short-range) data-driven flash flood forecasts.</a:t>
             </a:r>
@@ -5312,7 +4984,7 @@
       </p:sp>
       <p:sp>
         <p:nvSpPr>
-          <p:cNvPr id="45" name="TextBox 44">
+          <p:cNvPr id="50" name="TextBox 49">
             <a:extLst>
               <a:ext uri="{FF2B5EF4-FFF2-40B4-BE49-F238E27FC236}">
                 <a16:creationId xmlns:a16="http://schemas.microsoft.com/office/drawing/2014/main" id="{88E5E416-C7A1-C227-031E-B35CF991FEFF}"/>
@@ -5325,7 +4997,7 @@
         <p:spPr>
           <a:xfrm>
             <a:off x="3107066" y="1943930"/>
-            <a:ext cx="1224000" cy="584775"/>
+            <a:ext cx="1224000" cy="707886"/>
           </a:xfrm>
           <a:prstGeom prst="rect">
             <a:avLst/>
@@ -5340,14 +5012,15 @@
           <a:p>
             <a:pPr algn="ctr"/>
             <a:r>
-              <a:rPr lang="en-GB" sz="800" dirty="0">
+              <a:rPr lang="en-GB" sz="1000" dirty="0">
                 <a:solidFill>
                   <a:schemeClr val="tx1">
                     <a:lumMod val="75000"/>
                     <a:lumOff val="25000"/>
                   </a:schemeClr>
                 </a:solidFill>
-                <a:latin typeface="Avenir Next LT Pro Light" panose="020B0304020202020204" pitchFamily="34" charset="0"/>
+                <a:latin typeface="Calibri Light" panose="020F0302020204030204" pitchFamily="34" charset="0"/>
+                <a:cs typeface="Calibri Light" panose="020F0302020204030204" pitchFamily="34" charset="0"/>
               </a:rPr>
               <a:t>Development of (medium-range) data-driven flash flood forecasts.</a:t>
             </a:r>
@@ -5356,7 +5029,7 @@
       </p:sp>
       <p:sp>
         <p:nvSpPr>
-          <p:cNvPr id="2" name="TextBox 1">
+          <p:cNvPr id="51" name="TextBox 50">
             <a:extLst>
               <a:ext uri="{FF2B5EF4-FFF2-40B4-BE49-F238E27FC236}">
                 <a16:creationId xmlns:a16="http://schemas.microsoft.com/office/drawing/2014/main" id="{761A0E4A-D491-74D5-90F0-C519DB1C25DC}"/>
@@ -5368,8 +5041,8 @@
         </p:nvSpPr>
         <p:spPr>
           <a:xfrm>
-            <a:off x="556320" y="20087"/>
-            <a:ext cx="3763266" cy="215444"/>
+            <a:off x="434272" y="-28553"/>
+            <a:ext cx="3856132" cy="246221"/>
           </a:xfrm>
           <a:prstGeom prst="rect">
             <a:avLst/>
@@ -5384,20 +5057,19 @@
           <a:p>
             <a:pPr algn="ctr"/>
             <a:r>
-              <a:rPr lang="en-GB" sz="800" dirty="0">
-                <a:latin typeface="Avenir Next LT Pro Demi" panose="020B0704020202020204" pitchFamily="34" charset="0"/>
+              <a:rPr lang="en-GB" sz="1000" b="1" u="sng" dirty="0">
+                <a:latin typeface="Calibri" panose="020F0502020204030204" pitchFamily="34" charset="0"/>
+                <a:cs typeface="Calibri" panose="020F0502020204030204" pitchFamily="34" charset="0"/>
               </a:rPr>
               <a:t>MAIN ANALYSIS </a:t>
             </a:r>
             <a:r>
-              <a:rPr lang="en-GB" sz="800" dirty="0">
-                <a:latin typeface="Avenir Next LT Pro Light" panose="020B0304020202020204" pitchFamily="34" charset="0"/>
+              <a:rPr lang="en-GB" sz="1000" dirty="0">
+                <a:latin typeface="Calibri Light" panose="020F0302020204030204" pitchFamily="34" charset="0"/>
+                <a:cs typeface="Calibri Light" panose="020F0302020204030204" pitchFamily="34" charset="0"/>
               </a:rPr>
               <a:t>CHAPTERS</a:t>
             </a:r>
-            <a:endParaRPr lang="en-GB" sz="800" dirty="0">
-              <a:latin typeface="Avenir Next LT Pro Demi" panose="020B0704020202020204" pitchFamily="34" charset="0"/>
-            </a:endParaRPr>
           </a:p>
         </p:txBody>
       </p:sp>

</xml_diff>

<commit_message>
Improved workflow and dataflow diagram in chapter 3
</commit_message>
<xml_diff>
--- a/chapter_03/figures/workflow_dataflow.pptx
+++ b/chapter_03/figures/workflow_dataflow.pptx
@@ -2,7 +2,7 @@
 <file path=ppt/presentation.xml><?xml version="1.0" encoding="utf-8"?>
 <p:presentation xmlns:a="http://schemas.openxmlformats.org/drawingml/2006/main" xmlns:r="http://schemas.openxmlformats.org/officeDocument/2006/relationships" xmlns:p="http://schemas.openxmlformats.org/presentationml/2006/main" saveSubsetFonts="1">
   <p:sldMasterIdLst>
-    <p:sldMasterId id="2147483684" r:id="rId1"/>
+    <p:sldMasterId id="2147483708" r:id="rId1"/>
   </p:sldMasterIdLst>
   <p:notesMasterIdLst>
     <p:notesMasterId r:id="rId3"/>
@@ -10,7 +10,7 @@
   <p:sldIdLst>
     <p:sldId id="256" r:id="rId2"/>
   </p:sldIdLst>
-  <p:sldSz cx="4319588" cy="4751388"/>
+  <p:sldSz cx="4319588" cy="5562600"/>
   <p:notesSz cx="6858000" cy="9144000"/>
   <p:defaultTextStyle>
     <a:defPPr>
@@ -118,7 +118,7 @@
 <file path=ppt/revisionInfo.xml><?xml version="1.0" encoding="utf-8"?>
 <p1510:revInfo xmlns:a="http://schemas.openxmlformats.org/drawingml/2006/main" xmlns:r="http://schemas.openxmlformats.org/officeDocument/2006/relationships" xmlns:p1510="http://schemas.microsoft.com/office/powerpoint/2015/10/main">
   <p1510:revLst>
-    <p1510:client id="{E45A9BF4-C197-4918-8A99-49F61B604D71}" v="2" dt="2025-06-11T15:07:01.601"/>
+    <p1510:client id="{E45A9BF4-C197-4918-8A99-49F61B604D71}" v="7" dt="2025-06-11T15:25:23.519"/>
   </p1510:revLst>
 </p1510:revInfo>
 </file>
@@ -352,16 +352,24 @@
   <pc:docChgLst>
     <pc:chgData name="Fatima Pillosu" userId="a6295d4dc9e22643" providerId="LiveId" clId="{E45A9BF4-C197-4918-8A99-49F61B604D71}"/>
     <pc:docChg chg="undo custSel modSld">
-      <pc:chgData name="Fatima Pillosu" userId="a6295d4dc9e22643" providerId="LiveId" clId="{E45A9BF4-C197-4918-8A99-49F61B604D71}" dt="2025-06-11T15:07:01.601" v="678"/>
+      <pc:chgData name="Fatima Pillosu" userId="a6295d4dc9e22643" providerId="LiveId" clId="{E45A9BF4-C197-4918-8A99-49F61B604D71}" dt="2025-06-11T15:25:35.089" v="1066" actId="1035"/>
       <pc:docMkLst>
         <pc:docMk/>
       </pc:docMkLst>
       <pc:sldChg chg="addSp delSp modSp mod">
-        <pc:chgData name="Fatima Pillosu" userId="a6295d4dc9e22643" providerId="LiveId" clId="{E45A9BF4-C197-4918-8A99-49F61B604D71}" dt="2025-06-11T15:07:01.601" v="678"/>
+        <pc:chgData name="Fatima Pillosu" userId="a6295d4dc9e22643" providerId="LiveId" clId="{E45A9BF4-C197-4918-8A99-49F61B604D71}" dt="2025-06-11T15:25:35.089" v="1066" actId="1035"/>
         <pc:sldMkLst>
           <pc:docMk/>
           <pc:sldMk cId="2412790101" sldId="256"/>
         </pc:sldMkLst>
+        <pc:spChg chg="add del mod">
+          <ac:chgData name="Fatima Pillosu" userId="a6295d4dc9e22643" providerId="LiveId" clId="{E45A9BF4-C197-4918-8A99-49F61B604D71}" dt="2025-06-11T15:23:24.712" v="1030" actId="21"/>
+          <ac:spMkLst>
+            <pc:docMk/>
+            <pc:sldMk cId="2412790101" sldId="256"/>
+            <ac:spMk id="2" creationId="{5A52E58A-BA02-021E-4F28-6D976EBB835E}"/>
+          </ac:spMkLst>
+        </pc:spChg>
         <pc:spChg chg="del mod">
           <ac:chgData name="Fatima Pillosu" userId="a6295d4dc9e22643" providerId="LiveId" clId="{E45A9BF4-C197-4918-8A99-49F61B604D71}" dt="2025-06-11T15:06:44.758" v="677" actId="21"/>
           <ac:spMkLst>
@@ -378,20 +386,100 @@
             <ac:spMk id="3" creationId="{36223C63-81A0-4638-D176-3FE7B72E439F}"/>
           </ac:spMkLst>
         </pc:spChg>
-        <pc:spChg chg="add mod">
-          <ac:chgData name="Fatima Pillosu" userId="a6295d4dc9e22643" providerId="LiveId" clId="{E45A9BF4-C197-4918-8A99-49F61B604D71}" dt="2025-06-11T15:07:01.601" v="678"/>
+        <pc:spChg chg="add del">
+          <ac:chgData name="Fatima Pillosu" userId="a6295d4dc9e22643" providerId="LiveId" clId="{E45A9BF4-C197-4918-8A99-49F61B604D71}" dt="2025-06-11T15:23:22.895" v="1029" actId="478"/>
+          <ac:spMkLst>
+            <pc:docMk/>
+            <pc:sldMk cId="2412790101" sldId="256"/>
+            <ac:spMk id="3" creationId="{5D915092-ABB9-DDBC-9811-FCAD599F3393}"/>
+          </ac:spMkLst>
+        </pc:spChg>
+        <pc:spChg chg="add del mod">
+          <ac:chgData name="Fatima Pillosu" userId="a6295d4dc9e22643" providerId="LiveId" clId="{E45A9BF4-C197-4918-8A99-49F61B604D71}" dt="2025-06-11T15:23:24.712" v="1030" actId="21"/>
           <ac:spMkLst>
             <pc:docMk/>
             <pc:sldMk cId="2412790101" sldId="256"/>
             <ac:spMk id="4" creationId="{E38ABB4D-863F-E734-71F8-6A361F5E1DE3}"/>
           </ac:spMkLst>
         </pc:spChg>
-        <pc:spChg chg="add mod">
-          <ac:chgData name="Fatima Pillosu" userId="a6295d4dc9e22643" providerId="LiveId" clId="{E45A9BF4-C197-4918-8A99-49F61B604D71}" dt="2025-06-11T15:07:01.601" v="678"/>
+        <pc:spChg chg="add del mod">
+          <ac:chgData name="Fatima Pillosu" userId="a6295d4dc9e22643" providerId="LiveId" clId="{E45A9BF4-C197-4918-8A99-49F61B604D71}" dt="2025-06-11T15:23:24.712" v="1030" actId="21"/>
           <ac:spMkLst>
             <pc:docMk/>
             <pc:sldMk cId="2412790101" sldId="256"/>
             <ac:spMk id="5" creationId="{887FF438-27CB-7933-3FF0-750C83E136A4}"/>
+          </ac:spMkLst>
+        </pc:spChg>
+        <pc:spChg chg="add del mod">
+          <ac:chgData name="Fatima Pillosu" userId="a6295d4dc9e22643" providerId="LiveId" clId="{E45A9BF4-C197-4918-8A99-49F61B604D71}" dt="2025-06-11T15:25:12.655" v="1062" actId="21"/>
+          <ac:spMkLst>
+            <pc:docMk/>
+            <pc:sldMk cId="2412790101" sldId="256"/>
+            <ac:spMk id="6" creationId="{E38ABB4D-863F-E734-71F8-6A361F5E1DE3}"/>
+          </ac:spMkLst>
+        </pc:spChg>
+        <pc:spChg chg="del">
+          <ac:chgData name="Fatima Pillosu" userId="a6295d4dc9e22643" providerId="LiveId" clId="{E45A9BF4-C197-4918-8A99-49F61B604D71}" dt="2025-06-11T14:40:38.191" v="0" actId="478"/>
+          <ac:spMkLst>
+            <pc:docMk/>
+            <pc:sldMk cId="2412790101" sldId="256"/>
+            <ac:spMk id="7" creationId="{5F9C8026-4C6B-D6F9-CA2C-A59B5ECF5D00}"/>
+          </ac:spMkLst>
+        </pc:spChg>
+        <pc:spChg chg="add del mod">
+          <ac:chgData name="Fatima Pillosu" userId="a6295d4dc9e22643" providerId="LiveId" clId="{E45A9BF4-C197-4918-8A99-49F61B604D71}" dt="2025-06-11T15:25:12.655" v="1062" actId="21"/>
+          <ac:spMkLst>
+            <pc:docMk/>
+            <pc:sldMk cId="2412790101" sldId="256"/>
+            <ac:spMk id="7" creationId="{887FF438-27CB-7933-3FF0-750C83E136A4}"/>
+          </ac:spMkLst>
+        </pc:spChg>
+        <pc:spChg chg="del">
+          <ac:chgData name="Fatima Pillosu" userId="a6295d4dc9e22643" providerId="LiveId" clId="{E45A9BF4-C197-4918-8A99-49F61B604D71}" dt="2025-06-11T14:40:38.191" v="0" actId="478"/>
+          <ac:spMkLst>
+            <pc:docMk/>
+            <pc:sldMk cId="2412790101" sldId="256"/>
+            <ac:spMk id="8" creationId="{31C95DF1-1021-B801-DF6E-518471057358}"/>
+          </ac:spMkLst>
+        </pc:spChg>
+        <pc:spChg chg="add del mod">
+          <ac:chgData name="Fatima Pillosu" userId="a6295d4dc9e22643" providerId="LiveId" clId="{E45A9BF4-C197-4918-8A99-49F61B604D71}" dt="2025-06-11T15:25:12.655" v="1062" actId="21"/>
+          <ac:spMkLst>
+            <pc:docMk/>
+            <pc:sldMk cId="2412790101" sldId="256"/>
+            <ac:spMk id="8" creationId="{94699DC0-F296-4F13-1267-BB22E3869038}"/>
+          </ac:spMkLst>
+        </pc:spChg>
+        <pc:spChg chg="del">
+          <ac:chgData name="Fatima Pillosu" userId="a6295d4dc9e22643" providerId="LiveId" clId="{E45A9BF4-C197-4918-8A99-49F61B604D71}" dt="2025-06-11T14:40:38.191" v="0" actId="478"/>
+          <ac:spMkLst>
+            <pc:docMk/>
+            <pc:sldMk cId="2412790101" sldId="256"/>
+            <ac:spMk id="9" creationId="{26DAFA34-6888-C3F6-07E1-0C3D78F45867}"/>
+          </ac:spMkLst>
+        </pc:spChg>
+        <pc:spChg chg="add del mod">
+          <ac:chgData name="Fatima Pillosu" userId="a6295d4dc9e22643" providerId="LiveId" clId="{E45A9BF4-C197-4918-8A99-49F61B604D71}" dt="2025-06-11T15:25:12.655" v="1062" actId="21"/>
+          <ac:spMkLst>
+            <pc:docMk/>
+            <pc:sldMk cId="2412790101" sldId="256"/>
+            <ac:spMk id="9" creationId="{B70B7DAE-BBF8-26B9-F316-694D75EF55A1}"/>
+          </ac:spMkLst>
+        </pc:spChg>
+        <pc:spChg chg="add del mod">
+          <ac:chgData name="Fatima Pillosu" userId="a6295d4dc9e22643" providerId="LiveId" clId="{E45A9BF4-C197-4918-8A99-49F61B604D71}" dt="2025-06-11T15:23:24.712" v="1030" actId="21"/>
+          <ac:spMkLst>
+            <pc:docMk/>
+            <pc:sldMk cId="2412790101" sldId="256"/>
+            <ac:spMk id="10" creationId="{94699DC0-F296-4F13-1267-BB22E3869038}"/>
+          </ac:spMkLst>
+        </pc:spChg>
+        <pc:spChg chg="add del mod">
+          <ac:chgData name="Fatima Pillosu" userId="a6295d4dc9e22643" providerId="LiveId" clId="{E45A9BF4-C197-4918-8A99-49F61B604D71}" dt="2025-06-11T15:23:24.712" v="1030" actId="21"/>
+          <ac:spMkLst>
+            <pc:docMk/>
+            <pc:sldMk cId="2412790101" sldId="256"/>
+            <ac:spMk id="11" creationId="{B70B7DAE-BBF8-26B9-F316-694D75EF55A1}"/>
           </ac:spMkLst>
         </pc:spChg>
         <pc:spChg chg="del mod">
@@ -399,7 +487,103 @@
           <ac:spMkLst>
             <pc:docMk/>
             <pc:sldMk cId="2412790101" sldId="256"/>
-            <ac:spMk id="6" creationId="{E38ABB4D-863F-E734-71F8-6A361F5E1DE3}"/>
+            <ac:spMk id="12" creationId="{887FF438-27CB-7933-3FF0-750C83E136A4}"/>
+          </ac:spMkLst>
+        </pc:spChg>
+        <pc:spChg chg="add del mod">
+          <ac:chgData name="Fatima Pillosu" userId="a6295d4dc9e22643" providerId="LiveId" clId="{E45A9BF4-C197-4918-8A99-49F61B604D71}" dt="2025-06-11T15:25:12.655" v="1062" actId="21"/>
+          <ac:spMkLst>
+            <pc:docMk/>
+            <pc:sldMk cId="2412790101" sldId="256"/>
+            <ac:spMk id="12" creationId="{DA0A3A3F-6F21-9FFB-DFE8-C73B8123777A}"/>
+          </ac:spMkLst>
+        </pc:spChg>
+        <pc:spChg chg="del mod">
+          <ac:chgData name="Fatima Pillosu" userId="a6295d4dc9e22643" providerId="LiveId" clId="{E45A9BF4-C197-4918-8A99-49F61B604D71}" dt="2025-06-11T15:06:44.758" v="677" actId="21"/>
+          <ac:spMkLst>
+            <pc:docMk/>
+            <pc:sldMk cId="2412790101" sldId="256"/>
+            <ac:spMk id="13" creationId="{94699DC0-F296-4F13-1267-BB22E3869038}"/>
+          </ac:spMkLst>
+        </pc:spChg>
+        <pc:spChg chg="add del mod">
+          <ac:chgData name="Fatima Pillosu" userId="a6295d4dc9e22643" providerId="LiveId" clId="{E45A9BF4-C197-4918-8A99-49F61B604D71}" dt="2025-06-11T15:25:12.655" v="1062" actId="21"/>
+          <ac:spMkLst>
+            <pc:docMk/>
+            <pc:sldMk cId="2412790101" sldId="256"/>
+            <ac:spMk id="13" creationId="{DB5FE5E2-2AF1-E6C3-A893-A13186B11D78}"/>
+          </ac:spMkLst>
+        </pc:spChg>
+        <pc:spChg chg="del mod">
+          <ac:chgData name="Fatima Pillosu" userId="a6295d4dc9e22643" providerId="LiveId" clId="{E45A9BF4-C197-4918-8A99-49F61B604D71}" dt="2025-06-11T15:06:44.758" v="677" actId="21"/>
+          <ac:spMkLst>
+            <pc:docMk/>
+            <pc:sldMk cId="2412790101" sldId="256"/>
+            <ac:spMk id="14" creationId="{B70B7DAE-BBF8-26B9-F316-694D75EF55A1}"/>
+          </ac:spMkLst>
+        </pc:spChg>
+        <pc:spChg chg="add del mod">
+          <ac:chgData name="Fatima Pillosu" userId="a6295d4dc9e22643" providerId="LiveId" clId="{E45A9BF4-C197-4918-8A99-49F61B604D71}" dt="2025-06-11T15:25:12.655" v="1062" actId="21"/>
+          <ac:spMkLst>
+            <pc:docMk/>
+            <pc:sldMk cId="2412790101" sldId="256"/>
+            <ac:spMk id="14" creationId="{C697B761-747A-2315-B6B9-C750C47D99DC}"/>
+          </ac:spMkLst>
+        </pc:spChg>
+        <pc:spChg chg="del mod">
+          <ac:chgData name="Fatima Pillosu" userId="a6295d4dc9e22643" providerId="LiveId" clId="{E45A9BF4-C197-4918-8A99-49F61B604D71}" dt="2025-06-11T15:06:44.758" v="677" actId="21"/>
+          <ac:spMkLst>
+            <pc:docMk/>
+            <pc:sldMk cId="2412790101" sldId="256"/>
+            <ac:spMk id="15" creationId="{DA0A3A3F-6F21-9FFB-DFE8-C73B8123777A}"/>
+          </ac:spMkLst>
+        </pc:spChg>
+        <pc:spChg chg="add del mod">
+          <ac:chgData name="Fatima Pillosu" userId="a6295d4dc9e22643" providerId="LiveId" clId="{E45A9BF4-C197-4918-8A99-49F61B604D71}" dt="2025-06-11T15:25:12.655" v="1062" actId="21"/>
+          <ac:spMkLst>
+            <pc:docMk/>
+            <pc:sldMk cId="2412790101" sldId="256"/>
+            <ac:spMk id="16" creationId="{3FA77F1B-56D8-FF8C-7ECE-F7D395C2B6A3}"/>
+          </ac:spMkLst>
+        </pc:spChg>
+        <pc:spChg chg="del mod">
+          <ac:chgData name="Fatima Pillosu" userId="a6295d4dc9e22643" providerId="LiveId" clId="{E45A9BF4-C197-4918-8A99-49F61B604D71}" dt="2025-06-11T15:06:44.758" v="677" actId="21"/>
+          <ac:spMkLst>
+            <pc:docMk/>
+            <pc:sldMk cId="2412790101" sldId="256"/>
+            <ac:spMk id="16" creationId="{DB5FE5E2-2AF1-E6C3-A893-A13186B11D78}"/>
+          </ac:spMkLst>
+        </pc:spChg>
+        <pc:spChg chg="add del mod">
+          <ac:chgData name="Fatima Pillosu" userId="a6295d4dc9e22643" providerId="LiveId" clId="{E45A9BF4-C197-4918-8A99-49F61B604D71}" dt="2025-06-11T15:25:12.655" v="1062" actId="21"/>
+          <ac:spMkLst>
+            <pc:docMk/>
+            <pc:sldMk cId="2412790101" sldId="256"/>
+            <ac:spMk id="17" creationId="{44B1E732-CD1A-C841-C76B-2D4E477D2BEA}"/>
+          </ac:spMkLst>
+        </pc:spChg>
+        <pc:spChg chg="del mod">
+          <ac:chgData name="Fatima Pillosu" userId="a6295d4dc9e22643" providerId="LiveId" clId="{E45A9BF4-C197-4918-8A99-49F61B604D71}" dt="2025-06-11T15:06:44.758" v="677" actId="21"/>
+          <ac:spMkLst>
+            <pc:docMk/>
+            <pc:sldMk cId="2412790101" sldId="256"/>
+            <ac:spMk id="17" creationId="{C697B761-747A-2315-B6B9-C750C47D99DC}"/>
+          </ac:spMkLst>
+        </pc:spChg>
+        <pc:spChg chg="add del mod">
+          <ac:chgData name="Fatima Pillosu" userId="a6295d4dc9e22643" providerId="LiveId" clId="{E45A9BF4-C197-4918-8A99-49F61B604D71}" dt="2025-06-11T15:23:24.712" v="1030" actId="21"/>
+          <ac:spMkLst>
+            <pc:docMk/>
+            <pc:sldMk cId="2412790101" sldId="256"/>
+            <ac:spMk id="18" creationId="{DA0A3A3F-6F21-9FFB-DFE8-C73B8123777A}"/>
+          </ac:spMkLst>
+        </pc:spChg>
+        <pc:spChg chg="add del mod">
+          <ac:chgData name="Fatima Pillosu" userId="a6295d4dc9e22643" providerId="LiveId" clId="{E45A9BF4-C197-4918-8A99-49F61B604D71}" dt="2025-06-11T15:23:24.712" v="1030" actId="21"/>
+          <ac:spMkLst>
+            <pc:docMk/>
+            <pc:sldMk cId="2412790101" sldId="256"/>
+            <ac:spMk id="19" creationId="{DB5FE5E2-2AF1-E6C3-A893-A13186B11D78}"/>
           </ac:spMkLst>
         </pc:spChg>
         <pc:spChg chg="del">
@@ -407,7 +591,15 @@
           <ac:spMkLst>
             <pc:docMk/>
             <pc:sldMk cId="2412790101" sldId="256"/>
-            <ac:spMk id="7" creationId="{5F9C8026-4C6B-D6F9-CA2C-A59B5ECF5D00}"/>
+            <ac:spMk id="20" creationId="{4245987F-BE81-E206-9BA2-6D40FB210E59}"/>
+          </ac:spMkLst>
+        </pc:spChg>
+        <pc:spChg chg="add del mod">
+          <ac:chgData name="Fatima Pillosu" userId="a6295d4dc9e22643" providerId="LiveId" clId="{E45A9BF4-C197-4918-8A99-49F61B604D71}" dt="2025-06-11T15:25:12.655" v="1062" actId="21"/>
+          <ac:spMkLst>
+            <pc:docMk/>
+            <pc:sldMk cId="2412790101" sldId="256"/>
+            <ac:spMk id="20" creationId="{68257504-6232-AE97-65EB-A783B54CBE6E}"/>
           </ac:spMkLst>
         </pc:spChg>
         <pc:spChg chg="del">
@@ -415,7 +607,15 @@
           <ac:spMkLst>
             <pc:docMk/>
             <pc:sldMk cId="2412790101" sldId="256"/>
-            <ac:spMk id="8" creationId="{31C95DF1-1021-B801-DF6E-518471057358}"/>
+            <ac:spMk id="21" creationId="{E88CAF47-5440-73C9-1B42-B3885629252B}"/>
+          </ac:spMkLst>
+        </pc:spChg>
+        <pc:spChg chg="add del mod">
+          <ac:chgData name="Fatima Pillosu" userId="a6295d4dc9e22643" providerId="LiveId" clId="{E45A9BF4-C197-4918-8A99-49F61B604D71}" dt="2025-06-11T15:25:12.655" v="1062" actId="21"/>
+          <ac:spMkLst>
+            <pc:docMk/>
+            <pc:sldMk cId="2412790101" sldId="256"/>
+            <ac:spMk id="21" creationId="{FACA616D-C4B5-17C1-769A-FD8F22C41947}"/>
           </ac:spMkLst>
         </pc:spChg>
         <pc:spChg chg="del">
@@ -423,23 +623,111 @@
           <ac:spMkLst>
             <pc:docMk/>
             <pc:sldMk cId="2412790101" sldId="256"/>
-            <ac:spMk id="9" creationId="{26DAFA34-6888-C3F6-07E1-0C3D78F45867}"/>
-          </ac:spMkLst>
-        </pc:spChg>
-        <pc:spChg chg="add mod">
-          <ac:chgData name="Fatima Pillosu" userId="a6295d4dc9e22643" providerId="LiveId" clId="{E45A9BF4-C197-4918-8A99-49F61B604D71}" dt="2025-06-11T15:07:01.601" v="678"/>
-          <ac:spMkLst>
-            <pc:docMk/>
-            <pc:sldMk cId="2412790101" sldId="256"/>
-            <ac:spMk id="10" creationId="{94699DC0-F296-4F13-1267-BB22E3869038}"/>
-          </ac:spMkLst>
-        </pc:spChg>
-        <pc:spChg chg="add mod">
-          <ac:chgData name="Fatima Pillosu" userId="a6295d4dc9e22643" providerId="LiveId" clId="{E45A9BF4-C197-4918-8A99-49F61B604D71}" dt="2025-06-11T15:07:01.601" v="678"/>
-          <ac:spMkLst>
-            <pc:docMk/>
-            <pc:sldMk cId="2412790101" sldId="256"/>
-            <ac:spMk id="11" creationId="{B70B7DAE-BBF8-26B9-F316-694D75EF55A1}"/>
+            <ac:spMk id="22" creationId="{F0379129-0B4C-9E6E-3C06-018694AD7810}"/>
+          </ac:spMkLst>
+        </pc:spChg>
+        <pc:spChg chg="add del mod">
+          <ac:chgData name="Fatima Pillosu" userId="a6295d4dc9e22643" providerId="LiveId" clId="{E45A9BF4-C197-4918-8A99-49F61B604D71}" dt="2025-06-11T15:25:12.655" v="1062" actId="21"/>
+          <ac:spMkLst>
+            <pc:docMk/>
+            <pc:sldMk cId="2412790101" sldId="256"/>
+            <ac:spMk id="22" creationId="{F26916BE-D699-C1DD-08D0-AA710FCCDE17}"/>
+          </ac:spMkLst>
+        </pc:spChg>
+        <pc:spChg chg="add del mod">
+          <ac:chgData name="Fatima Pillosu" userId="a6295d4dc9e22643" providerId="LiveId" clId="{E45A9BF4-C197-4918-8A99-49F61B604D71}" dt="2025-06-11T15:25:12.655" v="1062" actId="21"/>
+          <ac:spMkLst>
+            <pc:docMk/>
+            <pc:sldMk cId="2412790101" sldId="256"/>
+            <ac:spMk id="23" creationId="{02EDCF91-6F58-68A4-E039-B443793D57EE}"/>
+          </ac:spMkLst>
+        </pc:spChg>
+        <pc:spChg chg="del">
+          <ac:chgData name="Fatima Pillosu" userId="a6295d4dc9e22643" providerId="LiveId" clId="{E45A9BF4-C197-4918-8A99-49F61B604D71}" dt="2025-06-11T14:40:38.191" v="0" actId="478"/>
+          <ac:spMkLst>
+            <pc:docMk/>
+            <pc:sldMk cId="2412790101" sldId="256"/>
+            <ac:spMk id="23" creationId="{ED3F179D-B885-7D31-FEC9-958FC08D0EE6}"/>
+          </ac:spMkLst>
+        </pc:spChg>
+        <pc:spChg chg="add del mod">
+          <ac:chgData name="Fatima Pillosu" userId="a6295d4dc9e22643" providerId="LiveId" clId="{E45A9BF4-C197-4918-8A99-49F61B604D71}" dt="2025-06-11T15:23:24.712" v="1030" actId="21"/>
+          <ac:spMkLst>
+            <pc:docMk/>
+            <pc:sldMk cId="2412790101" sldId="256"/>
+            <ac:spMk id="24" creationId="{C697B761-747A-2315-B6B9-C750C47D99DC}"/>
+          </ac:spMkLst>
+        </pc:spChg>
+        <pc:spChg chg="add del mod">
+          <ac:chgData name="Fatima Pillosu" userId="a6295d4dc9e22643" providerId="LiveId" clId="{E45A9BF4-C197-4918-8A99-49F61B604D71}" dt="2025-06-11T15:25:12.655" v="1062" actId="21"/>
+          <ac:spMkLst>
+            <pc:docMk/>
+            <pc:sldMk cId="2412790101" sldId="256"/>
+            <ac:spMk id="25" creationId="{8D6F7FC1-F44B-F17D-70EB-2F3046E87765}"/>
+          </ac:spMkLst>
+        </pc:spChg>
+        <pc:spChg chg="add del mod">
+          <ac:chgData name="Fatima Pillosu" userId="a6295d4dc9e22643" providerId="LiveId" clId="{E45A9BF4-C197-4918-8A99-49F61B604D71}" dt="2025-06-11T15:25:12.655" v="1062" actId="21"/>
+          <ac:spMkLst>
+            <pc:docMk/>
+            <pc:sldMk cId="2412790101" sldId="256"/>
+            <ac:spMk id="26" creationId="{8E390072-E55B-20B8-89E6-4C4585DFB6F8}"/>
+          </ac:spMkLst>
+        </pc:spChg>
+        <pc:spChg chg="add del mod">
+          <ac:chgData name="Fatima Pillosu" userId="a6295d4dc9e22643" providerId="LiveId" clId="{E45A9BF4-C197-4918-8A99-49F61B604D71}" dt="2025-06-11T15:23:24.712" v="1030" actId="21"/>
+          <ac:spMkLst>
+            <pc:docMk/>
+            <pc:sldMk cId="2412790101" sldId="256"/>
+            <ac:spMk id="28" creationId="{3FA77F1B-56D8-FF8C-7ECE-F7D395C2B6A3}"/>
+          </ac:spMkLst>
+        </pc:spChg>
+        <pc:spChg chg="del">
+          <ac:chgData name="Fatima Pillosu" userId="a6295d4dc9e22643" providerId="LiveId" clId="{E45A9BF4-C197-4918-8A99-49F61B604D71}" dt="2025-06-11T14:40:38.191" v="0" actId="478"/>
+          <ac:spMkLst>
+            <pc:docMk/>
+            <pc:sldMk cId="2412790101" sldId="256"/>
+            <ac:spMk id="29" creationId="{03BDF258-EAE2-5C51-887C-04325961DE3E}"/>
+          </ac:spMkLst>
+        </pc:spChg>
+        <pc:spChg chg="add del mod">
+          <ac:chgData name="Fatima Pillosu" userId="a6295d4dc9e22643" providerId="LiveId" clId="{E45A9BF4-C197-4918-8A99-49F61B604D71}" dt="2025-06-11T15:25:12.655" v="1062" actId="21"/>
+          <ac:spMkLst>
+            <pc:docMk/>
+            <pc:sldMk cId="2412790101" sldId="256"/>
+            <ac:spMk id="29" creationId="{737BB970-06A3-D82D-DD59-9485C3A2FB34}"/>
+          </ac:spMkLst>
+        </pc:spChg>
+        <pc:spChg chg="del">
+          <ac:chgData name="Fatima Pillosu" userId="a6295d4dc9e22643" providerId="LiveId" clId="{E45A9BF4-C197-4918-8A99-49F61B604D71}" dt="2025-06-11T14:40:38.191" v="0" actId="478"/>
+          <ac:spMkLst>
+            <pc:docMk/>
+            <pc:sldMk cId="2412790101" sldId="256"/>
+            <ac:spMk id="30" creationId="{270F2959-BD8B-2196-95FB-8D47C2F8DFEE}"/>
+          </ac:spMkLst>
+        </pc:spChg>
+        <pc:spChg chg="add del mod">
+          <ac:chgData name="Fatima Pillosu" userId="a6295d4dc9e22643" providerId="LiveId" clId="{E45A9BF4-C197-4918-8A99-49F61B604D71}" dt="2025-06-11T15:25:12.655" v="1062" actId="21"/>
+          <ac:spMkLst>
+            <pc:docMk/>
+            <pc:sldMk cId="2412790101" sldId="256"/>
+            <ac:spMk id="30" creationId="{88E5E416-C7A1-C227-031E-B35CF991FEFF}"/>
+          </ac:spMkLst>
+        </pc:spChg>
+        <pc:spChg chg="add del mod">
+          <ac:chgData name="Fatima Pillosu" userId="a6295d4dc9e22643" providerId="LiveId" clId="{E45A9BF4-C197-4918-8A99-49F61B604D71}" dt="2025-06-11T15:23:24.712" v="1030" actId="21"/>
+          <ac:spMkLst>
+            <pc:docMk/>
+            <pc:sldMk cId="2412790101" sldId="256"/>
+            <ac:spMk id="31" creationId="{44B1E732-CD1A-C841-C76B-2D4E477D2BEA}"/>
+          </ac:spMkLst>
+        </pc:spChg>
+        <pc:spChg chg="add del mod">
+          <ac:chgData name="Fatima Pillosu" userId="a6295d4dc9e22643" providerId="LiveId" clId="{E45A9BF4-C197-4918-8A99-49F61B604D71}" dt="2025-06-11T15:25:12.655" v="1062" actId="21"/>
+          <ac:spMkLst>
+            <pc:docMk/>
+            <pc:sldMk cId="2412790101" sldId="256"/>
+            <ac:spMk id="32" creationId="{761A0E4A-D491-74D5-90F0-C519DB1C25DC}"/>
           </ac:spMkLst>
         </pc:spChg>
         <pc:spChg chg="del mod">
@@ -447,7 +735,15 @@
           <ac:spMkLst>
             <pc:docMk/>
             <pc:sldMk cId="2412790101" sldId="256"/>
-            <ac:spMk id="12" creationId="{887FF438-27CB-7933-3FF0-750C83E136A4}"/>
+            <ac:spMk id="33" creationId="{3FA77F1B-56D8-FF8C-7ECE-F7D395C2B6A3}"/>
+          </ac:spMkLst>
+        </pc:spChg>
+        <pc:spChg chg="add del mod">
+          <ac:chgData name="Fatima Pillosu" userId="a6295d4dc9e22643" providerId="LiveId" clId="{E45A9BF4-C197-4918-8A99-49F61B604D71}" dt="2025-06-11T15:25:12.655" v="1062" actId="21"/>
+          <ac:spMkLst>
+            <pc:docMk/>
+            <pc:sldMk cId="2412790101" sldId="256"/>
+            <ac:spMk id="33" creationId="{5A52E58A-BA02-021E-4F28-6D976EBB835E}"/>
           </ac:spMkLst>
         </pc:spChg>
         <pc:spChg chg="del mod">
@@ -455,7 +751,39 @@
           <ac:spMkLst>
             <pc:docMk/>
             <pc:sldMk cId="2412790101" sldId="256"/>
-            <ac:spMk id="13" creationId="{94699DC0-F296-4F13-1267-BB22E3869038}"/>
+            <ac:spMk id="34" creationId="{44B1E732-CD1A-C841-C76B-2D4E477D2BEA}"/>
+          </ac:spMkLst>
+        </pc:spChg>
+        <pc:spChg chg="add del">
+          <ac:chgData name="Fatima Pillosu" userId="a6295d4dc9e22643" providerId="LiveId" clId="{E45A9BF4-C197-4918-8A99-49F61B604D71}" dt="2025-06-11T15:25:04.726" v="1059" actId="478"/>
+          <ac:spMkLst>
+            <pc:docMk/>
+            <pc:sldMk cId="2412790101" sldId="256"/>
+            <ac:spMk id="34" creationId="{948C5384-16AC-083C-7963-13DD8A2E15DA}"/>
+          </ac:spMkLst>
+        </pc:spChg>
+        <pc:spChg chg="add del mod">
+          <ac:chgData name="Fatima Pillosu" userId="a6295d4dc9e22643" providerId="LiveId" clId="{E45A9BF4-C197-4918-8A99-49F61B604D71}" dt="2025-06-11T15:23:24.712" v="1030" actId="21"/>
+          <ac:spMkLst>
+            <pc:docMk/>
+            <pc:sldMk cId="2412790101" sldId="256"/>
+            <ac:spMk id="35" creationId="{68257504-6232-AE97-65EB-A783B54CBE6E}"/>
+          </ac:spMkLst>
+        </pc:spChg>
+        <pc:spChg chg="add del mod">
+          <ac:chgData name="Fatima Pillosu" userId="a6295d4dc9e22643" providerId="LiveId" clId="{E45A9BF4-C197-4918-8A99-49F61B604D71}" dt="2025-06-11T15:23:24.712" v="1030" actId="21"/>
+          <ac:spMkLst>
+            <pc:docMk/>
+            <pc:sldMk cId="2412790101" sldId="256"/>
+            <ac:spMk id="36" creationId="{FACA616D-C4B5-17C1-769A-FD8F22C41947}"/>
+          </ac:spMkLst>
+        </pc:spChg>
+        <pc:spChg chg="add del mod">
+          <ac:chgData name="Fatima Pillosu" userId="a6295d4dc9e22643" providerId="LiveId" clId="{E45A9BF4-C197-4918-8A99-49F61B604D71}" dt="2025-06-11T15:23:24.712" v="1030" actId="21"/>
+          <ac:spMkLst>
+            <pc:docMk/>
+            <pc:sldMk cId="2412790101" sldId="256"/>
+            <ac:spMk id="37" creationId="{F26916BE-D699-C1DD-08D0-AA710FCCDE17}"/>
           </ac:spMkLst>
         </pc:spChg>
         <pc:spChg chg="del mod">
@@ -463,7 +791,23 @@
           <ac:spMkLst>
             <pc:docMk/>
             <pc:sldMk cId="2412790101" sldId="256"/>
-            <ac:spMk id="14" creationId="{B70B7DAE-BBF8-26B9-F316-694D75EF55A1}"/>
+            <ac:spMk id="38" creationId="{68257504-6232-AE97-65EB-A783B54CBE6E}"/>
+          </ac:spMkLst>
+        </pc:spChg>
+        <pc:spChg chg="add mod">
+          <ac:chgData name="Fatima Pillosu" userId="a6295d4dc9e22643" providerId="LiveId" clId="{E45A9BF4-C197-4918-8A99-49F61B604D71}" dt="2025-06-11T15:25:23.519" v="1063"/>
+          <ac:spMkLst>
+            <pc:docMk/>
+            <pc:sldMk cId="2412790101" sldId="256"/>
+            <ac:spMk id="38" creationId="{E38ABB4D-863F-E734-71F8-6A361F5E1DE3}"/>
+          </ac:spMkLst>
+        </pc:spChg>
+        <pc:spChg chg="add mod">
+          <ac:chgData name="Fatima Pillosu" userId="a6295d4dc9e22643" providerId="LiveId" clId="{E45A9BF4-C197-4918-8A99-49F61B604D71}" dt="2025-06-11T15:25:23.519" v="1063"/>
+          <ac:spMkLst>
+            <pc:docMk/>
+            <pc:sldMk cId="2412790101" sldId="256"/>
+            <ac:spMk id="39" creationId="{887FF438-27CB-7933-3FF0-750C83E136A4}"/>
           </ac:spMkLst>
         </pc:spChg>
         <pc:spChg chg="del mod">
@@ -471,7 +815,15 @@
           <ac:spMkLst>
             <pc:docMk/>
             <pc:sldMk cId="2412790101" sldId="256"/>
-            <ac:spMk id="15" creationId="{DA0A3A3F-6F21-9FFB-DFE8-C73B8123777A}"/>
+            <ac:spMk id="39" creationId="{FACA616D-C4B5-17C1-769A-FD8F22C41947}"/>
+          </ac:spMkLst>
+        </pc:spChg>
+        <pc:spChg chg="add mod">
+          <ac:chgData name="Fatima Pillosu" userId="a6295d4dc9e22643" providerId="LiveId" clId="{E45A9BF4-C197-4918-8A99-49F61B604D71}" dt="2025-06-11T15:25:23.519" v="1063"/>
+          <ac:spMkLst>
+            <pc:docMk/>
+            <pc:sldMk cId="2412790101" sldId="256"/>
+            <ac:spMk id="40" creationId="{94699DC0-F296-4F13-1267-BB22E3869038}"/>
           </ac:spMkLst>
         </pc:spChg>
         <pc:spChg chg="del mod">
@@ -479,7 +831,7 @@
           <ac:spMkLst>
             <pc:docMk/>
             <pc:sldMk cId="2412790101" sldId="256"/>
-            <ac:spMk id="16" creationId="{DB5FE5E2-2AF1-E6C3-A893-A13186B11D78}"/>
+            <ac:spMk id="40" creationId="{F26916BE-D699-C1DD-08D0-AA710FCCDE17}"/>
           </ac:spMkLst>
         </pc:spChg>
         <pc:spChg chg="del mod">
@@ -487,95 +839,15 @@
           <ac:spMkLst>
             <pc:docMk/>
             <pc:sldMk cId="2412790101" sldId="256"/>
-            <ac:spMk id="17" creationId="{C697B761-747A-2315-B6B9-C750C47D99DC}"/>
+            <ac:spMk id="41" creationId="{02EDCF91-6F58-68A4-E039-B443793D57EE}"/>
           </ac:spMkLst>
         </pc:spChg>
         <pc:spChg chg="add mod">
-          <ac:chgData name="Fatima Pillosu" userId="a6295d4dc9e22643" providerId="LiveId" clId="{E45A9BF4-C197-4918-8A99-49F61B604D71}" dt="2025-06-11T15:07:01.601" v="678"/>
-          <ac:spMkLst>
-            <pc:docMk/>
-            <pc:sldMk cId="2412790101" sldId="256"/>
-            <ac:spMk id="18" creationId="{DA0A3A3F-6F21-9FFB-DFE8-C73B8123777A}"/>
-          </ac:spMkLst>
-        </pc:spChg>
-        <pc:spChg chg="add mod">
-          <ac:chgData name="Fatima Pillosu" userId="a6295d4dc9e22643" providerId="LiveId" clId="{E45A9BF4-C197-4918-8A99-49F61B604D71}" dt="2025-06-11T15:07:01.601" v="678"/>
-          <ac:spMkLst>
-            <pc:docMk/>
-            <pc:sldMk cId="2412790101" sldId="256"/>
-            <ac:spMk id="19" creationId="{DB5FE5E2-2AF1-E6C3-A893-A13186B11D78}"/>
-          </ac:spMkLst>
-        </pc:spChg>
-        <pc:spChg chg="del">
-          <ac:chgData name="Fatima Pillosu" userId="a6295d4dc9e22643" providerId="LiveId" clId="{E45A9BF4-C197-4918-8A99-49F61B604D71}" dt="2025-06-11T14:40:38.191" v="0" actId="478"/>
-          <ac:spMkLst>
-            <pc:docMk/>
-            <pc:sldMk cId="2412790101" sldId="256"/>
-            <ac:spMk id="20" creationId="{4245987F-BE81-E206-9BA2-6D40FB210E59}"/>
-          </ac:spMkLst>
-        </pc:spChg>
-        <pc:spChg chg="del">
-          <ac:chgData name="Fatima Pillosu" userId="a6295d4dc9e22643" providerId="LiveId" clId="{E45A9BF4-C197-4918-8A99-49F61B604D71}" dt="2025-06-11T14:40:38.191" v="0" actId="478"/>
-          <ac:spMkLst>
-            <pc:docMk/>
-            <pc:sldMk cId="2412790101" sldId="256"/>
-            <ac:spMk id="21" creationId="{E88CAF47-5440-73C9-1B42-B3885629252B}"/>
-          </ac:spMkLst>
-        </pc:spChg>
-        <pc:spChg chg="del">
-          <ac:chgData name="Fatima Pillosu" userId="a6295d4dc9e22643" providerId="LiveId" clId="{E45A9BF4-C197-4918-8A99-49F61B604D71}" dt="2025-06-11T14:40:38.191" v="0" actId="478"/>
-          <ac:spMkLst>
-            <pc:docMk/>
-            <pc:sldMk cId="2412790101" sldId="256"/>
-            <ac:spMk id="22" creationId="{F0379129-0B4C-9E6E-3C06-018694AD7810}"/>
-          </ac:spMkLst>
-        </pc:spChg>
-        <pc:spChg chg="del">
-          <ac:chgData name="Fatima Pillosu" userId="a6295d4dc9e22643" providerId="LiveId" clId="{E45A9BF4-C197-4918-8A99-49F61B604D71}" dt="2025-06-11T14:40:38.191" v="0" actId="478"/>
-          <ac:spMkLst>
-            <pc:docMk/>
-            <pc:sldMk cId="2412790101" sldId="256"/>
-            <ac:spMk id="23" creationId="{ED3F179D-B885-7D31-FEC9-958FC08D0EE6}"/>
-          </ac:spMkLst>
-        </pc:spChg>
-        <pc:spChg chg="add mod">
-          <ac:chgData name="Fatima Pillosu" userId="a6295d4dc9e22643" providerId="LiveId" clId="{E45A9BF4-C197-4918-8A99-49F61B604D71}" dt="2025-06-11T15:07:01.601" v="678"/>
-          <ac:spMkLst>
-            <pc:docMk/>
-            <pc:sldMk cId="2412790101" sldId="256"/>
-            <ac:spMk id="24" creationId="{C697B761-747A-2315-B6B9-C750C47D99DC}"/>
-          </ac:spMkLst>
-        </pc:spChg>
-        <pc:spChg chg="add mod">
-          <ac:chgData name="Fatima Pillosu" userId="a6295d4dc9e22643" providerId="LiveId" clId="{E45A9BF4-C197-4918-8A99-49F61B604D71}" dt="2025-06-11T15:07:01.601" v="678"/>
-          <ac:spMkLst>
-            <pc:docMk/>
-            <pc:sldMk cId="2412790101" sldId="256"/>
-            <ac:spMk id="28" creationId="{3FA77F1B-56D8-FF8C-7ECE-F7D395C2B6A3}"/>
-          </ac:spMkLst>
-        </pc:spChg>
-        <pc:spChg chg="del">
-          <ac:chgData name="Fatima Pillosu" userId="a6295d4dc9e22643" providerId="LiveId" clId="{E45A9BF4-C197-4918-8A99-49F61B604D71}" dt="2025-06-11T14:40:38.191" v="0" actId="478"/>
-          <ac:spMkLst>
-            <pc:docMk/>
-            <pc:sldMk cId="2412790101" sldId="256"/>
-            <ac:spMk id="29" creationId="{03BDF258-EAE2-5C51-887C-04325961DE3E}"/>
-          </ac:spMkLst>
-        </pc:spChg>
-        <pc:spChg chg="del">
-          <ac:chgData name="Fatima Pillosu" userId="a6295d4dc9e22643" providerId="LiveId" clId="{E45A9BF4-C197-4918-8A99-49F61B604D71}" dt="2025-06-11T14:40:38.191" v="0" actId="478"/>
-          <ac:spMkLst>
-            <pc:docMk/>
-            <pc:sldMk cId="2412790101" sldId="256"/>
-            <ac:spMk id="30" creationId="{270F2959-BD8B-2196-95FB-8D47C2F8DFEE}"/>
-          </ac:spMkLst>
-        </pc:spChg>
-        <pc:spChg chg="add mod">
-          <ac:chgData name="Fatima Pillosu" userId="a6295d4dc9e22643" providerId="LiveId" clId="{E45A9BF4-C197-4918-8A99-49F61B604D71}" dt="2025-06-11T15:07:01.601" v="678"/>
-          <ac:spMkLst>
-            <pc:docMk/>
-            <pc:sldMk cId="2412790101" sldId="256"/>
-            <ac:spMk id="31" creationId="{44B1E732-CD1A-C841-C76B-2D4E477D2BEA}"/>
+          <ac:chgData name="Fatima Pillosu" userId="a6295d4dc9e22643" providerId="LiveId" clId="{E45A9BF4-C197-4918-8A99-49F61B604D71}" dt="2025-06-11T15:25:23.519" v="1063"/>
+          <ac:spMkLst>
+            <pc:docMk/>
+            <pc:sldMk cId="2412790101" sldId="256"/>
+            <ac:spMk id="41" creationId="{B70B7DAE-BBF8-26B9-F316-694D75EF55A1}"/>
           </ac:spMkLst>
         </pc:spChg>
         <pc:spChg chg="del mod">
@@ -583,7 +855,15 @@
           <ac:spMkLst>
             <pc:docMk/>
             <pc:sldMk cId="2412790101" sldId="256"/>
-            <ac:spMk id="33" creationId="{3FA77F1B-56D8-FF8C-7ECE-F7D395C2B6A3}"/>
+            <ac:spMk id="42" creationId="{8D6F7FC1-F44B-F17D-70EB-2F3046E87765}"/>
+          </ac:spMkLst>
+        </pc:spChg>
+        <pc:spChg chg="add mod">
+          <ac:chgData name="Fatima Pillosu" userId="a6295d4dc9e22643" providerId="LiveId" clId="{E45A9BF4-C197-4918-8A99-49F61B604D71}" dt="2025-06-11T15:25:23.519" v="1063"/>
+          <ac:spMkLst>
+            <pc:docMk/>
+            <pc:sldMk cId="2412790101" sldId="256"/>
+            <ac:spMk id="42" creationId="{DA0A3A3F-6F21-9FFB-DFE8-C73B8123777A}"/>
           </ac:spMkLst>
         </pc:spChg>
         <pc:spChg chg="del mod">
@@ -591,31 +871,15 @@
           <ac:spMkLst>
             <pc:docMk/>
             <pc:sldMk cId="2412790101" sldId="256"/>
-            <ac:spMk id="34" creationId="{44B1E732-CD1A-C841-C76B-2D4E477D2BEA}"/>
+            <ac:spMk id="43" creationId="{8E390072-E55B-20B8-89E6-4C4585DFB6F8}"/>
           </ac:spMkLst>
         </pc:spChg>
         <pc:spChg chg="add mod">
-          <ac:chgData name="Fatima Pillosu" userId="a6295d4dc9e22643" providerId="LiveId" clId="{E45A9BF4-C197-4918-8A99-49F61B604D71}" dt="2025-06-11T15:07:01.601" v="678"/>
-          <ac:spMkLst>
-            <pc:docMk/>
-            <pc:sldMk cId="2412790101" sldId="256"/>
-            <ac:spMk id="35" creationId="{68257504-6232-AE97-65EB-A783B54CBE6E}"/>
-          </ac:spMkLst>
-        </pc:spChg>
-        <pc:spChg chg="add mod">
-          <ac:chgData name="Fatima Pillosu" userId="a6295d4dc9e22643" providerId="LiveId" clId="{E45A9BF4-C197-4918-8A99-49F61B604D71}" dt="2025-06-11T15:07:01.601" v="678"/>
-          <ac:spMkLst>
-            <pc:docMk/>
-            <pc:sldMk cId="2412790101" sldId="256"/>
-            <ac:spMk id="36" creationId="{FACA616D-C4B5-17C1-769A-FD8F22C41947}"/>
-          </ac:spMkLst>
-        </pc:spChg>
-        <pc:spChg chg="add mod">
-          <ac:chgData name="Fatima Pillosu" userId="a6295d4dc9e22643" providerId="LiveId" clId="{E45A9BF4-C197-4918-8A99-49F61B604D71}" dt="2025-06-11T15:07:01.601" v="678"/>
-          <ac:spMkLst>
-            <pc:docMk/>
-            <pc:sldMk cId="2412790101" sldId="256"/>
-            <ac:spMk id="37" creationId="{F26916BE-D699-C1DD-08D0-AA710FCCDE17}"/>
+          <ac:chgData name="Fatima Pillosu" userId="a6295d4dc9e22643" providerId="LiveId" clId="{E45A9BF4-C197-4918-8A99-49F61B604D71}" dt="2025-06-11T15:25:23.519" v="1063"/>
+          <ac:spMkLst>
+            <pc:docMk/>
+            <pc:sldMk cId="2412790101" sldId="256"/>
+            <ac:spMk id="43" creationId="{DB5FE5E2-2AF1-E6C3-A893-A13186B11D78}"/>
           </ac:spMkLst>
         </pc:spChg>
         <pc:spChg chg="del mod">
@@ -623,7 +887,15 @@
           <ac:spMkLst>
             <pc:docMk/>
             <pc:sldMk cId="2412790101" sldId="256"/>
-            <ac:spMk id="38" creationId="{68257504-6232-AE97-65EB-A783B54CBE6E}"/>
+            <ac:spMk id="44" creationId="{737BB970-06A3-D82D-DD59-9485C3A2FB34}"/>
+          </ac:spMkLst>
+        </pc:spChg>
+        <pc:spChg chg="add mod">
+          <ac:chgData name="Fatima Pillosu" userId="a6295d4dc9e22643" providerId="LiveId" clId="{E45A9BF4-C197-4918-8A99-49F61B604D71}" dt="2025-06-11T15:25:23.519" v="1063"/>
+          <ac:spMkLst>
+            <pc:docMk/>
+            <pc:sldMk cId="2412790101" sldId="256"/>
+            <ac:spMk id="44" creationId="{C697B761-747A-2315-B6B9-C750C47D99DC}"/>
           </ac:spMkLst>
         </pc:spChg>
         <pc:spChg chg="del mod">
@@ -631,105 +903,161 @@
           <ac:spMkLst>
             <pc:docMk/>
             <pc:sldMk cId="2412790101" sldId="256"/>
-            <ac:spMk id="39" creationId="{FACA616D-C4B5-17C1-769A-FD8F22C41947}"/>
-          </ac:spMkLst>
-        </pc:spChg>
-        <pc:spChg chg="del mod">
-          <ac:chgData name="Fatima Pillosu" userId="a6295d4dc9e22643" providerId="LiveId" clId="{E45A9BF4-C197-4918-8A99-49F61B604D71}" dt="2025-06-11T15:06:44.758" v="677" actId="21"/>
-          <ac:spMkLst>
-            <pc:docMk/>
-            <pc:sldMk cId="2412790101" sldId="256"/>
-            <ac:spMk id="40" creationId="{F26916BE-D699-C1DD-08D0-AA710FCCDE17}"/>
-          </ac:spMkLst>
-        </pc:spChg>
-        <pc:spChg chg="del mod">
-          <ac:chgData name="Fatima Pillosu" userId="a6295d4dc9e22643" providerId="LiveId" clId="{E45A9BF4-C197-4918-8A99-49F61B604D71}" dt="2025-06-11T15:06:44.758" v="677" actId="21"/>
-          <ac:spMkLst>
-            <pc:docMk/>
-            <pc:sldMk cId="2412790101" sldId="256"/>
-            <ac:spMk id="41" creationId="{02EDCF91-6F58-68A4-E039-B443793D57EE}"/>
-          </ac:spMkLst>
-        </pc:spChg>
-        <pc:spChg chg="del mod">
-          <ac:chgData name="Fatima Pillosu" userId="a6295d4dc9e22643" providerId="LiveId" clId="{E45A9BF4-C197-4918-8A99-49F61B604D71}" dt="2025-06-11T15:06:44.758" v="677" actId="21"/>
-          <ac:spMkLst>
-            <pc:docMk/>
-            <pc:sldMk cId="2412790101" sldId="256"/>
-            <ac:spMk id="42" creationId="{8D6F7FC1-F44B-F17D-70EB-2F3046E87765}"/>
-          </ac:spMkLst>
-        </pc:spChg>
-        <pc:spChg chg="del mod">
-          <ac:chgData name="Fatima Pillosu" userId="a6295d4dc9e22643" providerId="LiveId" clId="{E45A9BF4-C197-4918-8A99-49F61B604D71}" dt="2025-06-11T15:06:44.758" v="677" actId="21"/>
-          <ac:spMkLst>
-            <pc:docMk/>
-            <pc:sldMk cId="2412790101" sldId="256"/>
-            <ac:spMk id="43" creationId="{8E390072-E55B-20B8-89E6-4C4585DFB6F8}"/>
-          </ac:spMkLst>
-        </pc:spChg>
-        <pc:spChg chg="del mod">
-          <ac:chgData name="Fatima Pillosu" userId="a6295d4dc9e22643" providerId="LiveId" clId="{E45A9BF4-C197-4918-8A99-49F61B604D71}" dt="2025-06-11T15:06:44.758" v="677" actId="21"/>
-          <ac:spMkLst>
-            <pc:docMk/>
-            <pc:sldMk cId="2412790101" sldId="256"/>
-            <ac:spMk id="44" creationId="{737BB970-06A3-D82D-DD59-9485C3A2FB34}"/>
-          </ac:spMkLst>
-        </pc:spChg>
-        <pc:spChg chg="del mod">
-          <ac:chgData name="Fatima Pillosu" userId="a6295d4dc9e22643" providerId="LiveId" clId="{E45A9BF4-C197-4918-8A99-49F61B604D71}" dt="2025-06-11T15:06:44.758" v="677" actId="21"/>
-          <ac:spMkLst>
-            <pc:docMk/>
-            <pc:sldMk cId="2412790101" sldId="256"/>
             <ac:spMk id="45" creationId="{88E5E416-C7A1-C227-031E-B35CF991FEFF}"/>
           </ac:spMkLst>
         </pc:spChg>
+        <pc:spChg chg="add del mod">
+          <ac:chgData name="Fatima Pillosu" userId="a6295d4dc9e22643" providerId="LiveId" clId="{E45A9BF4-C197-4918-8A99-49F61B604D71}" dt="2025-06-11T15:23:24.712" v="1030" actId="21"/>
+          <ac:spMkLst>
+            <pc:docMk/>
+            <pc:sldMk cId="2412790101" sldId="256"/>
+            <ac:spMk id="46" creationId="{02EDCF91-6F58-68A4-E039-B443793D57EE}"/>
+          </ac:spMkLst>
+        </pc:spChg>
+        <pc:spChg chg="add del mod">
+          <ac:chgData name="Fatima Pillosu" userId="a6295d4dc9e22643" providerId="LiveId" clId="{E45A9BF4-C197-4918-8A99-49F61B604D71}" dt="2025-06-11T15:23:24.712" v="1030" actId="21"/>
+          <ac:spMkLst>
+            <pc:docMk/>
+            <pc:sldMk cId="2412790101" sldId="256"/>
+            <ac:spMk id="47" creationId="{8D6F7FC1-F44B-F17D-70EB-2F3046E87765}"/>
+          </ac:spMkLst>
+        </pc:spChg>
+        <pc:spChg chg="add del mod">
+          <ac:chgData name="Fatima Pillosu" userId="a6295d4dc9e22643" providerId="LiveId" clId="{E45A9BF4-C197-4918-8A99-49F61B604D71}" dt="2025-06-11T15:23:24.712" v="1030" actId="21"/>
+          <ac:spMkLst>
+            <pc:docMk/>
+            <pc:sldMk cId="2412790101" sldId="256"/>
+            <ac:spMk id="48" creationId="{8E390072-E55B-20B8-89E6-4C4585DFB6F8}"/>
+          </ac:spMkLst>
+        </pc:spChg>
+        <pc:spChg chg="add del mod">
+          <ac:chgData name="Fatima Pillosu" userId="a6295d4dc9e22643" providerId="LiveId" clId="{E45A9BF4-C197-4918-8A99-49F61B604D71}" dt="2025-06-11T15:23:24.712" v="1030" actId="21"/>
+          <ac:spMkLst>
+            <pc:docMk/>
+            <pc:sldMk cId="2412790101" sldId="256"/>
+            <ac:spMk id="49" creationId="{737BB970-06A3-D82D-DD59-9485C3A2FB34}"/>
+          </ac:spMkLst>
+        </pc:spChg>
+        <pc:spChg chg="add del mod">
+          <ac:chgData name="Fatima Pillosu" userId="a6295d4dc9e22643" providerId="LiveId" clId="{E45A9BF4-C197-4918-8A99-49F61B604D71}" dt="2025-06-11T15:23:24.712" v="1030" actId="21"/>
+          <ac:spMkLst>
+            <pc:docMk/>
+            <pc:sldMk cId="2412790101" sldId="256"/>
+            <ac:spMk id="50" creationId="{88E5E416-C7A1-C227-031E-B35CF991FEFF}"/>
+          </ac:spMkLst>
+        </pc:spChg>
+        <pc:spChg chg="add del mod">
+          <ac:chgData name="Fatima Pillosu" userId="a6295d4dc9e22643" providerId="LiveId" clId="{E45A9BF4-C197-4918-8A99-49F61B604D71}" dt="2025-06-11T15:23:24.712" v="1030" actId="21"/>
+          <ac:spMkLst>
+            <pc:docMk/>
+            <pc:sldMk cId="2412790101" sldId="256"/>
+            <ac:spMk id="51" creationId="{761A0E4A-D491-74D5-90F0-C519DB1C25DC}"/>
+          </ac:spMkLst>
+        </pc:spChg>
         <pc:spChg chg="add mod">
-          <ac:chgData name="Fatima Pillosu" userId="a6295d4dc9e22643" providerId="LiveId" clId="{E45A9BF4-C197-4918-8A99-49F61B604D71}" dt="2025-06-11T15:07:01.601" v="678"/>
-          <ac:spMkLst>
-            <pc:docMk/>
-            <pc:sldMk cId="2412790101" sldId="256"/>
-            <ac:spMk id="46" creationId="{02EDCF91-6F58-68A4-E039-B443793D57EE}"/>
+          <ac:chgData name="Fatima Pillosu" userId="a6295d4dc9e22643" providerId="LiveId" clId="{E45A9BF4-C197-4918-8A99-49F61B604D71}" dt="2025-06-11T15:25:35.089" v="1066" actId="1035"/>
+          <ac:spMkLst>
+            <pc:docMk/>
+            <pc:sldMk cId="2412790101" sldId="256"/>
+            <ac:spMk id="52" creationId="{3FA77F1B-56D8-FF8C-7ECE-F7D395C2B6A3}"/>
           </ac:spMkLst>
         </pc:spChg>
         <pc:spChg chg="add mod">
-          <ac:chgData name="Fatima Pillosu" userId="a6295d4dc9e22643" providerId="LiveId" clId="{E45A9BF4-C197-4918-8A99-49F61B604D71}" dt="2025-06-11T15:07:01.601" v="678"/>
-          <ac:spMkLst>
-            <pc:docMk/>
-            <pc:sldMk cId="2412790101" sldId="256"/>
-            <ac:spMk id="47" creationId="{8D6F7FC1-F44B-F17D-70EB-2F3046E87765}"/>
+          <ac:chgData name="Fatima Pillosu" userId="a6295d4dc9e22643" providerId="LiveId" clId="{E45A9BF4-C197-4918-8A99-49F61B604D71}" dt="2025-06-11T15:25:23.519" v="1063"/>
+          <ac:spMkLst>
+            <pc:docMk/>
+            <pc:sldMk cId="2412790101" sldId="256"/>
+            <ac:spMk id="53" creationId="{44B1E732-CD1A-C841-C76B-2D4E477D2BEA}"/>
           </ac:spMkLst>
         </pc:spChg>
         <pc:spChg chg="add mod">
-          <ac:chgData name="Fatima Pillosu" userId="a6295d4dc9e22643" providerId="LiveId" clId="{E45A9BF4-C197-4918-8A99-49F61B604D71}" dt="2025-06-11T15:07:01.601" v="678"/>
-          <ac:spMkLst>
-            <pc:docMk/>
-            <pc:sldMk cId="2412790101" sldId="256"/>
-            <ac:spMk id="48" creationId="{8E390072-E55B-20B8-89E6-4C4585DFB6F8}"/>
+          <ac:chgData name="Fatima Pillosu" userId="a6295d4dc9e22643" providerId="LiveId" clId="{E45A9BF4-C197-4918-8A99-49F61B604D71}" dt="2025-06-11T15:25:23.519" v="1063"/>
+          <ac:spMkLst>
+            <pc:docMk/>
+            <pc:sldMk cId="2412790101" sldId="256"/>
+            <ac:spMk id="54" creationId="{68257504-6232-AE97-65EB-A783B54CBE6E}"/>
           </ac:spMkLst>
         </pc:spChg>
         <pc:spChg chg="add mod">
-          <ac:chgData name="Fatima Pillosu" userId="a6295d4dc9e22643" providerId="LiveId" clId="{E45A9BF4-C197-4918-8A99-49F61B604D71}" dt="2025-06-11T15:07:01.601" v="678"/>
-          <ac:spMkLst>
-            <pc:docMk/>
-            <pc:sldMk cId="2412790101" sldId="256"/>
-            <ac:spMk id="49" creationId="{737BB970-06A3-D82D-DD59-9485C3A2FB34}"/>
+          <ac:chgData name="Fatima Pillosu" userId="a6295d4dc9e22643" providerId="LiveId" clId="{E45A9BF4-C197-4918-8A99-49F61B604D71}" dt="2025-06-11T15:25:23.519" v="1063"/>
+          <ac:spMkLst>
+            <pc:docMk/>
+            <pc:sldMk cId="2412790101" sldId="256"/>
+            <ac:spMk id="55" creationId="{FACA616D-C4B5-17C1-769A-FD8F22C41947}"/>
           </ac:spMkLst>
         </pc:spChg>
         <pc:spChg chg="add mod">
-          <ac:chgData name="Fatima Pillosu" userId="a6295d4dc9e22643" providerId="LiveId" clId="{E45A9BF4-C197-4918-8A99-49F61B604D71}" dt="2025-06-11T15:07:01.601" v="678"/>
-          <ac:spMkLst>
-            <pc:docMk/>
-            <pc:sldMk cId="2412790101" sldId="256"/>
-            <ac:spMk id="50" creationId="{88E5E416-C7A1-C227-031E-B35CF991FEFF}"/>
+          <ac:chgData name="Fatima Pillosu" userId="a6295d4dc9e22643" providerId="LiveId" clId="{E45A9BF4-C197-4918-8A99-49F61B604D71}" dt="2025-06-11T15:25:23.519" v="1063"/>
+          <ac:spMkLst>
+            <pc:docMk/>
+            <pc:sldMk cId="2412790101" sldId="256"/>
+            <ac:spMk id="56" creationId="{F26916BE-D699-C1DD-08D0-AA710FCCDE17}"/>
           </ac:spMkLst>
         </pc:spChg>
         <pc:spChg chg="add mod">
-          <ac:chgData name="Fatima Pillosu" userId="a6295d4dc9e22643" providerId="LiveId" clId="{E45A9BF4-C197-4918-8A99-49F61B604D71}" dt="2025-06-11T15:07:01.601" v="678"/>
-          <ac:spMkLst>
-            <pc:docMk/>
-            <pc:sldMk cId="2412790101" sldId="256"/>
-            <ac:spMk id="51" creationId="{761A0E4A-D491-74D5-90F0-C519DB1C25DC}"/>
-          </ac:spMkLst>
-        </pc:spChg>
+          <ac:chgData name="Fatima Pillosu" userId="a6295d4dc9e22643" providerId="LiveId" clId="{E45A9BF4-C197-4918-8A99-49F61B604D71}" dt="2025-06-11T15:25:23.519" v="1063"/>
+          <ac:spMkLst>
+            <pc:docMk/>
+            <pc:sldMk cId="2412790101" sldId="256"/>
+            <ac:spMk id="57" creationId="{02EDCF91-6F58-68A4-E039-B443793D57EE}"/>
+          </ac:spMkLst>
+        </pc:spChg>
+        <pc:spChg chg="add mod">
+          <ac:chgData name="Fatima Pillosu" userId="a6295d4dc9e22643" providerId="LiveId" clId="{E45A9BF4-C197-4918-8A99-49F61B604D71}" dt="2025-06-11T15:25:23.519" v="1063"/>
+          <ac:spMkLst>
+            <pc:docMk/>
+            <pc:sldMk cId="2412790101" sldId="256"/>
+            <ac:spMk id="58" creationId="{8D6F7FC1-F44B-F17D-70EB-2F3046E87765}"/>
+          </ac:spMkLst>
+        </pc:spChg>
+        <pc:spChg chg="add mod">
+          <ac:chgData name="Fatima Pillosu" userId="a6295d4dc9e22643" providerId="LiveId" clId="{E45A9BF4-C197-4918-8A99-49F61B604D71}" dt="2025-06-11T15:25:27.395" v="1064" actId="20577"/>
+          <ac:spMkLst>
+            <pc:docMk/>
+            <pc:sldMk cId="2412790101" sldId="256"/>
+            <ac:spMk id="59" creationId="{8E390072-E55B-20B8-89E6-4C4585DFB6F8}"/>
+          </ac:spMkLst>
+        </pc:spChg>
+        <pc:spChg chg="add mod">
+          <ac:chgData name="Fatima Pillosu" userId="a6295d4dc9e22643" providerId="LiveId" clId="{E45A9BF4-C197-4918-8A99-49F61B604D71}" dt="2025-06-11T15:25:23.519" v="1063"/>
+          <ac:spMkLst>
+            <pc:docMk/>
+            <pc:sldMk cId="2412790101" sldId="256"/>
+            <ac:spMk id="60" creationId="{737BB970-06A3-D82D-DD59-9485C3A2FB34}"/>
+          </ac:spMkLst>
+        </pc:spChg>
+        <pc:spChg chg="add mod">
+          <ac:chgData name="Fatima Pillosu" userId="a6295d4dc9e22643" providerId="LiveId" clId="{E45A9BF4-C197-4918-8A99-49F61B604D71}" dt="2025-06-11T15:25:23.519" v="1063"/>
+          <ac:spMkLst>
+            <pc:docMk/>
+            <pc:sldMk cId="2412790101" sldId="256"/>
+            <ac:spMk id="61" creationId="{88E5E416-C7A1-C227-031E-B35CF991FEFF}"/>
+          </ac:spMkLst>
+        </pc:spChg>
+        <pc:spChg chg="add mod">
+          <ac:chgData name="Fatima Pillosu" userId="a6295d4dc9e22643" providerId="LiveId" clId="{E45A9BF4-C197-4918-8A99-49F61B604D71}" dt="2025-06-11T15:25:23.519" v="1063"/>
+          <ac:spMkLst>
+            <pc:docMk/>
+            <pc:sldMk cId="2412790101" sldId="256"/>
+            <ac:spMk id="62" creationId="{761A0E4A-D491-74D5-90F0-C519DB1C25DC}"/>
+          </ac:spMkLst>
+        </pc:spChg>
+        <pc:spChg chg="add mod">
+          <ac:chgData name="Fatima Pillosu" userId="a6295d4dc9e22643" providerId="LiveId" clId="{E45A9BF4-C197-4918-8A99-49F61B604D71}" dt="2025-06-11T15:25:23.519" v="1063"/>
+          <ac:spMkLst>
+            <pc:docMk/>
+            <pc:sldMk cId="2412790101" sldId="256"/>
+            <ac:spMk id="63" creationId="{5A52E58A-BA02-021E-4F28-6D976EBB835E}"/>
+          </ac:spMkLst>
+        </pc:spChg>
+        <pc:cxnChg chg="add del mod">
+          <ac:chgData name="Fatima Pillosu" userId="a6295d4dc9e22643" providerId="LiveId" clId="{E45A9BF4-C197-4918-8A99-49F61B604D71}" dt="2025-06-11T15:25:12.655" v="1062" actId="21"/>
+          <ac:cxnSpMkLst>
+            <pc:docMk/>
+            <pc:sldMk cId="2412790101" sldId="256"/>
+            <ac:cxnSpMk id="15" creationId="{D31AED20-CCB3-4490-522C-CFA515D0B76F}"/>
+          </ac:cxnSpMkLst>
+        </pc:cxnChg>
         <pc:cxnChg chg="del">
           <ac:chgData name="Fatima Pillosu" userId="a6295d4dc9e22643" providerId="LiveId" clId="{E45A9BF4-C197-4918-8A99-49F61B604D71}" dt="2025-06-11T14:40:38.191" v="0" actId="478"/>
           <ac:cxnSpMkLst>
@@ -746,8 +1074,8 @@
             <ac:cxnSpMk id="26" creationId="{50849AC7-0405-6E4C-255B-2854D4AC2067}"/>
           </ac:cxnSpMkLst>
         </pc:cxnChg>
-        <pc:cxnChg chg="add mod">
-          <ac:chgData name="Fatima Pillosu" userId="a6295d4dc9e22643" providerId="LiveId" clId="{E45A9BF4-C197-4918-8A99-49F61B604D71}" dt="2025-06-11T15:07:01.601" v="678"/>
+        <pc:cxnChg chg="add del mod">
+          <ac:chgData name="Fatima Pillosu" userId="a6295d4dc9e22643" providerId="LiveId" clId="{E45A9BF4-C197-4918-8A99-49F61B604D71}" dt="2025-06-11T15:23:24.712" v="1030" actId="21"/>
           <ac:cxnSpMkLst>
             <pc:docMk/>
             <pc:sldMk cId="2412790101" sldId="256"/>
@@ -760,6 +1088,14 @@
             <pc:docMk/>
             <pc:sldMk cId="2412790101" sldId="256"/>
             <ac:cxnSpMk id="32" creationId="{D31AED20-CCB3-4490-522C-CFA515D0B76F}"/>
+          </ac:cxnSpMkLst>
+        </pc:cxnChg>
+        <pc:cxnChg chg="add mod">
+          <ac:chgData name="Fatima Pillosu" userId="a6295d4dc9e22643" providerId="LiveId" clId="{E45A9BF4-C197-4918-8A99-49F61B604D71}" dt="2025-06-11T15:25:23.519" v="1063"/>
+          <ac:cxnSpMkLst>
+            <pc:docMk/>
+            <pc:sldMk cId="2412790101" sldId="256"/>
+            <ac:cxnSpMk id="45" creationId="{D31AED20-CCB3-4490-522C-CFA515D0B76F}"/>
           </ac:cxnSpMkLst>
         </pc:cxnChg>
       </pc:sldChg>
@@ -868,8 +1204,8 @@
         </p:nvSpPr>
         <p:spPr>
           <a:xfrm>
-            <a:off x="2027238" y="1143000"/>
-            <a:ext cx="2803525" cy="3086100"/>
+            <a:off x="2230438" y="1143000"/>
+            <a:ext cx="2397125" cy="3086100"/>
           </a:xfrm>
           <a:prstGeom prst="rect">
             <a:avLst/>
@@ -1147,8 +1483,8 @@
         </p:nvSpPr>
         <p:spPr>
           <a:xfrm>
-            <a:off x="2027238" y="1143000"/>
-            <a:ext cx="2803525" cy="3086100"/>
+            <a:off x="2230438" y="1143000"/>
+            <a:ext cx="2397125" cy="3086100"/>
           </a:xfrm>
         </p:spPr>
       </p:sp>
@@ -1236,8 +1572,8 @@
         </p:nvSpPr>
         <p:spPr>
           <a:xfrm>
-            <a:off x="323969" y="777600"/>
-            <a:ext cx="3671650" cy="1654187"/>
+            <a:off x="323969" y="910361"/>
+            <a:ext cx="3671650" cy="1936609"/>
           </a:xfrm>
         </p:spPr>
         <p:txBody>
@@ -1268,8 +1604,8 @@
         </p:nvSpPr>
         <p:spPr>
           <a:xfrm>
-            <a:off x="539949" y="2495579"/>
-            <a:ext cx="3239691" cy="1147152"/>
+            <a:off x="539949" y="2921653"/>
+            <a:ext cx="3239691" cy="1343007"/>
           </a:xfrm>
         </p:spPr>
         <p:txBody>
@@ -1389,7 +1725,7 @@
     </p:spTree>
     <p:extLst>
       <p:ext uri="{BB962C8B-B14F-4D97-AF65-F5344CB8AC3E}">
-        <p14:creationId xmlns:p14="http://schemas.microsoft.com/office/powerpoint/2010/main" val="510039804"/>
+        <p14:creationId xmlns:p14="http://schemas.microsoft.com/office/powerpoint/2010/main" val="1383557477"/>
       </p:ext>
     </p:extLst>
   </p:cSld>
@@ -1559,7 +1895,7 @@
     </p:spTree>
     <p:extLst>
       <p:ext uri="{BB962C8B-B14F-4D97-AF65-F5344CB8AC3E}">
-        <p14:creationId xmlns:p14="http://schemas.microsoft.com/office/powerpoint/2010/main" val="2970113716"/>
+        <p14:creationId xmlns:p14="http://schemas.microsoft.com/office/powerpoint/2010/main" val="1299021532"/>
       </p:ext>
     </p:extLst>
   </p:cSld>
@@ -1598,8 +1934,8 @@
         </p:nvSpPr>
         <p:spPr>
           <a:xfrm>
-            <a:off x="3091205" y="252967"/>
-            <a:ext cx="931411" cy="4026582"/>
+            <a:off x="3091205" y="296157"/>
+            <a:ext cx="931411" cy="4714046"/>
           </a:xfrm>
         </p:spPr>
         <p:txBody>
@@ -1626,8 +1962,8 @@
         </p:nvSpPr>
         <p:spPr>
           <a:xfrm>
-            <a:off x="296972" y="252967"/>
-            <a:ext cx="2740239" cy="4026582"/>
+            <a:off x="296972" y="296157"/>
+            <a:ext cx="2740239" cy="4714046"/>
           </a:xfrm>
         </p:spPr>
         <p:txBody>
@@ -1739,7 +2075,7 @@
     </p:spTree>
     <p:extLst>
       <p:ext uri="{BB962C8B-B14F-4D97-AF65-F5344CB8AC3E}">
-        <p14:creationId xmlns:p14="http://schemas.microsoft.com/office/powerpoint/2010/main" val="3543463722"/>
+        <p14:creationId xmlns:p14="http://schemas.microsoft.com/office/powerpoint/2010/main" val="1412127730"/>
       </p:ext>
     </p:extLst>
   </p:cSld>
@@ -1909,7 +2245,7 @@
     </p:spTree>
     <p:extLst>
       <p:ext uri="{BB962C8B-B14F-4D97-AF65-F5344CB8AC3E}">
-        <p14:creationId xmlns:p14="http://schemas.microsoft.com/office/powerpoint/2010/main" val="1561256159"/>
+        <p14:creationId xmlns:p14="http://schemas.microsoft.com/office/powerpoint/2010/main" val="2480911558"/>
       </p:ext>
     </p:extLst>
   </p:cSld>
@@ -1948,8 +2284,8 @@
         </p:nvSpPr>
         <p:spPr>
           <a:xfrm>
-            <a:off x="294722" y="1184549"/>
-            <a:ext cx="3725645" cy="1976445"/>
+            <a:off x="294722" y="1386789"/>
+            <a:ext cx="3725645" cy="2313887"/>
           </a:xfrm>
         </p:spPr>
         <p:txBody>
@@ -1980,8 +2316,8 @@
         </p:nvSpPr>
         <p:spPr>
           <a:xfrm>
-            <a:off x="294722" y="3179692"/>
-            <a:ext cx="3725645" cy="1039366"/>
+            <a:off x="294722" y="3722566"/>
+            <a:ext cx="3725645" cy="1216818"/>
           </a:xfrm>
         </p:spPr>
         <p:txBody>
@@ -2155,7 +2491,7 @@
     </p:spTree>
     <p:extLst>
       <p:ext uri="{BB962C8B-B14F-4D97-AF65-F5344CB8AC3E}">
-        <p14:creationId xmlns:p14="http://schemas.microsoft.com/office/powerpoint/2010/main" val="3121717307"/>
+        <p14:creationId xmlns:p14="http://schemas.microsoft.com/office/powerpoint/2010/main" val="3056021502"/>
       </p:ext>
     </p:extLst>
   </p:cSld>
@@ -2217,8 +2553,8 @@
         </p:nvSpPr>
         <p:spPr>
           <a:xfrm>
-            <a:off x="296972" y="1264837"/>
-            <a:ext cx="1835825" cy="3014712"/>
+            <a:off x="296972" y="1480785"/>
+            <a:ext cx="1835825" cy="3529419"/>
           </a:xfrm>
         </p:spPr>
         <p:txBody>
@@ -2274,8 +2610,8 @@
         </p:nvSpPr>
         <p:spPr>
           <a:xfrm>
-            <a:off x="2186791" y="1264837"/>
-            <a:ext cx="1835825" cy="3014712"/>
+            <a:off x="2186791" y="1480785"/>
+            <a:ext cx="1835825" cy="3529419"/>
           </a:xfrm>
         </p:spPr>
         <p:txBody>
@@ -2387,7 +2723,7 @@
     </p:spTree>
     <p:extLst>
       <p:ext uri="{BB962C8B-B14F-4D97-AF65-F5344CB8AC3E}">
-        <p14:creationId xmlns:p14="http://schemas.microsoft.com/office/powerpoint/2010/main" val="2264559350"/>
+        <p14:creationId xmlns:p14="http://schemas.microsoft.com/office/powerpoint/2010/main" val="154943188"/>
       </p:ext>
     </p:extLst>
   </p:cSld>
@@ -2426,8 +2762,8 @@
         </p:nvSpPr>
         <p:spPr>
           <a:xfrm>
-            <a:off x="297534" y="252968"/>
-            <a:ext cx="3725645" cy="918382"/>
+            <a:off x="297534" y="296158"/>
+            <a:ext cx="3725645" cy="1075179"/>
           </a:xfrm>
         </p:spPr>
         <p:txBody>
@@ -2454,8 +2790,8 @@
         </p:nvSpPr>
         <p:spPr>
           <a:xfrm>
-            <a:off x="297535" y="1164750"/>
-            <a:ext cx="1827388" cy="570826"/>
+            <a:off x="297535" y="1363610"/>
+            <a:ext cx="1827388" cy="668284"/>
           </a:xfrm>
         </p:spPr>
         <p:txBody>
@@ -2519,8 +2855,8 @@
         </p:nvSpPr>
         <p:spPr>
           <a:xfrm>
-            <a:off x="297535" y="1735576"/>
-            <a:ext cx="1827388" cy="2552772"/>
+            <a:off x="297535" y="2031894"/>
+            <a:ext cx="1827388" cy="2988610"/>
           </a:xfrm>
         </p:spPr>
         <p:txBody>
@@ -2576,8 +2912,8 @@
         </p:nvSpPr>
         <p:spPr>
           <a:xfrm>
-            <a:off x="2186791" y="1164750"/>
-            <a:ext cx="1836388" cy="570826"/>
+            <a:off x="2186791" y="1363610"/>
+            <a:ext cx="1836388" cy="668284"/>
           </a:xfrm>
         </p:spPr>
         <p:txBody>
@@ -2641,8 +2977,8 @@
         </p:nvSpPr>
         <p:spPr>
           <a:xfrm>
-            <a:off x="2186791" y="1735576"/>
-            <a:ext cx="1836388" cy="2552772"/>
+            <a:off x="2186791" y="2031894"/>
+            <a:ext cx="1836388" cy="2988610"/>
           </a:xfrm>
         </p:spPr>
         <p:txBody>
@@ -2754,7 +3090,7 @@
     </p:spTree>
     <p:extLst>
       <p:ext uri="{BB962C8B-B14F-4D97-AF65-F5344CB8AC3E}">
-        <p14:creationId xmlns:p14="http://schemas.microsoft.com/office/powerpoint/2010/main" val="174570890"/>
+        <p14:creationId xmlns:p14="http://schemas.microsoft.com/office/powerpoint/2010/main" val="15164222"/>
       </p:ext>
     </p:extLst>
   </p:cSld>
@@ -2872,7 +3208,7 @@
     </p:spTree>
     <p:extLst>
       <p:ext uri="{BB962C8B-B14F-4D97-AF65-F5344CB8AC3E}">
-        <p14:creationId xmlns:p14="http://schemas.microsoft.com/office/powerpoint/2010/main" val="878815597"/>
+        <p14:creationId xmlns:p14="http://schemas.microsoft.com/office/powerpoint/2010/main" val="4193037744"/>
       </p:ext>
     </p:extLst>
   </p:cSld>
@@ -2967,7 +3303,7 @@
     </p:spTree>
     <p:extLst>
       <p:ext uri="{BB962C8B-B14F-4D97-AF65-F5344CB8AC3E}">
-        <p14:creationId xmlns:p14="http://schemas.microsoft.com/office/powerpoint/2010/main" val="623411682"/>
+        <p14:creationId xmlns:p14="http://schemas.microsoft.com/office/powerpoint/2010/main" val="4135505067"/>
       </p:ext>
     </p:extLst>
   </p:cSld>
@@ -3006,8 +3342,8 @@
         </p:nvSpPr>
         <p:spPr>
           <a:xfrm>
-            <a:off x="297534" y="316759"/>
-            <a:ext cx="1393180" cy="1108657"/>
+            <a:off x="297534" y="370840"/>
+            <a:ext cx="1393180" cy="1297940"/>
           </a:xfrm>
         </p:spPr>
         <p:txBody>
@@ -3038,8 +3374,8 @@
         </p:nvSpPr>
         <p:spPr>
           <a:xfrm>
-            <a:off x="1836388" y="684113"/>
-            <a:ext cx="2186791" cy="3376565"/>
+            <a:off x="1836388" y="800913"/>
+            <a:ext cx="2186791" cy="3953051"/>
           </a:xfrm>
         </p:spPr>
         <p:txBody>
@@ -3123,8 +3459,8 @@
         </p:nvSpPr>
         <p:spPr>
           <a:xfrm>
-            <a:off x="297534" y="1425417"/>
-            <a:ext cx="1393180" cy="2640760"/>
+            <a:off x="297534" y="1668780"/>
+            <a:ext cx="1393180" cy="3091621"/>
           </a:xfrm>
         </p:spPr>
         <p:txBody>
@@ -3244,7 +3580,7 @@
     </p:spTree>
     <p:extLst>
       <p:ext uri="{BB962C8B-B14F-4D97-AF65-F5344CB8AC3E}">
-        <p14:creationId xmlns:p14="http://schemas.microsoft.com/office/powerpoint/2010/main" val="3900860301"/>
+        <p14:creationId xmlns:p14="http://schemas.microsoft.com/office/powerpoint/2010/main" val="2581963065"/>
       </p:ext>
     </p:extLst>
   </p:cSld>
@@ -3283,8 +3619,8 @@
         </p:nvSpPr>
         <p:spPr>
           <a:xfrm>
-            <a:off x="297534" y="316759"/>
-            <a:ext cx="1393180" cy="1108657"/>
+            <a:off x="297534" y="370840"/>
+            <a:ext cx="1393180" cy="1297940"/>
           </a:xfrm>
         </p:spPr>
         <p:txBody>
@@ -3315,8 +3651,8 @@
         </p:nvSpPr>
         <p:spPr>
           <a:xfrm>
-            <a:off x="1836388" y="684113"/>
-            <a:ext cx="2186791" cy="3376565"/>
+            <a:off x="1836388" y="800913"/>
+            <a:ext cx="2186791" cy="3953051"/>
           </a:xfrm>
         </p:spPr>
         <p:txBody>
@@ -3380,8 +3716,8 @@
         </p:nvSpPr>
         <p:spPr>
           <a:xfrm>
-            <a:off x="297534" y="1425417"/>
-            <a:ext cx="1393180" cy="2640760"/>
+            <a:off x="297534" y="1668780"/>
+            <a:ext cx="1393180" cy="3091621"/>
           </a:xfrm>
         </p:spPr>
         <p:txBody>
@@ -3501,7 +3837,7 @@
     </p:spTree>
     <p:extLst>
       <p:ext uri="{BB962C8B-B14F-4D97-AF65-F5344CB8AC3E}">
-        <p14:creationId xmlns:p14="http://schemas.microsoft.com/office/powerpoint/2010/main" val="893326614"/>
+        <p14:creationId xmlns:p14="http://schemas.microsoft.com/office/powerpoint/2010/main" val="184651177"/>
       </p:ext>
     </p:extLst>
   </p:cSld>
@@ -3545,8 +3881,8 @@
         </p:nvSpPr>
         <p:spPr>
           <a:xfrm>
-            <a:off x="296972" y="252968"/>
-            <a:ext cx="3725645" cy="918382"/>
+            <a:off x="296972" y="296158"/>
+            <a:ext cx="3725645" cy="1075179"/>
           </a:xfrm>
           <a:prstGeom prst="rect">
             <a:avLst/>
@@ -3578,8 +3914,8 @@
         </p:nvSpPr>
         <p:spPr>
           <a:xfrm>
-            <a:off x="296972" y="1264837"/>
-            <a:ext cx="3725645" cy="3014712"/>
+            <a:off x="296972" y="1480785"/>
+            <a:ext cx="3725645" cy="3529419"/>
           </a:xfrm>
           <a:prstGeom prst="rect">
             <a:avLst/>
@@ -3640,8 +3976,8 @@
         </p:nvSpPr>
         <p:spPr>
           <a:xfrm>
-            <a:off x="296972" y="4403834"/>
-            <a:ext cx="971907" cy="252967"/>
+            <a:off x="296972" y="5155707"/>
+            <a:ext cx="971907" cy="296157"/>
           </a:xfrm>
           <a:prstGeom prst="rect">
             <a:avLst/>
@@ -3681,8 +4017,8 @@
         </p:nvSpPr>
         <p:spPr>
           <a:xfrm>
-            <a:off x="1430864" y="4403834"/>
-            <a:ext cx="1457861" cy="252967"/>
+            <a:off x="1430864" y="5155707"/>
+            <a:ext cx="1457861" cy="296157"/>
           </a:xfrm>
           <a:prstGeom prst="rect">
             <a:avLst/>
@@ -3718,8 +4054,8 @@
         </p:nvSpPr>
         <p:spPr>
           <a:xfrm>
-            <a:off x="3050709" y="4403834"/>
-            <a:ext cx="971907" cy="252967"/>
+            <a:off x="3050709" y="5155707"/>
+            <a:ext cx="971907" cy="296157"/>
           </a:xfrm>
           <a:prstGeom prst="rect">
             <a:avLst/>
@@ -3750,23 +4086,23 @@
     </p:spTree>
     <p:extLst>
       <p:ext uri="{BB962C8B-B14F-4D97-AF65-F5344CB8AC3E}">
-        <p14:creationId xmlns:p14="http://schemas.microsoft.com/office/powerpoint/2010/main" val="341480541"/>
+        <p14:creationId xmlns:p14="http://schemas.microsoft.com/office/powerpoint/2010/main" val="3230036479"/>
       </p:ext>
     </p:extLst>
   </p:cSld>
   <p:clrMap bg1="lt1" tx1="dk1" bg2="lt2" tx2="dk2" accent1="accent1" accent2="accent2" accent3="accent3" accent4="accent4" accent5="accent5" accent6="accent6" hlink="hlink" folHlink="folHlink"/>
   <p:sldLayoutIdLst>
-    <p:sldLayoutId id="2147483685" r:id="rId1"/>
-    <p:sldLayoutId id="2147483686" r:id="rId2"/>
-    <p:sldLayoutId id="2147483687" r:id="rId3"/>
-    <p:sldLayoutId id="2147483688" r:id="rId4"/>
-    <p:sldLayoutId id="2147483689" r:id="rId5"/>
-    <p:sldLayoutId id="2147483690" r:id="rId6"/>
-    <p:sldLayoutId id="2147483691" r:id="rId7"/>
-    <p:sldLayoutId id="2147483692" r:id="rId8"/>
-    <p:sldLayoutId id="2147483693" r:id="rId9"/>
-    <p:sldLayoutId id="2147483694" r:id="rId10"/>
-    <p:sldLayoutId id="2147483695" r:id="rId11"/>
+    <p:sldLayoutId id="2147483709" r:id="rId1"/>
+    <p:sldLayoutId id="2147483710" r:id="rId2"/>
+    <p:sldLayoutId id="2147483711" r:id="rId3"/>
+    <p:sldLayoutId id="2147483712" r:id="rId4"/>
+    <p:sldLayoutId id="2147483713" r:id="rId5"/>
+    <p:sldLayoutId id="2147483714" r:id="rId6"/>
+    <p:sldLayoutId id="2147483715" r:id="rId7"/>
+    <p:sldLayoutId id="2147483716" r:id="rId8"/>
+    <p:sldLayoutId id="2147483717" r:id="rId9"/>
+    <p:sldLayoutId id="2147483718" r:id="rId10"/>
+    <p:sldLayoutId id="2147483719" r:id="rId11"/>
   </p:sldLayoutIdLst>
   <p:txStyles>
     <p:titleStyle>
@@ -4070,7 +4406,7 @@
       </p:grpSpPr>
       <p:sp>
         <p:nvSpPr>
-          <p:cNvPr id="4" name="TextBox 3">
+          <p:cNvPr id="38" name="TextBox 37">
             <a:extLst>
               <a:ext uri="{FF2B5EF4-FFF2-40B4-BE49-F238E27FC236}">
                 <a16:creationId xmlns:a16="http://schemas.microsoft.com/office/drawing/2014/main" id="{E38ABB4D-863F-E734-71F8-6A361F5E1DE3}"/>
@@ -4082,13 +4418,20 @@
         </p:nvSpPr>
         <p:spPr>
           <a:xfrm>
-            <a:off x="-97281" y="714629"/>
+            <a:off x="9525" y="1115028"/>
             <a:ext cx="492443" cy="1079492"/>
           </a:xfrm>
           <a:prstGeom prst="rect">
             <a:avLst/>
           </a:prstGeom>
           <a:noFill/>
+          <a:ln w="3175">
+            <a:solidFill>
+              <a:schemeClr val="bg1">
+                <a:lumMod val="50000"/>
+              </a:schemeClr>
+            </a:solidFill>
+          </a:ln>
         </p:spPr>
         <p:txBody>
           <a:bodyPr vert="vert270" wrap="square" rtlCol="0">
@@ -4109,7 +4452,7 @@
       </p:sp>
       <p:sp>
         <p:nvSpPr>
-          <p:cNvPr id="5" name="Rectangle 4">
+          <p:cNvPr id="39" name="Rectangle 38">
             <a:extLst>
               <a:ext uri="{FF2B5EF4-FFF2-40B4-BE49-F238E27FC236}">
                 <a16:creationId xmlns:a16="http://schemas.microsoft.com/office/drawing/2014/main" id="{887FF438-27CB-7933-3FF0-750C83E136A4}"/>
@@ -4121,7 +4464,7 @@
         </p:nvSpPr>
         <p:spPr>
           <a:xfrm>
-            <a:off x="3066404" y="276225"/>
+            <a:off x="3085454" y="676275"/>
             <a:ext cx="1224000" cy="360000"/>
           </a:xfrm>
           <a:prstGeom prst="rect">
@@ -4170,7 +4513,7 @@
       </p:sp>
       <p:sp>
         <p:nvSpPr>
-          <p:cNvPr id="10" name="Rectangle 9">
+          <p:cNvPr id="40" name="Rectangle 39">
             <a:extLst>
               <a:ext uri="{FF2B5EF4-FFF2-40B4-BE49-F238E27FC236}">
                 <a16:creationId xmlns:a16="http://schemas.microsoft.com/office/drawing/2014/main" id="{94699DC0-F296-4F13-1267-BB22E3869038}"/>
@@ -4182,7 +4525,7 @@
         </p:nvSpPr>
         <p:spPr>
           <a:xfrm>
-            <a:off x="1757092" y="276225"/>
+            <a:off x="1821775" y="676275"/>
             <a:ext cx="1224000" cy="360000"/>
           </a:xfrm>
           <a:prstGeom prst="rect">
@@ -4231,7 +4574,7 @@
       </p:sp>
       <p:sp>
         <p:nvSpPr>
-          <p:cNvPr id="11" name="Rectangle 10">
+          <p:cNvPr id="41" name="Rectangle 40">
             <a:extLst>
               <a:ext uri="{FF2B5EF4-FFF2-40B4-BE49-F238E27FC236}">
                 <a16:creationId xmlns:a16="http://schemas.microsoft.com/office/drawing/2014/main" id="{B70B7DAE-BBF8-26B9-F316-694D75EF55A1}"/>
@@ -4243,7 +4586,7 @@
         </p:nvSpPr>
         <p:spPr>
           <a:xfrm>
-            <a:off x="434272" y="276225"/>
+            <a:off x="566418" y="676275"/>
             <a:ext cx="1224000" cy="360000"/>
           </a:xfrm>
           <a:prstGeom prst="rect">
@@ -4292,7 +4635,7 @@
       </p:sp>
       <p:sp>
         <p:nvSpPr>
-          <p:cNvPr id="18" name="TextBox 17">
+          <p:cNvPr id="42" name="TextBox 41">
             <a:extLst>
               <a:ext uri="{FF2B5EF4-FFF2-40B4-BE49-F238E27FC236}">
                 <a16:creationId xmlns:a16="http://schemas.microsoft.com/office/drawing/2014/main" id="{DA0A3A3F-6F21-9FFB-DFE8-C73B8123777A}"/>
@@ -4304,7 +4647,7 @@
         </p:nvSpPr>
         <p:spPr>
           <a:xfrm>
-            <a:off x="365257" y="644938"/>
+            <a:off x="497403" y="1044988"/>
             <a:ext cx="1362031" cy="1169551"/>
           </a:xfrm>
           <a:prstGeom prst="rect">
@@ -4353,7 +4696,7 @@
       </p:sp>
       <p:sp>
         <p:nvSpPr>
-          <p:cNvPr id="19" name="TextBox 18">
+          <p:cNvPr id="43" name="TextBox 42">
             <a:extLst>
               <a:ext uri="{FF2B5EF4-FFF2-40B4-BE49-F238E27FC236}">
                 <a16:creationId xmlns:a16="http://schemas.microsoft.com/office/drawing/2014/main" id="{DB5FE5E2-2AF1-E6C3-A893-A13186B11D78}"/>
@@ -4365,7 +4708,7 @@
         </p:nvSpPr>
         <p:spPr>
           <a:xfrm>
-            <a:off x="1662290" y="644938"/>
+            <a:off x="1726973" y="1036275"/>
             <a:ext cx="1413605" cy="1169551"/>
           </a:xfrm>
           <a:prstGeom prst="rect">
@@ -4414,7 +4757,7 @@
       </p:sp>
       <p:sp>
         <p:nvSpPr>
-          <p:cNvPr id="24" name="TextBox 23">
+          <p:cNvPr id="44" name="TextBox 43">
             <a:extLst>
               <a:ext uri="{FF2B5EF4-FFF2-40B4-BE49-F238E27FC236}">
                 <a16:creationId xmlns:a16="http://schemas.microsoft.com/office/drawing/2014/main" id="{C697B761-747A-2315-B6B9-C750C47D99DC}"/>
@@ -4426,7 +4769,7 @@
         </p:nvSpPr>
         <p:spPr>
           <a:xfrm>
-            <a:off x="3066404" y="644938"/>
+            <a:off x="3085454" y="1044988"/>
             <a:ext cx="1224000" cy="1169551"/>
           </a:xfrm>
           <a:prstGeom prst="rect">
@@ -4475,7 +4818,7 @@
       </p:sp>
       <p:cxnSp>
         <p:nvCxnSpPr>
-          <p:cNvPr id="27" name="Straight Connector 26">
+          <p:cNvPr id="45" name="Straight Connector 44">
             <a:extLst>
               <a:ext uri="{FF2B5EF4-FFF2-40B4-BE49-F238E27FC236}">
                 <a16:creationId xmlns:a16="http://schemas.microsoft.com/office/drawing/2014/main" id="{D31AED20-CCB3-4490-522C-CFA515D0B76F}"/>
@@ -4487,7 +4830,7 @@
         </p:nvCxnSpPr>
         <p:spPr>
           <a:xfrm>
-            <a:off x="11480" y="1863911"/>
+            <a:off x="11480" y="2263961"/>
             <a:ext cx="4319586" cy="0"/>
           </a:xfrm>
           <a:prstGeom prst="line">
@@ -4518,7 +4861,7 @@
       </p:cxnSp>
       <p:sp>
         <p:nvSpPr>
-          <p:cNvPr id="28" name="TextBox 27">
+          <p:cNvPr id="52" name="TextBox 51">
             <a:extLst>
               <a:ext uri="{FF2B5EF4-FFF2-40B4-BE49-F238E27FC236}">
                 <a16:creationId xmlns:a16="http://schemas.microsoft.com/office/drawing/2014/main" id="{3FA77F1B-56D8-FF8C-7ECE-F7D395C2B6A3}"/>
@@ -4530,13 +4873,20 @@
         </p:nvSpPr>
         <p:spPr>
           <a:xfrm>
-            <a:off x="-97281" y="1943931"/>
-            <a:ext cx="492443" cy="2823256"/>
+            <a:off x="9525" y="2409825"/>
+            <a:ext cx="492443" cy="3143250"/>
           </a:xfrm>
           <a:prstGeom prst="rect">
             <a:avLst/>
           </a:prstGeom>
           <a:noFill/>
+          <a:ln w="3175">
+            <a:solidFill>
+              <a:schemeClr val="bg1">
+                <a:lumMod val="50000"/>
+              </a:schemeClr>
+            </a:solidFill>
+          </a:ln>
         </p:spPr>
         <p:txBody>
           <a:bodyPr vert="vert270" wrap="square" rtlCol="0">
@@ -4567,7 +4917,7 @@
       </p:sp>
       <p:sp>
         <p:nvSpPr>
-          <p:cNvPr id="31" name="TextBox 30">
+          <p:cNvPr id="53" name="TextBox 52">
             <a:extLst>
               <a:ext uri="{FF2B5EF4-FFF2-40B4-BE49-F238E27FC236}">
                 <a16:creationId xmlns:a16="http://schemas.microsoft.com/office/drawing/2014/main" id="{44B1E732-CD1A-C841-C76B-2D4E477D2BEA}"/>
@@ -4579,7 +4929,7 @@
         </p:nvSpPr>
         <p:spPr>
           <a:xfrm>
-            <a:off x="353323" y="1943930"/>
+            <a:off x="485469" y="2343980"/>
             <a:ext cx="1385898" cy="707886"/>
           </a:xfrm>
           <a:prstGeom prst="rect">
@@ -4612,7 +4962,7 @@
       </p:sp>
       <p:sp>
         <p:nvSpPr>
-          <p:cNvPr id="35" name="Arrow: Right 34">
+          <p:cNvPr id="54" name="Arrow: Right 53">
             <a:extLst>
               <a:ext uri="{FF2B5EF4-FFF2-40B4-BE49-F238E27FC236}">
                 <a16:creationId xmlns:a16="http://schemas.microsoft.com/office/drawing/2014/main" id="{68257504-6232-AE97-65EB-A783B54CBE6E}"/>
@@ -4624,7 +4974,7 @@
         </p:nvSpPr>
         <p:spPr>
           <a:xfrm>
-            <a:off x="1177560" y="2775574"/>
+            <a:off x="1177560" y="3175624"/>
             <a:ext cx="1080000" cy="294803"/>
           </a:xfrm>
           <a:prstGeom prst="rightArrow">
@@ -4676,7 +5026,7 @@
       </p:sp>
       <p:sp>
         <p:nvSpPr>
-          <p:cNvPr id="36" name="Arrow: Right 35">
+          <p:cNvPr id="55" name="Arrow: Right 54">
             <a:extLst>
               <a:ext uri="{FF2B5EF4-FFF2-40B4-BE49-F238E27FC236}">
                 <a16:creationId xmlns:a16="http://schemas.microsoft.com/office/drawing/2014/main" id="{FACA616D-C4B5-17C1-769A-FD8F22C41947}"/>
@@ -4688,7 +5038,7 @@
         </p:nvSpPr>
         <p:spPr>
           <a:xfrm>
-            <a:off x="1469620" y="4120141"/>
+            <a:off x="1469620" y="4520191"/>
             <a:ext cx="1887295" cy="294803"/>
           </a:xfrm>
           <a:prstGeom prst="rightArrow">
@@ -4740,7 +5090,7 @@
       </p:sp>
       <p:sp>
         <p:nvSpPr>
-          <p:cNvPr id="37" name="Arrow: Right 36">
+          <p:cNvPr id="56" name="Arrow: Right 55">
             <a:extLst>
               <a:ext uri="{FF2B5EF4-FFF2-40B4-BE49-F238E27FC236}">
                 <a16:creationId xmlns:a16="http://schemas.microsoft.com/office/drawing/2014/main" id="{F26916BE-D699-C1DD-08D0-AA710FCCDE17}"/>
@@ -4752,7 +5102,7 @@
         </p:nvSpPr>
         <p:spPr>
           <a:xfrm>
-            <a:off x="2506948" y="2775574"/>
+            <a:off x="2506948" y="3175624"/>
             <a:ext cx="1080000" cy="294803"/>
           </a:xfrm>
           <a:prstGeom prst="rightArrow">
@@ -4804,7 +5154,7 @@
       </p:sp>
       <p:sp>
         <p:nvSpPr>
-          <p:cNvPr id="46" name="TextBox 45">
+          <p:cNvPr id="57" name="TextBox 56">
             <a:extLst>
               <a:ext uri="{FF2B5EF4-FFF2-40B4-BE49-F238E27FC236}">
                 <a16:creationId xmlns:a16="http://schemas.microsoft.com/office/drawing/2014/main" id="{02EDCF91-6F58-68A4-E039-B443793D57EE}"/>
@@ -4816,7 +5166,7 @@
         </p:nvSpPr>
         <p:spPr>
           <a:xfrm>
-            <a:off x="618681" y="3028681"/>
+            <a:off x="618681" y="3428731"/>
             <a:ext cx="1943812" cy="1015663"/>
           </a:xfrm>
           <a:prstGeom prst="rect">
@@ -4849,7 +5199,7 @@
       </p:sp>
       <p:sp>
         <p:nvSpPr>
-          <p:cNvPr id="47" name="TextBox 46">
+          <p:cNvPr id="58" name="TextBox 57">
             <a:extLst>
               <a:ext uri="{FF2B5EF4-FFF2-40B4-BE49-F238E27FC236}">
                 <a16:creationId xmlns:a16="http://schemas.microsoft.com/office/drawing/2014/main" id="{8D6F7FC1-F44B-F17D-70EB-2F3046E87765}"/>
@@ -4861,7 +5211,7 @@
         </p:nvSpPr>
         <p:spPr>
           <a:xfrm>
-            <a:off x="2500132" y="3028681"/>
+            <a:off x="2500132" y="3428731"/>
             <a:ext cx="1790272" cy="1015663"/>
           </a:xfrm>
           <a:prstGeom prst="rect">
@@ -4894,7 +5244,7 @@
       </p:sp>
       <p:sp>
         <p:nvSpPr>
-          <p:cNvPr id="48" name="TextBox 47">
+          <p:cNvPr id="59" name="TextBox 58">
             <a:extLst>
               <a:ext uri="{FF2B5EF4-FFF2-40B4-BE49-F238E27FC236}">
                 <a16:creationId xmlns:a16="http://schemas.microsoft.com/office/drawing/2014/main" id="{8E390072-E55B-20B8-89E6-4C4585DFB6F8}"/>
@@ -4906,8 +5256,8 @@
         </p:nvSpPr>
         <p:spPr>
           <a:xfrm>
-            <a:off x="1311258" y="4367076"/>
-            <a:ext cx="2195023" cy="400110"/>
+            <a:off x="1248906" y="4765653"/>
+            <a:ext cx="2328721" cy="861774"/>
           </a:xfrm>
           <a:prstGeom prst="rect">
             <a:avLst/>
@@ -4932,14 +5282,14 @@
                 <a:latin typeface="Calibri Light" panose="020F0302020204030204" pitchFamily="34" charset="0"/>
                 <a:cs typeface="Calibri Light" panose="020F0302020204030204" pitchFamily="34" charset="0"/>
               </a:rPr>
-              <a:t>Flash-flood-focused verification framework</a:t>
-            </a:r>
-          </a:p>
-        </p:txBody>
-      </p:sp>
-      <p:sp>
-        <p:nvSpPr>
-          <p:cNvPr id="49" name="TextBox 48">
+              <a:t>Flash-flood-focused verification framework &amp; rainfall-based benchmark forecasts to assess medium-range data-driven hydro-meteorological predictions of areas at risk of flash floods. </a:t>
+            </a:r>
+          </a:p>
+        </p:txBody>
+      </p:sp>
+      <p:sp>
+        <p:nvSpPr>
+          <p:cNvPr id="60" name="TextBox 59">
             <a:extLst>
               <a:ext uri="{FF2B5EF4-FFF2-40B4-BE49-F238E27FC236}">
                 <a16:creationId xmlns:a16="http://schemas.microsoft.com/office/drawing/2014/main" id="{737BB970-06A3-D82D-DD59-9485C3A2FB34}"/>
@@ -4951,7 +5301,7 @@
         </p:nvSpPr>
         <p:spPr>
           <a:xfrm>
-            <a:off x="1757092" y="1943930"/>
+            <a:off x="1821775" y="2343980"/>
             <a:ext cx="1224000" cy="707886"/>
           </a:xfrm>
           <a:prstGeom prst="rect">
@@ -4984,7 +5334,7 @@
       </p:sp>
       <p:sp>
         <p:nvSpPr>
-          <p:cNvPr id="50" name="TextBox 49">
+          <p:cNvPr id="61" name="TextBox 60">
             <a:extLst>
               <a:ext uri="{FF2B5EF4-FFF2-40B4-BE49-F238E27FC236}">
                 <a16:creationId xmlns:a16="http://schemas.microsoft.com/office/drawing/2014/main" id="{88E5E416-C7A1-C227-031E-B35CF991FEFF}"/>
@@ -4996,7 +5346,7 @@
         </p:nvSpPr>
         <p:spPr>
           <a:xfrm>
-            <a:off x="3107066" y="1943930"/>
+            <a:off x="3126116" y="2343980"/>
             <a:ext cx="1224000" cy="707886"/>
           </a:xfrm>
           <a:prstGeom prst="rect">
@@ -5029,7 +5379,7 @@
       </p:sp>
       <p:sp>
         <p:nvSpPr>
-          <p:cNvPr id="51" name="TextBox 50">
+          <p:cNvPr id="62" name="TextBox 61">
             <a:extLst>
               <a:ext uri="{FF2B5EF4-FFF2-40B4-BE49-F238E27FC236}">
                 <a16:creationId xmlns:a16="http://schemas.microsoft.com/office/drawing/2014/main" id="{761A0E4A-D491-74D5-90F0-C519DB1C25DC}"/>
@@ -5041,8 +5391,61 @@
         </p:nvSpPr>
         <p:spPr>
           <a:xfrm>
-            <a:off x="434272" y="-28553"/>
-            <a:ext cx="3856132" cy="246221"/>
+            <a:off x="567621" y="400072"/>
+            <a:ext cx="3732308" cy="246221"/>
+          </a:xfrm>
+          <a:prstGeom prst="rect">
+            <a:avLst/>
+          </a:prstGeom>
+          <a:noFill/>
+          <a:ln w="3175">
+            <a:solidFill>
+              <a:schemeClr val="bg1">
+                <a:lumMod val="50000"/>
+              </a:schemeClr>
+            </a:solidFill>
+          </a:ln>
+        </p:spPr>
+        <p:txBody>
+          <a:bodyPr vert="horz" wrap="square" rtlCol="0">
+            <a:spAutoFit/>
+          </a:bodyPr>
+          <a:lstStyle/>
+          <a:p>
+            <a:pPr algn="ctr"/>
+            <a:r>
+              <a:rPr lang="en-GB" sz="1000" b="1" u="sng" dirty="0">
+                <a:latin typeface="Calibri" panose="020F0502020204030204" pitchFamily="34" charset="0"/>
+                <a:cs typeface="Calibri" panose="020F0502020204030204" pitchFamily="34" charset="0"/>
+              </a:rPr>
+              <a:t>MAIN ANALYSIS </a:t>
+            </a:r>
+            <a:r>
+              <a:rPr lang="en-GB" sz="1000" dirty="0">
+                <a:latin typeface="Calibri Light" panose="020F0302020204030204" pitchFamily="34" charset="0"/>
+                <a:cs typeface="Calibri Light" panose="020F0302020204030204" pitchFamily="34" charset="0"/>
+              </a:rPr>
+              <a:t>CHAPTERS</a:t>
+            </a:r>
+          </a:p>
+        </p:txBody>
+      </p:sp>
+      <p:sp>
+        <p:nvSpPr>
+          <p:cNvPr id="63" name="TextBox 62">
+            <a:extLst>
+              <a:ext uri="{FF2B5EF4-FFF2-40B4-BE49-F238E27FC236}">
+                <a16:creationId xmlns:a16="http://schemas.microsoft.com/office/drawing/2014/main" id="{5A52E58A-BA02-021E-4F28-6D976EBB835E}"/>
+              </a:ext>
+            </a:extLst>
+          </p:cNvPr>
+          <p:cNvSpPr txBox="1"/>
+          <p:nvPr/>
+        </p:nvSpPr>
+        <p:spPr>
+          <a:xfrm>
+            <a:off x="-81390" y="-63159"/>
+            <a:ext cx="4600575" cy="430887"/>
           </a:xfrm>
           <a:prstGeom prst="rect">
             <a:avLst/>
@@ -5055,21 +5458,26 @@
           </a:bodyPr>
           <a:lstStyle/>
           <a:p>
-            <a:pPr algn="ctr"/>
-            <a:r>
-              <a:rPr lang="en-GB" sz="1000" b="1" u="sng" dirty="0">
+            <a:r>
+              <a:rPr lang="en-US" sz="1200" b="1" dirty="0">
                 <a:latin typeface="Calibri" panose="020F0502020204030204" pitchFamily="34" charset="0"/>
                 <a:cs typeface="Calibri" panose="020F0502020204030204" pitchFamily="34" charset="0"/>
               </a:rPr>
-              <a:t>MAIN ANALYSIS </a:t>
-            </a:r>
-            <a:r>
-              <a:rPr lang="en-GB" sz="1000" dirty="0">
+              <a:t>Thesis’ integrated experimental design </a:t>
+            </a:r>
+          </a:p>
+          <a:p>
+            <a:r>
+              <a:rPr lang="en-US" sz="1000" dirty="0">
                 <a:latin typeface="Calibri Light" panose="020F0302020204030204" pitchFamily="34" charset="0"/>
                 <a:cs typeface="Calibri Light" panose="020F0302020204030204" pitchFamily="34" charset="0"/>
               </a:rPr>
-              <a:t>CHAPTERS</a:t>
-            </a:r>
+              <a:t>Workflow and dataflow within main analysis chapters </a:t>
+            </a:r>
+            <a:endParaRPr lang="en-GB" sz="1000" dirty="0">
+              <a:latin typeface="Calibri Light" panose="020F0302020204030204" pitchFamily="34" charset="0"/>
+              <a:cs typeface="Calibri Light" panose="020F0302020204030204" pitchFamily="34" charset="0"/>
+            </a:endParaRPr>
           </a:p>
         </p:txBody>
       </p:sp>

</xml_diff>

<commit_message>
Improved diagrams in chapter 3
</commit_message>
<xml_diff>
--- a/chapter_03/figures/workflow_dataflow.pptx
+++ b/chapter_03/figures/workflow_dataflow.pptx
@@ -352,12 +352,12 @@
   <pc:docChgLst>
     <pc:chgData name="Fatima Pillosu" userId="a6295d4dc9e22643" providerId="LiveId" clId="{E45A9BF4-C197-4918-8A99-49F61B604D71}"/>
     <pc:docChg chg="undo custSel modSld">
-      <pc:chgData name="Fatima Pillosu" userId="a6295d4dc9e22643" providerId="LiveId" clId="{E45A9BF4-C197-4918-8A99-49F61B604D71}" dt="2025-06-11T15:25:35.089" v="1066" actId="1035"/>
+      <pc:chgData name="Fatima Pillosu" userId="a6295d4dc9e22643" providerId="LiveId" clId="{E45A9BF4-C197-4918-8A99-49F61B604D71}" dt="2025-06-11T15:35:13.575" v="1094" actId="1036"/>
       <pc:docMkLst>
         <pc:docMk/>
       </pc:docMkLst>
       <pc:sldChg chg="addSp delSp modSp mod">
-        <pc:chgData name="Fatima Pillosu" userId="a6295d4dc9e22643" providerId="LiveId" clId="{E45A9BF4-C197-4918-8A99-49F61B604D71}" dt="2025-06-11T15:25:35.089" v="1066" actId="1035"/>
+        <pc:chgData name="Fatima Pillosu" userId="a6295d4dc9e22643" providerId="LiveId" clId="{E45A9BF4-C197-4918-8A99-49F61B604D71}" dt="2025-06-11T15:35:13.575" v="1094" actId="1036"/>
         <pc:sldMkLst>
           <pc:docMk/>
           <pc:sldMk cId="2412790101" sldId="256"/>
@@ -795,7 +795,7 @@
           </ac:spMkLst>
         </pc:spChg>
         <pc:spChg chg="add mod">
-          <ac:chgData name="Fatima Pillosu" userId="a6295d4dc9e22643" providerId="LiveId" clId="{E45A9BF4-C197-4918-8A99-49F61B604D71}" dt="2025-06-11T15:25:23.519" v="1063"/>
+          <ac:chgData name="Fatima Pillosu" userId="a6295d4dc9e22643" providerId="LiveId" clId="{E45A9BF4-C197-4918-8A99-49F61B604D71}" dt="2025-06-11T15:34:41.382" v="1068" actId="208"/>
           <ac:spMkLst>
             <pc:docMk/>
             <pc:sldMk cId="2412790101" sldId="256"/>
@@ -955,7 +955,7 @@
           </ac:spMkLst>
         </pc:spChg>
         <pc:spChg chg="add mod">
-          <ac:chgData name="Fatima Pillosu" userId="a6295d4dc9e22643" providerId="LiveId" clId="{E45A9BF4-C197-4918-8A99-49F61B604D71}" dt="2025-06-11T15:25:35.089" v="1066" actId="1035"/>
+          <ac:chgData name="Fatima Pillosu" userId="a6295d4dc9e22643" providerId="LiveId" clId="{E45A9BF4-C197-4918-8A99-49F61B604D71}" dt="2025-06-11T15:34:41.382" v="1068" actId="208"/>
           <ac:spMkLst>
             <pc:docMk/>
             <pc:sldMk cId="2412790101" sldId="256"/>
@@ -971,7 +971,7 @@
           </ac:spMkLst>
         </pc:spChg>
         <pc:spChg chg="add mod">
-          <ac:chgData name="Fatima Pillosu" userId="a6295d4dc9e22643" providerId="LiveId" clId="{E45A9BF4-C197-4918-8A99-49F61B604D71}" dt="2025-06-11T15:25:23.519" v="1063"/>
+          <ac:chgData name="Fatima Pillosu" userId="a6295d4dc9e22643" providerId="LiveId" clId="{E45A9BF4-C197-4918-8A99-49F61B604D71}" dt="2025-06-11T15:35:13.575" v="1094" actId="1036"/>
           <ac:spMkLst>
             <pc:docMk/>
             <pc:sldMk cId="2412790101" sldId="256"/>
@@ -987,11 +987,35 @@
           </ac:spMkLst>
         </pc:spChg>
         <pc:spChg chg="add mod">
-          <ac:chgData name="Fatima Pillosu" userId="a6295d4dc9e22643" providerId="LiveId" clId="{E45A9BF4-C197-4918-8A99-49F61B604D71}" dt="2025-06-11T15:25:23.519" v="1063"/>
+          <ac:chgData name="Fatima Pillosu" userId="a6295d4dc9e22643" providerId="LiveId" clId="{E45A9BF4-C197-4918-8A99-49F61B604D71}" dt="2025-06-11T15:35:13.575" v="1094" actId="1036"/>
           <ac:spMkLst>
             <pc:docMk/>
             <pc:sldMk cId="2412790101" sldId="256"/>
             <ac:spMk id="56" creationId="{F26916BE-D699-C1DD-08D0-AA710FCCDE17}"/>
+          </ac:spMkLst>
+        </pc:spChg>
+        <pc:spChg chg="add mod">
+          <ac:chgData name="Fatima Pillosu" userId="a6295d4dc9e22643" providerId="LiveId" clId="{E45A9BF4-C197-4918-8A99-49F61B604D71}" dt="2025-06-11T15:35:13.575" v="1094" actId="1036"/>
+          <ac:spMkLst>
+            <pc:docMk/>
+            <pc:sldMk cId="2412790101" sldId="256"/>
+            <ac:spMk id="57" creationId="{02EDCF91-6F58-68A4-E039-B443793D57EE}"/>
+          </ac:spMkLst>
+        </pc:spChg>
+        <pc:spChg chg="add mod">
+          <ac:chgData name="Fatima Pillosu" userId="a6295d4dc9e22643" providerId="LiveId" clId="{E45A9BF4-C197-4918-8A99-49F61B604D71}" dt="2025-06-11T15:35:13.575" v="1094" actId="1036"/>
+          <ac:spMkLst>
+            <pc:docMk/>
+            <pc:sldMk cId="2412790101" sldId="256"/>
+            <ac:spMk id="58" creationId="{8D6F7FC1-F44B-F17D-70EB-2F3046E87765}"/>
+          </ac:spMkLst>
+        </pc:spChg>
+        <pc:spChg chg="add mod">
+          <ac:chgData name="Fatima Pillosu" userId="a6295d4dc9e22643" providerId="LiveId" clId="{E45A9BF4-C197-4918-8A99-49F61B604D71}" dt="2025-06-11T15:25:27.395" v="1064" actId="20577"/>
+          <ac:spMkLst>
+            <pc:docMk/>
+            <pc:sldMk cId="2412790101" sldId="256"/>
+            <ac:spMk id="59" creationId="{8E390072-E55B-20B8-89E6-4C4585DFB6F8}"/>
           </ac:spMkLst>
         </pc:spChg>
         <pc:spChg chg="add mod">
@@ -999,7 +1023,7 @@
           <ac:spMkLst>
             <pc:docMk/>
             <pc:sldMk cId="2412790101" sldId="256"/>
-            <ac:spMk id="57" creationId="{02EDCF91-6F58-68A4-E039-B443793D57EE}"/>
+            <ac:spMk id="60" creationId="{737BB970-06A3-D82D-DD59-9485C3A2FB34}"/>
           </ac:spMkLst>
         </pc:spChg>
         <pc:spChg chg="add mod">
@@ -1007,35 +1031,11 @@
           <ac:spMkLst>
             <pc:docMk/>
             <pc:sldMk cId="2412790101" sldId="256"/>
-            <ac:spMk id="58" creationId="{8D6F7FC1-F44B-F17D-70EB-2F3046E87765}"/>
+            <ac:spMk id="61" creationId="{88E5E416-C7A1-C227-031E-B35CF991FEFF}"/>
           </ac:spMkLst>
         </pc:spChg>
         <pc:spChg chg="add mod">
-          <ac:chgData name="Fatima Pillosu" userId="a6295d4dc9e22643" providerId="LiveId" clId="{E45A9BF4-C197-4918-8A99-49F61B604D71}" dt="2025-06-11T15:25:27.395" v="1064" actId="20577"/>
-          <ac:spMkLst>
-            <pc:docMk/>
-            <pc:sldMk cId="2412790101" sldId="256"/>
-            <ac:spMk id="59" creationId="{8E390072-E55B-20B8-89E6-4C4585DFB6F8}"/>
-          </ac:spMkLst>
-        </pc:spChg>
-        <pc:spChg chg="add mod">
-          <ac:chgData name="Fatima Pillosu" userId="a6295d4dc9e22643" providerId="LiveId" clId="{E45A9BF4-C197-4918-8A99-49F61B604D71}" dt="2025-06-11T15:25:23.519" v="1063"/>
-          <ac:spMkLst>
-            <pc:docMk/>
-            <pc:sldMk cId="2412790101" sldId="256"/>
-            <ac:spMk id="60" creationId="{737BB970-06A3-D82D-DD59-9485C3A2FB34}"/>
-          </ac:spMkLst>
-        </pc:spChg>
-        <pc:spChg chg="add mod">
-          <ac:chgData name="Fatima Pillosu" userId="a6295d4dc9e22643" providerId="LiveId" clId="{E45A9BF4-C197-4918-8A99-49F61B604D71}" dt="2025-06-11T15:25:23.519" v="1063"/>
-          <ac:spMkLst>
-            <pc:docMk/>
-            <pc:sldMk cId="2412790101" sldId="256"/>
-            <ac:spMk id="61" creationId="{88E5E416-C7A1-C227-031E-B35CF991FEFF}"/>
-          </ac:spMkLst>
-        </pc:spChg>
-        <pc:spChg chg="add mod">
-          <ac:chgData name="Fatima Pillosu" userId="a6295d4dc9e22643" providerId="LiveId" clId="{E45A9BF4-C197-4918-8A99-49F61B604D71}" dt="2025-06-11T15:25:23.519" v="1063"/>
+          <ac:chgData name="Fatima Pillosu" userId="a6295d4dc9e22643" providerId="LiveId" clId="{E45A9BF4-C197-4918-8A99-49F61B604D71}" dt="2025-06-11T15:34:41.382" v="1068" actId="208"/>
           <ac:spMkLst>
             <pc:docMk/>
             <pc:sldMk cId="2412790101" sldId="256"/>
@@ -1091,7 +1091,7 @@
           </ac:cxnSpMkLst>
         </pc:cxnChg>
         <pc:cxnChg chg="add mod">
-          <ac:chgData name="Fatima Pillosu" userId="a6295d4dc9e22643" providerId="LiveId" clId="{E45A9BF4-C197-4918-8A99-49F61B604D71}" dt="2025-06-11T15:25:23.519" v="1063"/>
+          <ac:chgData name="Fatima Pillosu" userId="a6295d4dc9e22643" providerId="LiveId" clId="{E45A9BF4-C197-4918-8A99-49F61B604D71}" dt="2025-06-11T15:34:41.382" v="1068" actId="208"/>
           <ac:cxnSpMkLst>
             <pc:docMk/>
             <pc:sldMk cId="2412790101" sldId="256"/>
@@ -4425,10 +4425,11 @@
             <a:avLst/>
           </a:prstGeom>
           <a:noFill/>
-          <a:ln w="3175">
+          <a:ln w="6350">
             <a:solidFill>
-              <a:schemeClr val="bg1">
+              <a:schemeClr val="tx1">
                 <a:lumMod val="50000"/>
+                <a:lumOff val="50000"/>
               </a:schemeClr>
             </a:solidFill>
           </a:ln>
@@ -4836,10 +4837,11 @@
           <a:prstGeom prst="line">
             <a:avLst/>
           </a:prstGeom>
-          <a:ln w="3175">
+          <a:ln w="6350">
             <a:solidFill>
-              <a:schemeClr val="bg1">
-                <a:lumMod val="75000"/>
+              <a:schemeClr val="tx1">
+                <a:lumMod val="50000"/>
+                <a:lumOff val="50000"/>
               </a:schemeClr>
             </a:solidFill>
           </a:ln>
@@ -4880,10 +4882,11 @@
             <a:avLst/>
           </a:prstGeom>
           <a:noFill/>
-          <a:ln w="3175">
+          <a:ln w="6350">
             <a:solidFill>
-              <a:schemeClr val="bg1">
+              <a:schemeClr val="tx1">
                 <a:lumMod val="50000"/>
+                <a:lumOff val="50000"/>
               </a:schemeClr>
             </a:solidFill>
           </a:ln>
@@ -4974,7 +4977,7 @@
         </p:nvSpPr>
         <p:spPr>
           <a:xfrm>
-            <a:off x="1177560" y="3175624"/>
+            <a:off x="1177560" y="3124824"/>
             <a:ext cx="1080000" cy="294803"/>
           </a:xfrm>
           <a:prstGeom prst="rightArrow">
@@ -5102,7 +5105,7 @@
         </p:nvSpPr>
         <p:spPr>
           <a:xfrm>
-            <a:off x="2506948" y="3175624"/>
+            <a:off x="2506948" y="3124824"/>
             <a:ext cx="1080000" cy="294803"/>
           </a:xfrm>
           <a:prstGeom prst="rightArrow">
@@ -5166,7 +5169,7 @@
         </p:nvSpPr>
         <p:spPr>
           <a:xfrm>
-            <a:off x="618681" y="3428731"/>
+            <a:off x="618681" y="3377931"/>
             <a:ext cx="1943812" cy="1015663"/>
           </a:xfrm>
           <a:prstGeom prst="rect">
@@ -5211,7 +5214,7 @@
         </p:nvSpPr>
         <p:spPr>
           <a:xfrm>
-            <a:off x="2500132" y="3428731"/>
+            <a:off x="2500132" y="3377931"/>
             <a:ext cx="1790272" cy="1015663"/>
           </a:xfrm>
           <a:prstGeom prst="rect">
@@ -5398,10 +5401,11 @@
             <a:avLst/>
           </a:prstGeom>
           <a:noFill/>
-          <a:ln w="3175">
+          <a:ln w="6350">
             <a:solidFill>
-              <a:schemeClr val="bg1">
+              <a:schemeClr val="tx1">
                 <a:lumMod val="50000"/>
+                <a:lumOff val="50000"/>
               </a:schemeClr>
             </a:solidFill>
           </a:ln>

</xml_diff>

<commit_message>
Improved diagram in chapter 3
</commit_message>
<xml_diff>
--- a/chapter_03/figures/workflow_dataflow.pptx
+++ b/chapter_03/figures/workflow_dataflow.pptx
@@ -352,12 +352,12 @@
   <pc:docChgLst>
     <pc:chgData name="Fatima Pillosu" userId="a6295d4dc9e22643" providerId="LiveId" clId="{E45A9BF4-C197-4918-8A99-49F61B604D71}"/>
     <pc:docChg chg="undo custSel modSld">
-      <pc:chgData name="Fatima Pillosu" userId="a6295d4dc9e22643" providerId="LiveId" clId="{E45A9BF4-C197-4918-8A99-49F61B604D71}" dt="2025-06-11T15:35:13.575" v="1094" actId="1036"/>
+      <pc:chgData name="Fatima Pillosu" userId="a6295d4dc9e22643" providerId="LiveId" clId="{E45A9BF4-C197-4918-8A99-49F61B604D71}" dt="2025-06-11T15:37:40.558" v="1105" actId="1037"/>
       <pc:docMkLst>
         <pc:docMk/>
       </pc:docMkLst>
       <pc:sldChg chg="addSp delSp modSp mod">
-        <pc:chgData name="Fatima Pillosu" userId="a6295d4dc9e22643" providerId="LiveId" clId="{E45A9BF4-C197-4918-8A99-49F61B604D71}" dt="2025-06-11T15:35:13.575" v="1094" actId="1036"/>
+        <pc:chgData name="Fatima Pillosu" userId="a6295d4dc9e22643" providerId="LiveId" clId="{E45A9BF4-C197-4918-8A99-49F61B604D71}" dt="2025-06-11T15:37:40.558" v="1105" actId="1037"/>
         <pc:sldMkLst>
           <pc:docMk/>
           <pc:sldMk cId="2412790101" sldId="256"/>
@@ -1091,7 +1091,7 @@
           </ac:cxnSpMkLst>
         </pc:cxnChg>
         <pc:cxnChg chg="add mod">
-          <ac:chgData name="Fatima Pillosu" userId="a6295d4dc9e22643" providerId="LiveId" clId="{E45A9BF4-C197-4918-8A99-49F61B604D71}" dt="2025-06-11T15:34:41.382" v="1068" actId="208"/>
+          <ac:chgData name="Fatima Pillosu" userId="a6295d4dc9e22643" providerId="LiveId" clId="{E45A9BF4-C197-4918-8A99-49F61B604D71}" dt="2025-06-11T15:37:40.558" v="1105" actId="1037"/>
           <ac:cxnSpMkLst>
             <pc:docMk/>
             <pc:sldMk cId="2412790101" sldId="256"/>
@@ -4831,7 +4831,7 @@
         </p:nvCxnSpPr>
         <p:spPr>
           <a:xfrm>
-            <a:off x="11480" y="2263961"/>
+            <a:off x="-3760" y="2299521"/>
             <a:ext cx="4319586" cy="0"/>
           </a:xfrm>
           <a:prstGeom prst="line">

</xml_diff>